<commit_message>
Preparing slides - Fundamentação, Arquitetura e treinamento
</commit_message>
<xml_diff>
--- a/seminarios/TP558_LLM_QD.pptx
+++ b/seminarios/TP558_LLM_QD.pptx
@@ -5,10 +5,10 @@
     <p:sldMasterId id="2147483648" r:id="rId1"/>
   </p:sldMasterIdLst>
   <p:notesMasterIdLst>
-    <p:notesMasterId r:id="rId18"/>
+    <p:notesMasterId r:id="rId25"/>
   </p:notesMasterIdLst>
   <p:handoutMasterIdLst>
-    <p:handoutMasterId r:id="rId19"/>
+    <p:handoutMasterId r:id="rId26"/>
   </p:handoutMasterIdLst>
   <p:sldIdLst>
     <p:sldId id="256" r:id="rId2"/>
@@ -18,15 +18,22 @@
     <p:sldId id="317" r:id="rId6"/>
     <p:sldId id="318" r:id="rId7"/>
     <p:sldId id="319" r:id="rId8"/>
-    <p:sldId id="308" r:id="rId9"/>
-    <p:sldId id="309" r:id="rId10"/>
-    <p:sldId id="310" r:id="rId11"/>
-    <p:sldId id="311" r:id="rId12"/>
-    <p:sldId id="312" r:id="rId13"/>
-    <p:sldId id="313" r:id="rId14"/>
-    <p:sldId id="293" r:id="rId15"/>
-    <p:sldId id="314" r:id="rId16"/>
-    <p:sldId id="306" r:id="rId17"/>
+    <p:sldId id="320" r:id="rId9"/>
+    <p:sldId id="322" r:id="rId10"/>
+    <p:sldId id="321" r:id="rId11"/>
+    <p:sldId id="309" r:id="rId12"/>
+    <p:sldId id="323" r:id="rId13"/>
+    <p:sldId id="325" r:id="rId14"/>
+    <p:sldId id="326" r:id="rId15"/>
+    <p:sldId id="310" r:id="rId16"/>
+    <p:sldId id="327" r:id="rId17"/>
+    <p:sldId id="328" r:id="rId18"/>
+    <p:sldId id="311" r:id="rId19"/>
+    <p:sldId id="312" r:id="rId20"/>
+    <p:sldId id="313" r:id="rId21"/>
+    <p:sldId id="293" r:id="rId22"/>
+    <p:sldId id="314" r:id="rId23"/>
+    <p:sldId id="306" r:id="rId24"/>
   </p:sldIdLst>
   <p:sldSz cx="12192000" cy="6858000"/>
   <p:notesSz cx="7315200" cy="9601200"/>
@@ -806,6 +813,306 @@
 </p:notes>
 </file>
 
+<file path=ppt/notesSlides/notesSlide10.xml><?xml version="1.0" encoding="utf-8"?>
+<p:notes xmlns:a="http://schemas.openxmlformats.org/drawingml/2006/main" xmlns:r="http://schemas.openxmlformats.org/officeDocument/2006/relationships" xmlns:p="http://schemas.openxmlformats.org/presentationml/2006/main">
+  <p:cSld>
+    <p:spTree>
+      <p:nvGrpSpPr>
+        <p:cNvPr id="1" name="">
+          <a:extLst>
+            <a:ext uri="{FF2B5EF4-FFF2-40B4-BE49-F238E27FC236}">
+              <a16:creationId xmlns:a16="http://schemas.microsoft.com/office/drawing/2014/main" id="{DEBAC311-B073-BB10-15C2-4F22418D23C9}"/>
+            </a:ext>
+          </a:extLst>
+        </p:cNvPr>
+        <p:cNvGrpSpPr/>
+        <p:nvPr/>
+      </p:nvGrpSpPr>
+      <p:grpSpPr>
+        <a:xfrm>
+          <a:off x="0" y="0"/>
+          <a:ext cx="0" cy="0"/>
+          <a:chOff x="0" y="0"/>
+          <a:chExt cx="0" cy="0"/>
+        </a:xfrm>
+      </p:grpSpPr>
+      <p:sp>
+        <p:nvSpPr>
+          <p:cNvPr id="2" name="Slide Image Placeholder 1">
+            <a:extLst>
+              <a:ext uri="{FF2B5EF4-FFF2-40B4-BE49-F238E27FC236}">
+                <a16:creationId xmlns:a16="http://schemas.microsoft.com/office/drawing/2014/main" id="{150E2B88-D77D-4D93-D3C9-51676FE1B32B}"/>
+              </a:ext>
+            </a:extLst>
+          </p:cNvPr>
+          <p:cNvSpPr>
+            <a:spLocks noGrp="1" noRot="1" noChangeAspect="1"/>
+          </p:cNvSpPr>
+          <p:nvPr>
+            <p:ph type="sldImg"/>
+          </p:nvPr>
+        </p:nvSpPr>
+        <p:spPr/>
+      </p:sp>
+      <p:sp>
+        <p:nvSpPr>
+          <p:cNvPr id="3" name="Notes Placeholder 2">
+            <a:extLst>
+              <a:ext uri="{FF2B5EF4-FFF2-40B4-BE49-F238E27FC236}">
+                <a16:creationId xmlns:a16="http://schemas.microsoft.com/office/drawing/2014/main" id="{9CA882A7-7CB9-4C2E-276F-29261B462998}"/>
+              </a:ext>
+            </a:extLst>
+          </p:cNvPr>
+          <p:cNvSpPr>
+            <a:spLocks noGrp="1"/>
+          </p:cNvSpPr>
+          <p:nvPr>
+            <p:ph type="body" idx="1"/>
+          </p:nvPr>
+        </p:nvSpPr>
+        <p:spPr/>
+        <p:txBody>
+          <a:bodyPr/>
+          <a:lstStyle/>
+          <a:p>
+            <a:endParaRPr lang="pt-BR" dirty="0"/>
+          </a:p>
+        </p:txBody>
+      </p:sp>
+      <p:sp>
+        <p:nvSpPr>
+          <p:cNvPr id="4" name="Slide Number Placeholder 3">
+            <a:extLst>
+              <a:ext uri="{FF2B5EF4-FFF2-40B4-BE49-F238E27FC236}">
+                <a16:creationId xmlns:a16="http://schemas.microsoft.com/office/drawing/2014/main" id="{8830DB01-5DC4-00E8-DBDD-4D886CB8F90D}"/>
+              </a:ext>
+            </a:extLst>
+          </p:cNvPr>
+          <p:cNvSpPr>
+            <a:spLocks noGrp="1"/>
+          </p:cNvSpPr>
+          <p:nvPr>
+            <p:ph type="sldNum" sz="quarter" idx="5"/>
+          </p:nvPr>
+        </p:nvSpPr>
+        <p:spPr/>
+        <p:txBody>
+          <a:bodyPr/>
+          <a:lstStyle/>
+          <a:p>
+            <a:fld id="{6FC8D850-966F-45A6-8DE7-15B891E7D40D}" type="slidenum">
+              <a:rPr lang="pt-BR" smtClean="0"/>
+              <a:t>10</a:t>
+            </a:fld>
+            <a:endParaRPr lang="pt-BR"/>
+          </a:p>
+        </p:txBody>
+      </p:sp>
+    </p:spTree>
+    <p:extLst>
+      <p:ext uri="{BB962C8B-B14F-4D97-AF65-F5344CB8AC3E}">
+        <p14:creationId xmlns:p14="http://schemas.microsoft.com/office/powerpoint/2010/main" val="790636185"/>
+      </p:ext>
+    </p:extLst>
+  </p:cSld>
+  <p:clrMapOvr>
+    <a:masterClrMapping/>
+  </p:clrMapOvr>
+</p:notes>
+</file>
+
+<file path=ppt/notesSlides/notesSlide11.xml><?xml version="1.0" encoding="utf-8"?>
+<p:notes xmlns:a="http://schemas.openxmlformats.org/drawingml/2006/main" xmlns:r="http://schemas.openxmlformats.org/officeDocument/2006/relationships" xmlns:p="http://schemas.openxmlformats.org/presentationml/2006/main">
+  <p:cSld>
+    <p:spTree>
+      <p:nvGrpSpPr>
+        <p:cNvPr id="1" name=""/>
+        <p:cNvGrpSpPr/>
+        <p:nvPr/>
+      </p:nvGrpSpPr>
+      <p:grpSpPr>
+        <a:xfrm>
+          <a:off x="0" y="0"/>
+          <a:ext cx="0" cy="0"/>
+          <a:chOff x="0" y="0"/>
+          <a:chExt cx="0" cy="0"/>
+        </a:xfrm>
+      </p:grpSpPr>
+      <p:sp>
+        <p:nvSpPr>
+          <p:cNvPr id="2" name="Slide Image Placeholder 1"/>
+          <p:cNvSpPr>
+            <a:spLocks noGrp="1" noRot="1" noChangeAspect="1"/>
+          </p:cNvSpPr>
+          <p:nvPr>
+            <p:ph type="sldImg"/>
+          </p:nvPr>
+        </p:nvSpPr>
+        <p:spPr/>
+      </p:sp>
+      <p:sp>
+        <p:nvSpPr>
+          <p:cNvPr id="3" name="Notes Placeholder 2"/>
+          <p:cNvSpPr>
+            <a:spLocks noGrp="1"/>
+          </p:cNvSpPr>
+          <p:nvPr>
+            <p:ph type="body" idx="1"/>
+          </p:nvPr>
+        </p:nvSpPr>
+        <p:spPr/>
+        <p:txBody>
+          <a:bodyPr/>
+          <a:lstStyle/>
+          <a:p>
+            <a:endParaRPr lang="pt-BR" dirty="0"/>
+          </a:p>
+        </p:txBody>
+      </p:sp>
+      <p:sp>
+        <p:nvSpPr>
+          <p:cNvPr id="4" name="Slide Number Placeholder 3"/>
+          <p:cNvSpPr>
+            <a:spLocks noGrp="1"/>
+          </p:cNvSpPr>
+          <p:nvPr>
+            <p:ph type="sldNum" sz="quarter" idx="5"/>
+          </p:nvPr>
+        </p:nvSpPr>
+        <p:spPr/>
+        <p:txBody>
+          <a:bodyPr/>
+          <a:lstStyle/>
+          <a:p>
+            <a:fld id="{6FC8D850-966F-45A6-8DE7-15B891E7D40D}" type="slidenum">
+              <a:rPr lang="pt-BR" smtClean="0"/>
+              <a:t>16</a:t>
+            </a:fld>
+            <a:endParaRPr lang="pt-BR"/>
+          </a:p>
+        </p:txBody>
+      </p:sp>
+    </p:spTree>
+    <p:extLst>
+      <p:ext uri="{BB962C8B-B14F-4D97-AF65-F5344CB8AC3E}">
+        <p14:creationId xmlns:p14="http://schemas.microsoft.com/office/powerpoint/2010/main" val="2333451289"/>
+      </p:ext>
+    </p:extLst>
+  </p:cSld>
+  <p:clrMapOvr>
+    <a:masterClrMapping/>
+  </p:clrMapOvr>
+</p:notes>
+</file>
+
+<file path=ppt/notesSlides/notesSlide12.xml><?xml version="1.0" encoding="utf-8"?>
+<p:notes xmlns:a="http://schemas.openxmlformats.org/drawingml/2006/main" xmlns:r="http://schemas.openxmlformats.org/officeDocument/2006/relationships" xmlns:p="http://schemas.openxmlformats.org/presentationml/2006/main">
+  <p:cSld>
+    <p:spTree>
+      <p:nvGrpSpPr>
+        <p:cNvPr id="1" name="">
+          <a:extLst>
+            <a:ext uri="{FF2B5EF4-FFF2-40B4-BE49-F238E27FC236}">
+              <a16:creationId xmlns:a16="http://schemas.microsoft.com/office/drawing/2014/main" id="{99C3CFD9-7AC8-5C0F-D90A-5DF40174258F}"/>
+            </a:ext>
+          </a:extLst>
+        </p:cNvPr>
+        <p:cNvGrpSpPr/>
+        <p:nvPr/>
+      </p:nvGrpSpPr>
+      <p:grpSpPr>
+        <a:xfrm>
+          <a:off x="0" y="0"/>
+          <a:ext cx="0" cy="0"/>
+          <a:chOff x="0" y="0"/>
+          <a:chExt cx="0" cy="0"/>
+        </a:xfrm>
+      </p:grpSpPr>
+      <p:sp>
+        <p:nvSpPr>
+          <p:cNvPr id="2" name="Slide Image Placeholder 1">
+            <a:extLst>
+              <a:ext uri="{FF2B5EF4-FFF2-40B4-BE49-F238E27FC236}">
+                <a16:creationId xmlns:a16="http://schemas.microsoft.com/office/drawing/2014/main" id="{9EFC8E70-FF29-F211-DA06-B071A785953B}"/>
+              </a:ext>
+            </a:extLst>
+          </p:cNvPr>
+          <p:cNvSpPr>
+            <a:spLocks noGrp="1" noRot="1" noChangeAspect="1"/>
+          </p:cNvSpPr>
+          <p:nvPr>
+            <p:ph type="sldImg"/>
+          </p:nvPr>
+        </p:nvSpPr>
+        <p:spPr/>
+      </p:sp>
+      <p:sp>
+        <p:nvSpPr>
+          <p:cNvPr id="3" name="Notes Placeholder 2">
+            <a:extLst>
+              <a:ext uri="{FF2B5EF4-FFF2-40B4-BE49-F238E27FC236}">
+                <a16:creationId xmlns:a16="http://schemas.microsoft.com/office/drawing/2014/main" id="{B9AAD019-D90D-CB3F-73CA-B11DF3753E83}"/>
+              </a:ext>
+            </a:extLst>
+          </p:cNvPr>
+          <p:cNvSpPr>
+            <a:spLocks noGrp="1"/>
+          </p:cNvSpPr>
+          <p:nvPr>
+            <p:ph type="body" idx="1"/>
+          </p:nvPr>
+        </p:nvSpPr>
+        <p:spPr/>
+        <p:txBody>
+          <a:bodyPr/>
+          <a:lstStyle/>
+          <a:p>
+            <a:endParaRPr lang="pt-BR" dirty="0"/>
+          </a:p>
+        </p:txBody>
+      </p:sp>
+      <p:sp>
+        <p:nvSpPr>
+          <p:cNvPr id="4" name="Slide Number Placeholder 3">
+            <a:extLst>
+              <a:ext uri="{FF2B5EF4-FFF2-40B4-BE49-F238E27FC236}">
+                <a16:creationId xmlns:a16="http://schemas.microsoft.com/office/drawing/2014/main" id="{C2A170FA-5754-7EB0-99B1-AE5563C07763}"/>
+              </a:ext>
+            </a:extLst>
+          </p:cNvPr>
+          <p:cNvSpPr>
+            <a:spLocks noGrp="1"/>
+          </p:cNvSpPr>
+          <p:nvPr>
+            <p:ph type="sldNum" sz="quarter" idx="5"/>
+          </p:nvPr>
+        </p:nvSpPr>
+        <p:spPr/>
+        <p:txBody>
+          <a:bodyPr/>
+          <a:lstStyle/>
+          <a:p>
+            <a:fld id="{6FC8D850-966F-45A6-8DE7-15B891E7D40D}" type="slidenum">
+              <a:rPr lang="pt-BR" smtClean="0"/>
+              <a:t>17</a:t>
+            </a:fld>
+            <a:endParaRPr lang="pt-BR"/>
+          </a:p>
+        </p:txBody>
+      </p:sp>
+    </p:spTree>
+    <p:extLst>
+      <p:ext uri="{BB962C8B-B14F-4D97-AF65-F5344CB8AC3E}">
+        <p14:creationId xmlns:p14="http://schemas.microsoft.com/office/powerpoint/2010/main" val="4198859561"/>
+      </p:ext>
+    </p:extLst>
+  </p:cSld>
+  <p:clrMapOvr>
+    <a:masterClrMapping/>
+  </p:clrMapOvr>
+</p:notes>
+</file>
+
 <file path=ppt/notesSlides/notesSlide2.xml><?xml version="1.0" encoding="utf-8"?>
 <p:notes xmlns:a="http://schemas.openxmlformats.org/drawingml/2006/main" xmlns:r="http://schemas.openxmlformats.org/officeDocument/2006/relationships" xmlns:p="http://schemas.openxmlformats.org/presentationml/2006/main">
   <p:cSld>
@@ -1860,6 +2167,222 @@
     <p:extLst>
       <p:ext uri="{BB962C8B-B14F-4D97-AF65-F5344CB8AC3E}">
         <p14:creationId xmlns:p14="http://schemas.microsoft.com/office/powerpoint/2010/main" val="546295333"/>
+      </p:ext>
+    </p:extLst>
+  </p:cSld>
+  <p:clrMapOvr>
+    <a:masterClrMapping/>
+  </p:clrMapOvr>
+</p:notes>
+</file>
+
+<file path=ppt/notesSlides/notesSlide8.xml><?xml version="1.0" encoding="utf-8"?>
+<p:notes xmlns:a="http://schemas.openxmlformats.org/drawingml/2006/main" xmlns:r="http://schemas.openxmlformats.org/officeDocument/2006/relationships" xmlns:p="http://schemas.openxmlformats.org/presentationml/2006/main">
+  <p:cSld>
+    <p:spTree>
+      <p:nvGrpSpPr>
+        <p:cNvPr id="1" name="">
+          <a:extLst>
+            <a:ext uri="{FF2B5EF4-FFF2-40B4-BE49-F238E27FC236}">
+              <a16:creationId xmlns:a16="http://schemas.microsoft.com/office/drawing/2014/main" id="{153736C9-D443-8D31-4CDB-1FF40BD494EA}"/>
+            </a:ext>
+          </a:extLst>
+        </p:cNvPr>
+        <p:cNvGrpSpPr/>
+        <p:nvPr/>
+      </p:nvGrpSpPr>
+      <p:grpSpPr>
+        <a:xfrm>
+          <a:off x="0" y="0"/>
+          <a:ext cx="0" cy="0"/>
+          <a:chOff x="0" y="0"/>
+          <a:chExt cx="0" cy="0"/>
+        </a:xfrm>
+      </p:grpSpPr>
+      <p:sp>
+        <p:nvSpPr>
+          <p:cNvPr id="2" name="Slide Image Placeholder 1">
+            <a:extLst>
+              <a:ext uri="{FF2B5EF4-FFF2-40B4-BE49-F238E27FC236}">
+                <a16:creationId xmlns:a16="http://schemas.microsoft.com/office/drawing/2014/main" id="{F8C762FC-40F2-65AD-8330-7F0C8153549B}"/>
+              </a:ext>
+            </a:extLst>
+          </p:cNvPr>
+          <p:cNvSpPr>
+            <a:spLocks noGrp="1" noRot="1" noChangeAspect="1"/>
+          </p:cNvSpPr>
+          <p:nvPr>
+            <p:ph type="sldImg"/>
+          </p:nvPr>
+        </p:nvSpPr>
+        <p:spPr/>
+      </p:sp>
+      <p:sp>
+        <p:nvSpPr>
+          <p:cNvPr id="3" name="Notes Placeholder 2">
+            <a:extLst>
+              <a:ext uri="{FF2B5EF4-FFF2-40B4-BE49-F238E27FC236}">
+                <a16:creationId xmlns:a16="http://schemas.microsoft.com/office/drawing/2014/main" id="{5F5C1E8B-AC2D-6F80-3BA5-26CE0B639DF2}"/>
+              </a:ext>
+            </a:extLst>
+          </p:cNvPr>
+          <p:cNvSpPr>
+            <a:spLocks noGrp="1"/>
+          </p:cNvSpPr>
+          <p:nvPr>
+            <p:ph type="body" idx="1"/>
+          </p:nvPr>
+        </p:nvSpPr>
+        <p:spPr/>
+        <p:txBody>
+          <a:bodyPr/>
+          <a:lstStyle/>
+          <a:p>
+            <a:endParaRPr lang="pt-BR" dirty="0"/>
+          </a:p>
+        </p:txBody>
+      </p:sp>
+      <p:sp>
+        <p:nvSpPr>
+          <p:cNvPr id="4" name="Slide Number Placeholder 3">
+            <a:extLst>
+              <a:ext uri="{FF2B5EF4-FFF2-40B4-BE49-F238E27FC236}">
+                <a16:creationId xmlns:a16="http://schemas.microsoft.com/office/drawing/2014/main" id="{F7A13E30-19BA-8697-8D12-53ED6015D498}"/>
+              </a:ext>
+            </a:extLst>
+          </p:cNvPr>
+          <p:cNvSpPr>
+            <a:spLocks noGrp="1"/>
+          </p:cNvSpPr>
+          <p:nvPr>
+            <p:ph type="sldNum" sz="quarter" idx="5"/>
+          </p:nvPr>
+        </p:nvSpPr>
+        <p:spPr/>
+        <p:txBody>
+          <a:bodyPr/>
+          <a:lstStyle/>
+          <a:p>
+            <a:fld id="{6FC8D850-966F-45A6-8DE7-15B891E7D40D}" type="slidenum">
+              <a:rPr lang="pt-BR" smtClean="0"/>
+              <a:t>8</a:t>
+            </a:fld>
+            <a:endParaRPr lang="pt-BR"/>
+          </a:p>
+        </p:txBody>
+      </p:sp>
+    </p:spTree>
+    <p:extLst>
+      <p:ext uri="{BB962C8B-B14F-4D97-AF65-F5344CB8AC3E}">
+        <p14:creationId xmlns:p14="http://schemas.microsoft.com/office/powerpoint/2010/main" val="672969568"/>
+      </p:ext>
+    </p:extLst>
+  </p:cSld>
+  <p:clrMapOvr>
+    <a:masterClrMapping/>
+  </p:clrMapOvr>
+</p:notes>
+</file>
+
+<file path=ppt/notesSlides/notesSlide9.xml><?xml version="1.0" encoding="utf-8"?>
+<p:notes xmlns:a="http://schemas.openxmlformats.org/drawingml/2006/main" xmlns:r="http://schemas.openxmlformats.org/officeDocument/2006/relationships" xmlns:p="http://schemas.openxmlformats.org/presentationml/2006/main">
+  <p:cSld>
+    <p:spTree>
+      <p:nvGrpSpPr>
+        <p:cNvPr id="1" name="">
+          <a:extLst>
+            <a:ext uri="{FF2B5EF4-FFF2-40B4-BE49-F238E27FC236}">
+              <a16:creationId xmlns:a16="http://schemas.microsoft.com/office/drawing/2014/main" id="{995B3B16-9C41-E0E0-4ADE-0CABEF1C5F41}"/>
+            </a:ext>
+          </a:extLst>
+        </p:cNvPr>
+        <p:cNvGrpSpPr/>
+        <p:nvPr/>
+      </p:nvGrpSpPr>
+      <p:grpSpPr>
+        <a:xfrm>
+          <a:off x="0" y="0"/>
+          <a:ext cx="0" cy="0"/>
+          <a:chOff x="0" y="0"/>
+          <a:chExt cx="0" cy="0"/>
+        </a:xfrm>
+      </p:grpSpPr>
+      <p:sp>
+        <p:nvSpPr>
+          <p:cNvPr id="2" name="Slide Image Placeholder 1">
+            <a:extLst>
+              <a:ext uri="{FF2B5EF4-FFF2-40B4-BE49-F238E27FC236}">
+                <a16:creationId xmlns:a16="http://schemas.microsoft.com/office/drawing/2014/main" id="{093C8B87-8E04-9A4F-E659-8559F12FD6E6}"/>
+              </a:ext>
+            </a:extLst>
+          </p:cNvPr>
+          <p:cNvSpPr>
+            <a:spLocks noGrp="1" noRot="1" noChangeAspect="1"/>
+          </p:cNvSpPr>
+          <p:nvPr>
+            <p:ph type="sldImg"/>
+          </p:nvPr>
+        </p:nvSpPr>
+        <p:spPr/>
+      </p:sp>
+      <p:sp>
+        <p:nvSpPr>
+          <p:cNvPr id="3" name="Notes Placeholder 2">
+            <a:extLst>
+              <a:ext uri="{FF2B5EF4-FFF2-40B4-BE49-F238E27FC236}">
+                <a16:creationId xmlns:a16="http://schemas.microsoft.com/office/drawing/2014/main" id="{7BC2E725-5E8F-C65B-C9A2-1062822D8494}"/>
+              </a:ext>
+            </a:extLst>
+          </p:cNvPr>
+          <p:cNvSpPr>
+            <a:spLocks noGrp="1"/>
+          </p:cNvSpPr>
+          <p:nvPr>
+            <p:ph type="body" idx="1"/>
+          </p:nvPr>
+        </p:nvSpPr>
+        <p:spPr/>
+        <p:txBody>
+          <a:bodyPr/>
+          <a:lstStyle/>
+          <a:p>
+            <a:endParaRPr lang="pt-BR" dirty="0"/>
+          </a:p>
+        </p:txBody>
+      </p:sp>
+      <p:sp>
+        <p:nvSpPr>
+          <p:cNvPr id="4" name="Slide Number Placeholder 3">
+            <a:extLst>
+              <a:ext uri="{FF2B5EF4-FFF2-40B4-BE49-F238E27FC236}">
+                <a16:creationId xmlns:a16="http://schemas.microsoft.com/office/drawing/2014/main" id="{4425B104-0274-4FDA-9EC8-0C21A31A5274}"/>
+              </a:ext>
+            </a:extLst>
+          </p:cNvPr>
+          <p:cNvSpPr>
+            <a:spLocks noGrp="1"/>
+          </p:cNvSpPr>
+          <p:nvPr>
+            <p:ph type="sldNum" sz="quarter" idx="5"/>
+          </p:nvPr>
+        </p:nvSpPr>
+        <p:spPr/>
+        <p:txBody>
+          <a:bodyPr/>
+          <a:lstStyle/>
+          <a:p>
+            <a:fld id="{6FC8D850-966F-45A6-8DE7-15B891E7D40D}" type="slidenum">
+              <a:rPr lang="pt-BR" smtClean="0"/>
+              <a:t>9</a:t>
+            </a:fld>
+            <a:endParaRPr lang="pt-BR"/>
+          </a:p>
+        </p:txBody>
+      </p:sp>
+    </p:spTree>
+    <p:extLst>
+      <p:ext uri="{BB962C8B-B14F-4D97-AF65-F5344CB8AC3E}">
+        <p14:creationId xmlns:p14="http://schemas.microsoft.com/office/powerpoint/2010/main" val="664943432"/>
       </p:ext>
     </p:extLst>
   </p:cSld>
@@ -5278,6 +5801,957 @@
         <p:cNvPr id="1" name="">
           <a:extLst>
             <a:ext uri="{FF2B5EF4-FFF2-40B4-BE49-F238E27FC236}">
+              <a16:creationId xmlns:a16="http://schemas.microsoft.com/office/drawing/2014/main" id="{A8440F8B-A726-6DDB-3BE1-64BEAFDA74C3}"/>
+            </a:ext>
+          </a:extLst>
+        </p:cNvPr>
+        <p:cNvGrpSpPr/>
+        <p:nvPr/>
+      </p:nvGrpSpPr>
+      <p:grpSpPr>
+        <a:xfrm>
+          <a:off x="0" y="0"/>
+          <a:ext cx="0" cy="0"/>
+          <a:chOff x="0" y="0"/>
+          <a:chExt cx="0" cy="0"/>
+        </a:xfrm>
+      </p:grpSpPr>
+      <p:sp>
+        <p:nvSpPr>
+          <p:cNvPr id="2" name="Título 1">
+            <a:extLst>
+              <a:ext uri="{FF2B5EF4-FFF2-40B4-BE49-F238E27FC236}">
+                <a16:creationId xmlns:a16="http://schemas.microsoft.com/office/drawing/2014/main" id="{06B5CFE6-56FA-7F82-CD1F-AC5BFC54DDA3}"/>
+              </a:ext>
+            </a:extLst>
+          </p:cNvPr>
+          <p:cNvSpPr>
+            <a:spLocks noGrp="1"/>
+          </p:cNvSpPr>
+          <p:nvPr>
+            <p:ph type="title"/>
+          </p:nvPr>
+        </p:nvSpPr>
+        <p:spPr/>
+        <p:txBody>
+          <a:bodyPr/>
+          <a:lstStyle/>
+          <a:p>
+            <a:r>
+              <a:rPr lang="pt-BR" dirty="0"/>
+              <a:t>Fundamentação teórica</a:t>
+            </a:r>
+            <a:endParaRPr lang="pt-BR" noProof="0" dirty="0"/>
+          </a:p>
+        </p:txBody>
+      </p:sp>
+      <p:sp>
+        <p:nvSpPr>
+          <p:cNvPr id="3" name="Espaço Reservado para Conteúdo 2">
+            <a:extLst>
+              <a:ext uri="{FF2B5EF4-FFF2-40B4-BE49-F238E27FC236}">
+                <a16:creationId xmlns:a16="http://schemas.microsoft.com/office/drawing/2014/main" id="{A9EE5A99-14E1-C691-4014-561BC4CAB342}"/>
+              </a:ext>
+            </a:extLst>
+          </p:cNvPr>
+          <p:cNvSpPr>
+            <a:spLocks noGrp="1"/>
+          </p:cNvSpPr>
+          <p:nvPr>
+            <p:ph idx="1"/>
+          </p:nvPr>
+        </p:nvSpPr>
+        <p:spPr/>
+        <p:txBody>
+          <a:bodyPr anchor="ctr">
+            <a:normAutofit/>
+          </a:bodyPr>
+          <a:lstStyle/>
+          <a:p>
+            <a:pPr marL="0" indent="0" algn="just">
+              <a:buNone/>
+            </a:pPr>
+            <a:r>
+              <a:rPr lang="pt-BR" noProof="0" dirty="0"/>
+              <a:t>Por exemplo:</a:t>
+            </a:r>
+          </a:p>
+          <a:p>
+            <a:pPr marL="0" indent="0" algn="just">
+              <a:buNone/>
+            </a:pPr>
+            <a:r>
+              <a:rPr lang="pt-BR" noProof="0" dirty="0"/>
+              <a:t>Em um problema de projeto de robôs que precisam andar, um algoritmo clássico de otimização tentaria encontrar </a:t>
+            </a:r>
+            <a:r>
+              <a:rPr lang="pt-BR" b="1" noProof="0" dirty="0">
+                <a:solidFill>
+                  <a:schemeClr val="accent6">
+                    <a:lumMod val="75000"/>
+                  </a:schemeClr>
+                </a:solidFill>
+              </a:rPr>
+              <a:t>o robô mais rápido possível</a:t>
+            </a:r>
+            <a:r>
+              <a:rPr lang="pt-BR" noProof="0" dirty="0"/>
+              <a:t>.</a:t>
+            </a:r>
+          </a:p>
+          <a:p>
+            <a:pPr marL="0" indent="0" algn="just">
+              <a:buNone/>
+            </a:pPr>
+            <a:endParaRPr lang="pt-BR" noProof="0" dirty="0"/>
+          </a:p>
+          <a:p>
+            <a:pPr marL="0" indent="0" algn="just">
+              <a:buNone/>
+            </a:pPr>
+            <a:r>
+              <a:rPr lang="pt-BR" noProof="0" dirty="0"/>
+              <a:t>Um algoritmo de QD, por outro lado, vai tentar encontrar </a:t>
+            </a:r>
+            <a:r>
+              <a:rPr lang="pt-BR" b="1" noProof="0" dirty="0">
+                <a:solidFill>
+                  <a:schemeClr val="accent6">
+                    <a:lumMod val="75000"/>
+                  </a:schemeClr>
+                </a:solidFill>
+              </a:rPr>
+              <a:t>vários tipos de robôs eficientes</a:t>
+            </a:r>
+            <a:r>
+              <a:rPr lang="pt-BR" noProof="0" dirty="0"/>
+              <a:t> </a:t>
+            </a:r>
+            <a:r>
+              <a:rPr lang="pt-BR" noProof="0" dirty="0">
+                <a:solidFill>
+                  <a:schemeClr val="accent6">
+                    <a:lumMod val="75000"/>
+                  </a:schemeClr>
+                </a:solidFill>
+              </a:rPr>
+              <a:t>(um que corre com quatro pernas, outro que rola, outro que salta, etc.)</a:t>
+            </a:r>
+            <a:r>
+              <a:rPr lang="pt-BR" noProof="0" dirty="0"/>
+              <a:t>, oferecendo </a:t>
+            </a:r>
+            <a:r>
+              <a:rPr lang="pt-BR" b="1" noProof="0" dirty="0"/>
+              <a:t>um portfólio de soluções boas e diversas.</a:t>
+            </a:r>
+            <a:endParaRPr lang="pt-BR" noProof="0" dirty="0"/>
+          </a:p>
+          <a:p>
+            <a:pPr marL="0" indent="0" algn="just">
+              <a:buNone/>
+            </a:pPr>
+            <a:endParaRPr lang="pt-BR" noProof="0" dirty="0"/>
+          </a:p>
+        </p:txBody>
+      </p:sp>
+    </p:spTree>
+    <p:extLst>
+      <p:ext uri="{BB962C8B-B14F-4D97-AF65-F5344CB8AC3E}">
+        <p14:creationId xmlns:p14="http://schemas.microsoft.com/office/powerpoint/2010/main" val="3748345780"/>
+      </p:ext>
+    </p:extLst>
+  </p:cSld>
+  <p:clrMapOvr>
+    <a:masterClrMapping/>
+  </p:clrMapOvr>
+</p:sld>
+</file>
+
+<file path=ppt/slides/slide11.xml><?xml version="1.0" encoding="utf-8"?>
+<p:sld xmlns:a="http://schemas.openxmlformats.org/drawingml/2006/main" xmlns:r="http://schemas.openxmlformats.org/officeDocument/2006/relationships" xmlns:p="http://schemas.openxmlformats.org/presentationml/2006/main">
+  <p:cSld>
+    <p:spTree>
+      <p:nvGrpSpPr>
+        <p:cNvPr id="1" name=""/>
+        <p:cNvGrpSpPr/>
+        <p:nvPr/>
+      </p:nvGrpSpPr>
+      <p:grpSpPr>
+        <a:xfrm>
+          <a:off x="0" y="0"/>
+          <a:ext cx="0" cy="0"/>
+          <a:chOff x="0" y="0"/>
+          <a:chExt cx="0" cy="0"/>
+        </a:xfrm>
+      </p:grpSpPr>
+      <p:sp>
+        <p:nvSpPr>
+          <p:cNvPr id="2" name="Título 1">
+            <a:extLst>
+              <a:ext uri="{FF2B5EF4-FFF2-40B4-BE49-F238E27FC236}">
+                <a16:creationId xmlns:a16="http://schemas.microsoft.com/office/drawing/2014/main" id="{083FFF02-0FC8-9F0B-AAB0-565FC99EA70D}"/>
+              </a:ext>
+            </a:extLst>
+          </p:cNvPr>
+          <p:cNvSpPr>
+            <a:spLocks noGrp="1"/>
+          </p:cNvSpPr>
+          <p:nvPr>
+            <p:ph type="title"/>
+          </p:nvPr>
+        </p:nvSpPr>
+        <p:spPr/>
+        <p:txBody>
+          <a:bodyPr/>
+          <a:lstStyle/>
+          <a:p>
+            <a:r>
+              <a:rPr lang="pt-BR" noProof="0" dirty="0"/>
+              <a:t>Arquitetura e funcionamento</a:t>
+            </a:r>
+          </a:p>
+        </p:txBody>
+      </p:sp>
+      <p:sp>
+        <p:nvSpPr>
+          <p:cNvPr id="3" name="Espaço Reservado para Conteúdo 2">
+            <a:extLst>
+              <a:ext uri="{FF2B5EF4-FFF2-40B4-BE49-F238E27FC236}">
+                <a16:creationId xmlns:a16="http://schemas.microsoft.com/office/drawing/2014/main" id="{8C5488AE-34B4-EF1D-F674-507FF2FCD122}"/>
+              </a:ext>
+            </a:extLst>
+          </p:cNvPr>
+          <p:cNvSpPr>
+            <a:spLocks noGrp="1"/>
+          </p:cNvSpPr>
+          <p:nvPr>
+            <p:ph idx="1"/>
+          </p:nvPr>
+        </p:nvSpPr>
+        <p:spPr/>
+        <p:txBody>
+          <a:bodyPr anchor="ctr">
+            <a:normAutofit/>
+          </a:bodyPr>
+          <a:lstStyle/>
+          <a:p>
+            <a:pPr marL="0" indent="0">
+              <a:buNone/>
+            </a:pPr>
+            <a:r>
+              <a:rPr lang="pt-BR" noProof="0" dirty="0"/>
+              <a:t>O sistema é composto por dois arquivos evolutivos principais que trabalham em cooperação:</a:t>
+            </a:r>
+          </a:p>
+        </p:txBody>
+      </p:sp>
+    </p:spTree>
+    <p:extLst>
+      <p:ext uri="{BB962C8B-B14F-4D97-AF65-F5344CB8AC3E}">
+        <p14:creationId xmlns:p14="http://schemas.microsoft.com/office/powerpoint/2010/main" val="1547259554"/>
+      </p:ext>
+    </p:extLst>
+  </p:cSld>
+  <p:clrMapOvr>
+    <a:masterClrMapping/>
+  </p:clrMapOvr>
+</p:sld>
+</file>
+
+<file path=ppt/slides/slide12.xml><?xml version="1.0" encoding="utf-8"?>
+<p:sld xmlns:a="http://schemas.openxmlformats.org/drawingml/2006/main" xmlns:r="http://schemas.openxmlformats.org/officeDocument/2006/relationships" xmlns:p="http://schemas.openxmlformats.org/presentationml/2006/main">
+  <p:cSld>
+    <p:spTree>
+      <p:nvGrpSpPr>
+        <p:cNvPr id="1" name="">
+          <a:extLst>
+            <a:ext uri="{FF2B5EF4-FFF2-40B4-BE49-F238E27FC236}">
+              <a16:creationId xmlns:a16="http://schemas.microsoft.com/office/drawing/2014/main" id="{4F4F7B6E-4681-ED30-9653-D7AF94988F98}"/>
+            </a:ext>
+          </a:extLst>
+        </p:cNvPr>
+        <p:cNvGrpSpPr/>
+        <p:nvPr/>
+      </p:nvGrpSpPr>
+      <p:grpSpPr>
+        <a:xfrm>
+          <a:off x="0" y="0"/>
+          <a:ext cx="0" cy="0"/>
+          <a:chOff x="0" y="0"/>
+          <a:chExt cx="0" cy="0"/>
+        </a:xfrm>
+      </p:grpSpPr>
+      <p:sp>
+        <p:nvSpPr>
+          <p:cNvPr id="2" name="Título 1">
+            <a:extLst>
+              <a:ext uri="{FF2B5EF4-FFF2-40B4-BE49-F238E27FC236}">
+                <a16:creationId xmlns:a16="http://schemas.microsoft.com/office/drawing/2014/main" id="{6604013C-2949-D8E0-E53E-0708766D0BF2}"/>
+              </a:ext>
+            </a:extLst>
+          </p:cNvPr>
+          <p:cNvSpPr>
+            <a:spLocks noGrp="1"/>
+          </p:cNvSpPr>
+          <p:nvPr>
+            <p:ph type="title"/>
+          </p:nvPr>
+        </p:nvSpPr>
+        <p:spPr/>
+        <p:txBody>
+          <a:bodyPr/>
+          <a:lstStyle/>
+          <a:p>
+            <a:r>
+              <a:rPr lang="pt-BR" noProof="0" dirty="0"/>
+              <a:t>Arquitetura e funcionamento</a:t>
+            </a:r>
+          </a:p>
+        </p:txBody>
+      </p:sp>
+      <p:sp>
+        <p:nvSpPr>
+          <p:cNvPr id="3" name="Espaço Reservado para Conteúdo 2">
+            <a:extLst>
+              <a:ext uri="{FF2B5EF4-FFF2-40B4-BE49-F238E27FC236}">
+                <a16:creationId xmlns:a16="http://schemas.microsoft.com/office/drawing/2014/main" id="{A95D2A33-6CF7-35FF-B2AC-9335CE4F3183}"/>
+              </a:ext>
+            </a:extLst>
+          </p:cNvPr>
+          <p:cNvSpPr>
+            <a:spLocks noGrp="1"/>
+          </p:cNvSpPr>
+          <p:nvPr>
+            <p:ph idx="1"/>
+          </p:nvPr>
+        </p:nvSpPr>
+        <p:spPr/>
+        <p:txBody>
+          <a:bodyPr anchor="ctr">
+            <a:normAutofit fontScale="92500" lnSpcReduction="20000"/>
+          </a:bodyPr>
+          <a:lstStyle/>
+          <a:p>
+            <a:pPr marL="514350" indent="-514350">
+              <a:buFont typeface="+mj-lt"/>
+              <a:buAutoNum type="arabicPeriod"/>
+            </a:pPr>
+            <a:r>
+              <a:rPr lang="pt-BR" b="1" noProof="0" dirty="0"/>
+              <a:t>Arquivo de Redes (Network </a:t>
+            </a:r>
+            <a:r>
+              <a:rPr lang="pt-BR" b="1" noProof="0" dirty="0" err="1"/>
+              <a:t>Archive</a:t>
+            </a:r>
+            <a:r>
+              <a:rPr lang="pt-BR" b="1" noProof="0" dirty="0"/>
+              <a:t>)</a:t>
+            </a:r>
+            <a:endParaRPr lang="pt-BR" noProof="0" dirty="0"/>
+          </a:p>
+          <a:p>
+            <a:pPr lvl="1"/>
+            <a:r>
+              <a:rPr lang="pt-BR" noProof="0" dirty="0"/>
+              <a:t>Armazena arquiteturas de redes neurais candidatas.</a:t>
+            </a:r>
+          </a:p>
+          <a:p>
+            <a:pPr lvl="1"/>
+            <a:r>
+              <a:rPr lang="pt-BR" noProof="0" dirty="0"/>
+              <a:t>Cada rede é descrita por dois </a:t>
+            </a:r>
+            <a:r>
+              <a:rPr lang="pt-BR" b="1" noProof="0" dirty="0"/>
+              <a:t>descritores comportamentais</a:t>
+            </a:r>
+            <a:r>
+              <a:rPr lang="pt-BR" noProof="0" dirty="0"/>
+              <a:t>:</a:t>
+            </a:r>
+          </a:p>
+          <a:p>
+            <a:pPr lvl="2"/>
+            <a:r>
+              <a:rPr lang="pt-BR" b="1" noProof="0" dirty="0"/>
+              <a:t>Relação largura/profundidade</a:t>
+            </a:r>
+            <a:r>
+              <a:rPr lang="pt-BR" noProof="0" dirty="0"/>
+              <a:t> (</a:t>
+            </a:r>
+            <a:r>
+              <a:rPr lang="pt-BR" noProof="0" dirty="0" err="1"/>
+              <a:t>width-to-depth</a:t>
+            </a:r>
+            <a:r>
+              <a:rPr lang="pt-BR" noProof="0" dirty="0"/>
+              <a:t> </a:t>
+            </a:r>
+            <a:r>
+              <a:rPr lang="pt-BR" noProof="0" dirty="0" err="1"/>
+              <a:t>ratio</a:t>
+            </a:r>
+            <a:r>
+              <a:rPr lang="pt-BR" noProof="0" dirty="0"/>
+              <a:t>).</a:t>
+            </a:r>
+          </a:p>
+          <a:p>
+            <a:pPr lvl="2"/>
+            <a:r>
+              <a:rPr lang="pt-BR" b="1" noProof="0" dirty="0"/>
+              <a:t>FLOPS</a:t>
+            </a:r>
+            <a:r>
+              <a:rPr lang="pt-BR" noProof="0" dirty="0"/>
+              <a:t> (operações de ponto flutuante por segundo, mais correlacionado ao tempo real de treino do que apenas número de parâmetros).</a:t>
+            </a:r>
+          </a:p>
+          <a:p>
+            <a:pPr lvl="1"/>
+            <a:r>
+              <a:rPr lang="pt-BR" noProof="0" dirty="0"/>
+              <a:t>O </a:t>
+            </a:r>
+            <a:r>
+              <a:rPr lang="pt-BR" b="1" noProof="0" dirty="0"/>
+              <a:t>fitness</a:t>
+            </a:r>
+            <a:r>
+              <a:rPr lang="pt-BR" noProof="0" dirty="0"/>
+              <a:t> das redes é a </a:t>
+            </a:r>
+            <a:r>
+              <a:rPr lang="pt-BR" b="1" noProof="0" dirty="0"/>
+              <a:t>acurácia de teste</a:t>
+            </a:r>
+            <a:r>
+              <a:rPr lang="pt-BR" noProof="0" dirty="0"/>
+              <a:t> após treinamento.</a:t>
+            </a:r>
+          </a:p>
+          <a:p>
+            <a:pPr marL="514350" indent="-514350">
+              <a:buFont typeface="+mj-lt"/>
+              <a:buAutoNum type="arabicPeriod"/>
+            </a:pPr>
+            <a:r>
+              <a:rPr lang="pt-BR" b="1" noProof="0" dirty="0"/>
+              <a:t>Arquivo de Prompts (Prompt </a:t>
+            </a:r>
+            <a:r>
+              <a:rPr lang="pt-BR" b="1" noProof="0" dirty="0" err="1"/>
+              <a:t>Archive</a:t>
+            </a:r>
+            <a:r>
+              <a:rPr lang="pt-BR" b="1" noProof="0" dirty="0"/>
+              <a:t>)</a:t>
+            </a:r>
+            <a:endParaRPr lang="pt-BR" noProof="0" dirty="0"/>
+          </a:p>
+          <a:p>
+            <a:pPr lvl="1"/>
+            <a:r>
+              <a:rPr lang="pt-BR" noProof="0" dirty="0"/>
+              <a:t>Armazena combinações de </a:t>
+            </a:r>
+            <a:r>
+              <a:rPr lang="pt-BR" b="1" noProof="0" dirty="0"/>
+              <a:t>prompts + temperatura do LLM</a:t>
+            </a:r>
+            <a:r>
+              <a:rPr lang="pt-BR" noProof="0" dirty="0"/>
+              <a:t> usados para gerar código de redes.</a:t>
+            </a:r>
+          </a:p>
+          <a:p>
+            <a:pPr lvl="1"/>
+            <a:r>
+              <a:rPr lang="pt-BR" noProof="0" dirty="0"/>
+              <a:t>A temperatura controla a aleatoriedade da saída do LLM: baixa → determinística, alta → mais criativa.</a:t>
+            </a:r>
+          </a:p>
+          <a:p>
+            <a:pPr lvl="1"/>
+            <a:r>
+              <a:rPr lang="pt-BR" noProof="0" dirty="0"/>
+              <a:t>O fitness é baseado na </a:t>
+            </a:r>
+            <a:r>
+              <a:rPr lang="pt-BR" b="1" noProof="0" dirty="0"/>
+              <a:t>curiosidade</a:t>
+            </a:r>
+            <a:r>
+              <a:rPr lang="pt-BR" noProof="0" dirty="0"/>
+              <a:t>: se um prompt gera redes que entram no arquivo de redes e melhoram desempenho, ele ganha pontuação.</a:t>
+            </a:r>
+          </a:p>
+        </p:txBody>
+      </p:sp>
+    </p:spTree>
+    <p:extLst>
+      <p:ext uri="{BB962C8B-B14F-4D97-AF65-F5344CB8AC3E}">
+        <p14:creationId xmlns:p14="http://schemas.microsoft.com/office/powerpoint/2010/main" val="1270701326"/>
+      </p:ext>
+    </p:extLst>
+  </p:cSld>
+  <p:clrMapOvr>
+    <a:masterClrMapping/>
+  </p:clrMapOvr>
+</p:sld>
+</file>
+
+<file path=ppt/slides/slide13.xml><?xml version="1.0" encoding="utf-8"?>
+<p:sld xmlns:a="http://schemas.openxmlformats.org/drawingml/2006/main" xmlns:r="http://schemas.openxmlformats.org/officeDocument/2006/relationships" xmlns:p="http://schemas.openxmlformats.org/presentationml/2006/main">
+  <p:cSld>
+    <p:spTree>
+      <p:nvGrpSpPr>
+        <p:cNvPr id="1" name="">
+          <a:extLst>
+            <a:ext uri="{FF2B5EF4-FFF2-40B4-BE49-F238E27FC236}">
+              <a16:creationId xmlns:a16="http://schemas.microsoft.com/office/drawing/2014/main" id="{C280FD43-B39A-3986-F8FC-DF382C9A3BF3}"/>
+            </a:ext>
+          </a:extLst>
+        </p:cNvPr>
+        <p:cNvGrpSpPr/>
+        <p:nvPr/>
+      </p:nvGrpSpPr>
+      <p:grpSpPr>
+        <a:xfrm>
+          <a:off x="0" y="0"/>
+          <a:ext cx="0" cy="0"/>
+          <a:chOff x="0" y="0"/>
+          <a:chExt cx="0" cy="0"/>
+        </a:xfrm>
+      </p:grpSpPr>
+      <p:sp>
+        <p:nvSpPr>
+          <p:cNvPr id="2" name="Título 1">
+            <a:extLst>
+              <a:ext uri="{FF2B5EF4-FFF2-40B4-BE49-F238E27FC236}">
+                <a16:creationId xmlns:a16="http://schemas.microsoft.com/office/drawing/2014/main" id="{9A139E37-7EDC-DA89-C5F0-CFC90045DDF0}"/>
+              </a:ext>
+            </a:extLst>
+          </p:cNvPr>
+          <p:cNvSpPr>
+            <a:spLocks noGrp="1"/>
+          </p:cNvSpPr>
+          <p:nvPr>
+            <p:ph type="title"/>
+          </p:nvPr>
+        </p:nvSpPr>
+        <p:spPr/>
+        <p:txBody>
+          <a:bodyPr/>
+          <a:lstStyle/>
+          <a:p>
+            <a:r>
+              <a:rPr lang="pt-BR" noProof="0" dirty="0"/>
+              <a:t>Arquitetura e funcionamento</a:t>
+            </a:r>
+          </a:p>
+        </p:txBody>
+      </p:sp>
+      <p:sp>
+        <p:nvSpPr>
+          <p:cNvPr id="3" name="Espaço Reservado para Conteúdo 2">
+            <a:extLst>
+              <a:ext uri="{FF2B5EF4-FFF2-40B4-BE49-F238E27FC236}">
+                <a16:creationId xmlns:a16="http://schemas.microsoft.com/office/drawing/2014/main" id="{D821FAC2-1E85-C05B-1056-B01459165AC9}"/>
+              </a:ext>
+            </a:extLst>
+          </p:cNvPr>
+          <p:cNvSpPr>
+            <a:spLocks noGrp="1"/>
+          </p:cNvSpPr>
+          <p:nvPr>
+            <p:ph idx="1"/>
+          </p:nvPr>
+        </p:nvSpPr>
+        <p:spPr/>
+        <p:txBody>
+          <a:bodyPr anchor="ctr">
+            <a:normAutofit fontScale="92500"/>
+          </a:bodyPr>
+          <a:lstStyle/>
+          <a:p>
+            <a:pPr marL="0" indent="0">
+              <a:buNone/>
+            </a:pPr>
+            <a:r>
+              <a:rPr lang="pt-BR" noProof="0" dirty="0"/>
+              <a:t>O processo segue uma dinâmica evolutiva guiada pelo LLM e pelo QD:</a:t>
+            </a:r>
+          </a:p>
+          <a:p>
+            <a:pPr marL="314325" indent="-314325">
+              <a:buFont typeface="+mj-lt"/>
+              <a:buAutoNum type="arabicPeriod"/>
+            </a:pPr>
+            <a:r>
+              <a:rPr lang="pt-BR" sz="2700" b="1" dirty="0"/>
+              <a:t>Inicialização</a:t>
+            </a:r>
+          </a:p>
+          <a:p>
+            <a:pPr lvl="1"/>
+            <a:r>
+              <a:rPr lang="pt-BR" noProof="0" dirty="0"/>
+              <a:t>Começa com uma rede simples (1 camada convolucional + 1 camada densa).</a:t>
+            </a:r>
+          </a:p>
+          <a:p>
+            <a:pPr lvl="1"/>
+            <a:r>
+              <a:rPr lang="pt-BR" noProof="0" dirty="0"/>
+              <a:t>Gera redes iniciais a partir de prompts aleatórios utilizando </a:t>
+            </a:r>
+            <a:r>
+              <a:rPr lang="pt-BR" noProof="0" dirty="0">
+                <a:solidFill>
+                  <a:schemeClr val="accent6">
+                    <a:lumMod val="75000"/>
+                  </a:schemeClr>
+                </a:solidFill>
+              </a:rPr>
+              <a:t>CodeGen-6.1B</a:t>
+            </a:r>
+            <a:r>
+              <a:rPr lang="pt-BR" noProof="0" dirty="0"/>
+              <a:t>.</a:t>
+            </a:r>
+          </a:p>
+          <a:p>
+            <a:pPr marL="314325" indent="-314325">
+              <a:buFont typeface="+mj-lt"/>
+              <a:buAutoNum type="arabicPeriod"/>
+            </a:pPr>
+            <a:r>
+              <a:rPr lang="pt-BR" sz="2700" b="1" dirty="0"/>
+              <a:t>Evolução</a:t>
+            </a:r>
+          </a:p>
+          <a:p>
+            <a:pPr lvl="1"/>
+            <a:r>
+              <a:rPr lang="pt-BR" noProof="0" dirty="0"/>
+              <a:t>Em cada geração, decide-se aplicar </a:t>
+            </a:r>
+            <a:r>
+              <a:rPr lang="pt-BR" b="1" noProof="0" dirty="0"/>
+              <a:t>mutação (70%)</a:t>
+            </a:r>
+            <a:r>
+              <a:rPr lang="pt-BR" noProof="0" dirty="0"/>
+              <a:t> ou </a:t>
+            </a:r>
+            <a:r>
+              <a:rPr lang="pt-BR" b="1" noProof="0" dirty="0"/>
+              <a:t>crossover (30%)</a:t>
+            </a:r>
+            <a:r>
+              <a:rPr lang="pt-BR" noProof="0" dirty="0"/>
+              <a:t>.</a:t>
+            </a:r>
+          </a:p>
+          <a:p>
+            <a:pPr lvl="1"/>
+            <a:r>
+              <a:rPr lang="pt-BR" b="1" noProof="0" dirty="0"/>
+              <a:t>Mutação</a:t>
+            </a:r>
+            <a:r>
+              <a:rPr lang="pt-BR" noProof="0" dirty="0"/>
+              <a:t>: seleciona um prompt e uma rede, gera uma nova variante de arquitetura.</a:t>
+            </a:r>
+          </a:p>
+          <a:p>
+            <a:pPr lvl="1"/>
+            <a:r>
+              <a:rPr lang="pt-BR" b="1" noProof="0" dirty="0"/>
+              <a:t>Crossover</a:t>
+            </a:r>
+            <a:r>
+              <a:rPr lang="pt-BR" noProof="0" dirty="0"/>
+              <a:t>: combina duas redes semelhantes usando instruções de um prompt fixo.</a:t>
+            </a:r>
+          </a:p>
+          <a:p>
+            <a:pPr lvl="1"/>
+            <a:r>
+              <a:rPr lang="pt-BR" noProof="0" dirty="0"/>
+              <a:t>A temperatura do LLM é ajustada dinamicamente:</a:t>
+            </a:r>
+          </a:p>
+          <a:p>
+            <a:pPr lvl="2"/>
+            <a:r>
+              <a:rPr lang="pt-BR" noProof="0" dirty="0"/>
+              <a:t>↑ se as novas redes superam as anteriores (exploração).</a:t>
+            </a:r>
+          </a:p>
+          <a:p>
+            <a:pPr lvl="2"/>
+            <a:r>
+              <a:rPr lang="pt-BR" noProof="0" dirty="0"/>
+              <a:t>↓ se as redes pioram (exploração mais controlada).</a:t>
+            </a:r>
+          </a:p>
+        </p:txBody>
+      </p:sp>
+    </p:spTree>
+    <p:extLst>
+      <p:ext uri="{BB962C8B-B14F-4D97-AF65-F5344CB8AC3E}">
+        <p14:creationId xmlns:p14="http://schemas.microsoft.com/office/powerpoint/2010/main" val="1202569998"/>
+      </p:ext>
+    </p:extLst>
+  </p:cSld>
+  <p:clrMapOvr>
+    <a:masterClrMapping/>
+  </p:clrMapOvr>
+</p:sld>
+</file>
+
+<file path=ppt/slides/slide14.xml><?xml version="1.0" encoding="utf-8"?>
+<p:sld xmlns:a="http://schemas.openxmlformats.org/drawingml/2006/main" xmlns:r="http://schemas.openxmlformats.org/officeDocument/2006/relationships" xmlns:p="http://schemas.openxmlformats.org/presentationml/2006/main">
+  <p:cSld>
+    <p:spTree>
+      <p:nvGrpSpPr>
+        <p:cNvPr id="1" name="">
+          <a:extLst>
+            <a:ext uri="{FF2B5EF4-FFF2-40B4-BE49-F238E27FC236}">
+              <a16:creationId xmlns:a16="http://schemas.microsoft.com/office/drawing/2014/main" id="{7801CDC1-D56D-E33E-798F-5DCD1007BAE8}"/>
+            </a:ext>
+          </a:extLst>
+        </p:cNvPr>
+        <p:cNvGrpSpPr/>
+        <p:nvPr/>
+      </p:nvGrpSpPr>
+      <p:grpSpPr>
+        <a:xfrm>
+          <a:off x="0" y="0"/>
+          <a:ext cx="0" cy="0"/>
+          <a:chOff x="0" y="0"/>
+          <a:chExt cx="0" cy="0"/>
+        </a:xfrm>
+      </p:grpSpPr>
+      <p:sp>
+        <p:nvSpPr>
+          <p:cNvPr id="2" name="Título 1">
+            <a:extLst>
+              <a:ext uri="{FF2B5EF4-FFF2-40B4-BE49-F238E27FC236}">
+                <a16:creationId xmlns:a16="http://schemas.microsoft.com/office/drawing/2014/main" id="{C828EEA3-2352-15AA-546D-7840AD65D198}"/>
+              </a:ext>
+            </a:extLst>
+          </p:cNvPr>
+          <p:cNvSpPr>
+            <a:spLocks noGrp="1"/>
+          </p:cNvSpPr>
+          <p:nvPr>
+            <p:ph type="title"/>
+          </p:nvPr>
+        </p:nvSpPr>
+        <p:spPr/>
+        <p:txBody>
+          <a:bodyPr/>
+          <a:lstStyle/>
+          <a:p>
+            <a:r>
+              <a:rPr lang="pt-BR" noProof="0" dirty="0"/>
+              <a:t>Arquitetura e funcionamento</a:t>
+            </a:r>
+          </a:p>
+        </p:txBody>
+      </p:sp>
+      <p:sp>
+        <p:nvSpPr>
+          <p:cNvPr id="3" name="Espaço Reservado para Conteúdo 2">
+            <a:extLst>
+              <a:ext uri="{FF2B5EF4-FFF2-40B4-BE49-F238E27FC236}">
+                <a16:creationId xmlns:a16="http://schemas.microsoft.com/office/drawing/2014/main" id="{95820A2F-4FF4-6A9E-BDB2-3C5B9937A73C}"/>
+              </a:ext>
+            </a:extLst>
+          </p:cNvPr>
+          <p:cNvSpPr>
+            <a:spLocks noGrp="1"/>
+          </p:cNvSpPr>
+          <p:nvPr>
+            <p:ph idx="1"/>
+          </p:nvPr>
+        </p:nvSpPr>
+        <p:spPr/>
+        <p:txBody>
+          <a:bodyPr anchor="ctr">
+            <a:normAutofit lnSpcReduction="10000"/>
+          </a:bodyPr>
+          <a:lstStyle/>
+          <a:p>
+            <a:pPr marL="0" indent="0">
+              <a:buNone/>
+            </a:pPr>
+            <a:r>
+              <a:rPr lang="pt-BR" noProof="0" dirty="0"/>
+              <a:t>O processo segue uma dinâmica evolutiva guiada pelo LLM e pelo QD:</a:t>
+            </a:r>
+          </a:p>
+          <a:p>
+            <a:pPr marL="514350" indent="-514350">
+              <a:buFont typeface="+mj-lt"/>
+              <a:buAutoNum type="arabicPeriod" startAt="3"/>
+            </a:pPr>
+            <a:r>
+              <a:rPr lang="pt-BR" sz="2700" b="1" dirty="0"/>
+              <a:t>Treino e Avaliação</a:t>
+            </a:r>
+          </a:p>
+          <a:p>
+            <a:pPr lvl="1"/>
+            <a:r>
+              <a:rPr lang="pt-BR" noProof="0" dirty="0"/>
+              <a:t>Cada rede é treinada por algumas épocas no </a:t>
+            </a:r>
+            <a:r>
+              <a:rPr lang="pt-BR" noProof="0" dirty="0" err="1"/>
+              <a:t>dataset</a:t>
+            </a:r>
+            <a:r>
+              <a:rPr lang="pt-BR" noProof="0" dirty="0"/>
+              <a:t> alvo (inicialmente CIFAR-10 e, posteriormente </a:t>
+            </a:r>
+            <a:r>
+              <a:rPr lang="pt-BR" noProof="0" dirty="0" err="1"/>
+              <a:t>extendido</a:t>
+            </a:r>
+            <a:r>
+              <a:rPr lang="pt-BR" noProof="0" dirty="0"/>
+              <a:t> para </a:t>
+            </a:r>
+            <a:r>
+              <a:rPr lang="en-US" dirty="0"/>
+              <a:t>NAS-Bench-201</a:t>
+            </a:r>
+            <a:r>
+              <a:rPr lang="pt-BR" noProof="0" dirty="0"/>
+              <a:t>).</a:t>
+            </a:r>
+          </a:p>
+          <a:p>
+            <a:pPr lvl="1"/>
+            <a:r>
+              <a:rPr lang="pt-BR" noProof="0" dirty="0"/>
+              <a:t>O desempenho (acurácia) determina se ela entra no </a:t>
+            </a:r>
+            <a:r>
+              <a:rPr lang="pt-BR" b="1" noProof="0" dirty="0"/>
+              <a:t>Network </a:t>
+            </a:r>
+            <a:r>
+              <a:rPr lang="pt-BR" b="1" noProof="0" dirty="0" err="1"/>
+              <a:t>Archive</a:t>
+            </a:r>
+            <a:r>
+              <a:rPr lang="pt-BR" noProof="0" dirty="0"/>
+              <a:t>.</a:t>
+            </a:r>
+          </a:p>
+          <a:p>
+            <a:pPr lvl="1"/>
+            <a:r>
+              <a:rPr lang="pt-BR" noProof="0" dirty="0"/>
+              <a:t>O prompt responsável é avaliado e, se for útil, adicionado ao </a:t>
+            </a:r>
+            <a:r>
+              <a:rPr lang="pt-BR" b="1" noProof="0" dirty="0"/>
+              <a:t>Prompt </a:t>
+            </a:r>
+            <a:r>
+              <a:rPr lang="pt-BR" b="1" noProof="0" dirty="0" err="1"/>
+              <a:t>Archive</a:t>
+            </a:r>
+            <a:r>
+              <a:rPr lang="pt-BR" noProof="0" dirty="0"/>
+              <a:t>.</a:t>
+            </a:r>
+          </a:p>
+          <a:p>
+            <a:pPr marL="514350" indent="-514350">
+              <a:buFont typeface="+mj-lt"/>
+              <a:buAutoNum type="arabicPeriod" startAt="3"/>
+            </a:pPr>
+            <a:r>
+              <a:rPr lang="pt-BR" sz="2700" b="1" dirty="0" err="1"/>
+              <a:t>Quality</a:t>
+            </a:r>
+            <a:r>
+              <a:rPr lang="pt-BR" sz="2700" b="1" dirty="0"/>
+              <a:t> </a:t>
+            </a:r>
+            <a:r>
+              <a:rPr lang="pt-BR" sz="2700" b="1" dirty="0" err="1"/>
+              <a:t>Diversity</a:t>
+            </a:r>
+            <a:r>
+              <a:rPr lang="pt-BR" sz="2700" b="1" dirty="0"/>
+              <a:t> (QD)</a:t>
+            </a:r>
+          </a:p>
+          <a:p>
+            <a:pPr lvl="1"/>
+            <a:r>
+              <a:rPr lang="pt-BR" noProof="0" dirty="0"/>
+              <a:t>O algoritmo usado é o </a:t>
+            </a:r>
+            <a:r>
+              <a:rPr lang="pt-BR" b="1" noProof="0" dirty="0"/>
+              <a:t>CVT-MAP-Elites</a:t>
+            </a:r>
+            <a:r>
+              <a:rPr lang="pt-BR" noProof="0" dirty="0"/>
+              <a:t>, que organiza os indivíduos em nichos (células) no espaço de descritores.</a:t>
+            </a:r>
+          </a:p>
+          <a:p>
+            <a:pPr lvl="1"/>
+            <a:r>
+              <a:rPr lang="pt-BR" noProof="0" dirty="0"/>
+              <a:t>Isso garante não só alta performance, mas também </a:t>
+            </a:r>
+            <a:r>
+              <a:rPr lang="pt-BR" b="1" noProof="0" dirty="0"/>
+              <a:t>diversidade</a:t>
+            </a:r>
+            <a:r>
+              <a:rPr lang="pt-BR" noProof="0" dirty="0"/>
+              <a:t> de arquiteturas (redes pequenas, médias e grandes, por exemplo).</a:t>
+            </a:r>
+          </a:p>
+        </p:txBody>
+      </p:sp>
+    </p:spTree>
+    <p:extLst>
+      <p:ext uri="{BB962C8B-B14F-4D97-AF65-F5344CB8AC3E}">
+        <p14:creationId xmlns:p14="http://schemas.microsoft.com/office/powerpoint/2010/main" val="2293732587"/>
+      </p:ext>
+    </p:extLst>
+  </p:cSld>
+  <p:clrMapOvr>
+    <a:masterClrMapping/>
+  </p:clrMapOvr>
+</p:sld>
+</file>
+
+<file path=ppt/slides/slide15.xml><?xml version="1.0" encoding="utf-8"?>
+<p:sld xmlns:a="http://schemas.openxmlformats.org/drawingml/2006/main" xmlns:r="http://schemas.openxmlformats.org/officeDocument/2006/relationships" xmlns:p="http://schemas.openxmlformats.org/presentationml/2006/main">
+  <p:cSld>
+    <p:spTree>
+      <p:nvGrpSpPr>
+        <p:cNvPr id="1" name="">
+          <a:extLst>
+            <a:ext uri="{FF2B5EF4-FFF2-40B4-BE49-F238E27FC236}">
               <a16:creationId xmlns:a16="http://schemas.microsoft.com/office/drawing/2014/main" id="{E1C9F56A-97FC-7CCD-E5BA-3B5E230AD9AB}"/>
             </a:ext>
           </a:extLst>
@@ -5339,10 +6813,41 @@
         </p:nvSpPr>
         <p:spPr/>
         <p:txBody>
-          <a:bodyPr/>
-          <a:lstStyle/>
-          <a:p>
-            <a:endParaRPr lang="pt-BR" noProof="0" dirty="0"/>
+          <a:bodyPr anchor="ctr"/>
+          <a:lstStyle/>
+          <a:p>
+            <a:pPr marL="0" indent="0">
+              <a:buNone/>
+            </a:pPr>
+            <a:r>
+              <a:rPr lang="pt-BR" noProof="0" dirty="0"/>
+              <a:t>No caso do NAS, toda vez que um candidato é considerado promissor, o treinamento.</a:t>
+            </a:r>
+          </a:p>
+          <a:p>
+            <a:pPr marL="0" indent="0">
+              <a:buNone/>
+            </a:pPr>
+            <a:r>
+              <a:rPr lang="pt-BR" noProof="0" dirty="0"/>
+              <a:t>Cada rede gerada pelo </a:t>
+            </a:r>
+            <a:r>
+              <a:rPr lang="pt-BR" noProof="0" dirty="0" err="1"/>
+              <a:t>LLMatic</a:t>
+            </a:r>
+            <a:r>
+              <a:rPr lang="pt-BR" noProof="0" dirty="0"/>
+              <a:t> passa por um </a:t>
+            </a:r>
+            <a:r>
+              <a:rPr lang="pt-BR" b="1" noProof="0" dirty="0"/>
+              <a:t>treinamento supervisionado padrão </a:t>
+            </a:r>
+            <a:r>
+              <a:rPr lang="pt-BR" noProof="0" dirty="0"/>
+              <a:t>(quando válida), mas com recursos controlados para eficiência:</a:t>
+            </a:r>
           </a:p>
         </p:txBody>
       </p:sp>
@@ -5359,7 +6864,441 @@
 </p:sld>
 </file>
 
-<file path=ppt/slides/slide11.xml><?xml version="1.0" encoding="utf-8"?>
+<file path=ppt/slides/slide16.xml><?xml version="1.0" encoding="utf-8"?>
+<p:sld xmlns:a="http://schemas.openxmlformats.org/drawingml/2006/main" xmlns:r="http://schemas.openxmlformats.org/officeDocument/2006/relationships" xmlns:p="http://schemas.openxmlformats.org/presentationml/2006/main">
+  <p:cSld>
+    <p:spTree>
+      <p:nvGrpSpPr>
+        <p:cNvPr id="1" name="">
+          <a:extLst>
+            <a:ext uri="{FF2B5EF4-FFF2-40B4-BE49-F238E27FC236}">
+              <a16:creationId xmlns:a16="http://schemas.microsoft.com/office/drawing/2014/main" id="{6967343E-40DE-7560-6E6B-E281A0459AF2}"/>
+            </a:ext>
+          </a:extLst>
+        </p:cNvPr>
+        <p:cNvGrpSpPr/>
+        <p:nvPr/>
+      </p:nvGrpSpPr>
+      <p:grpSpPr>
+        <a:xfrm>
+          <a:off x="0" y="0"/>
+          <a:ext cx="0" cy="0"/>
+          <a:chOff x="0" y="0"/>
+          <a:chExt cx="0" cy="0"/>
+        </a:xfrm>
+      </p:grpSpPr>
+      <p:sp>
+        <p:nvSpPr>
+          <p:cNvPr id="2" name="Título 1">
+            <a:extLst>
+              <a:ext uri="{FF2B5EF4-FFF2-40B4-BE49-F238E27FC236}">
+                <a16:creationId xmlns:a16="http://schemas.microsoft.com/office/drawing/2014/main" id="{3FBE8DA1-EEEF-F464-095C-FBB8E8228A19}"/>
+              </a:ext>
+            </a:extLst>
+          </p:cNvPr>
+          <p:cNvSpPr>
+            <a:spLocks noGrp="1"/>
+          </p:cNvSpPr>
+          <p:nvPr>
+            <p:ph type="title"/>
+          </p:nvPr>
+        </p:nvSpPr>
+        <p:spPr/>
+        <p:txBody>
+          <a:bodyPr/>
+          <a:lstStyle/>
+          <a:p>
+            <a:r>
+              <a:rPr lang="pt-BR" noProof="0" dirty="0"/>
+              <a:t>Treinamento e otimização</a:t>
+            </a:r>
+          </a:p>
+        </p:txBody>
+      </p:sp>
+      <p:sp>
+        <p:nvSpPr>
+          <p:cNvPr id="3" name="Espaço Reservado para Conteúdo 2">
+            <a:extLst>
+              <a:ext uri="{FF2B5EF4-FFF2-40B4-BE49-F238E27FC236}">
+                <a16:creationId xmlns:a16="http://schemas.microsoft.com/office/drawing/2014/main" id="{755D7CBB-3F87-602D-CDB0-2B4DB4338263}"/>
+              </a:ext>
+            </a:extLst>
+          </p:cNvPr>
+          <p:cNvSpPr>
+            <a:spLocks noGrp="1"/>
+          </p:cNvSpPr>
+          <p:nvPr>
+            <p:ph idx="1"/>
+          </p:nvPr>
+        </p:nvSpPr>
+        <p:spPr/>
+        <p:txBody>
+          <a:bodyPr anchor="ctr">
+            <a:normAutofit/>
+          </a:bodyPr>
+          <a:lstStyle/>
+          <a:p>
+            <a:pPr marL="446088" indent="-446088">
+              <a:buFont typeface="+mj-lt"/>
+              <a:buAutoNum type="arabicPeriod"/>
+            </a:pPr>
+            <a:r>
+              <a:rPr lang="pt-BR" b="1" noProof="0" dirty="0"/>
+              <a:t>Configuração da rede inicial</a:t>
+            </a:r>
+            <a:endParaRPr lang="pt-BR" noProof="0" dirty="0"/>
+          </a:p>
+          <a:p>
+            <a:pPr lvl="1"/>
+            <a:r>
+              <a:rPr lang="pt-BR" noProof="0" dirty="0"/>
+              <a:t>Uma convolução (3 canais de entrada, kernel 1x1, 1 saída).</a:t>
+            </a:r>
+          </a:p>
+          <a:p>
+            <a:pPr lvl="1"/>
+            <a:r>
+              <a:rPr lang="pt-BR" noProof="0" dirty="0"/>
+              <a:t>Uma camada densa com 1024 neurônios conectada a 10 saídas (classes).</a:t>
+            </a:r>
+          </a:p>
+          <a:p>
+            <a:pPr lvl="1"/>
+            <a:r>
+              <a:rPr lang="pt-BR" noProof="0" dirty="0"/>
+              <a:t>Ativação: </a:t>
+            </a:r>
+            <a:r>
+              <a:rPr lang="pt-BR" b="1" noProof="0" dirty="0" err="1"/>
+              <a:t>ReLU</a:t>
+            </a:r>
+            <a:r>
+              <a:rPr lang="pt-BR" noProof="0" dirty="0"/>
+              <a:t> em todas as camadas.</a:t>
+            </a:r>
+          </a:p>
+          <a:p>
+            <a:pPr marL="446088" indent="-446088">
+              <a:buFont typeface="+mj-lt"/>
+              <a:buAutoNum type="arabicPeriod"/>
+            </a:pPr>
+            <a:r>
+              <a:rPr lang="pt-BR" b="1" dirty="0"/>
+              <a:t>Treinamento de cada candidato</a:t>
+            </a:r>
+          </a:p>
+          <a:p>
+            <a:pPr lvl="1"/>
+            <a:r>
+              <a:rPr lang="pt-BR" b="1" noProof="0" dirty="0"/>
+              <a:t>Número de épocas</a:t>
+            </a:r>
+            <a:r>
+              <a:rPr lang="pt-BR" noProof="0" dirty="0"/>
+              <a:t>: 50.</a:t>
+            </a:r>
+          </a:p>
+          <a:p>
+            <a:pPr lvl="1"/>
+            <a:r>
+              <a:rPr lang="pt-BR" b="1" noProof="0" dirty="0"/>
+              <a:t>Otimizador</a:t>
+            </a:r>
+            <a:r>
+              <a:rPr lang="pt-BR" noProof="0" dirty="0"/>
+              <a:t>: SGD (</a:t>
+            </a:r>
+            <a:r>
+              <a:rPr lang="pt-BR" noProof="0" dirty="0" err="1"/>
+              <a:t>Stochastic</a:t>
+            </a:r>
+            <a:r>
+              <a:rPr lang="pt-BR" noProof="0" dirty="0"/>
+              <a:t> </a:t>
+            </a:r>
+            <a:r>
+              <a:rPr lang="pt-BR" noProof="0" dirty="0" err="1"/>
+              <a:t>Gradient</a:t>
+            </a:r>
+            <a:r>
+              <a:rPr lang="pt-BR" noProof="0" dirty="0"/>
+              <a:t> </a:t>
+            </a:r>
+            <a:r>
+              <a:rPr lang="pt-BR" noProof="0" dirty="0" err="1"/>
+              <a:t>Descent</a:t>
+            </a:r>
+            <a:r>
+              <a:rPr lang="pt-BR" noProof="0" dirty="0"/>
+              <a:t>).</a:t>
+            </a:r>
+          </a:p>
+          <a:p>
+            <a:pPr lvl="2"/>
+            <a:r>
+              <a:rPr lang="pt-BR" b="1" noProof="0" dirty="0"/>
+              <a:t>Taxa de aprendizado (</a:t>
+            </a:r>
+            <a:r>
+              <a:rPr lang="pt-BR" b="1" noProof="0" dirty="0" err="1"/>
+              <a:t>lr</a:t>
+            </a:r>
+            <a:r>
+              <a:rPr lang="pt-BR" b="1" noProof="0" dirty="0"/>
+              <a:t>)</a:t>
+            </a:r>
+            <a:r>
+              <a:rPr lang="pt-BR" noProof="0" dirty="0"/>
+              <a:t> = 0.001</a:t>
+            </a:r>
+          </a:p>
+          <a:p>
+            <a:pPr lvl="2"/>
+            <a:r>
+              <a:rPr lang="pt-BR" b="1" noProof="0" dirty="0"/>
+              <a:t>Momentum</a:t>
+            </a:r>
+            <a:r>
+              <a:rPr lang="pt-BR" noProof="0" dirty="0"/>
+              <a:t> = 0.9</a:t>
+            </a:r>
+          </a:p>
+          <a:p>
+            <a:pPr lvl="1"/>
+            <a:r>
+              <a:rPr lang="pt-BR" b="1" noProof="0" dirty="0" err="1"/>
+              <a:t>Loss</a:t>
+            </a:r>
+            <a:r>
+              <a:rPr lang="pt-BR" b="1" noProof="0" dirty="0"/>
+              <a:t> </a:t>
+            </a:r>
+            <a:r>
+              <a:rPr lang="pt-BR" b="1" noProof="0" dirty="0" err="1"/>
+              <a:t>function</a:t>
+            </a:r>
+            <a:r>
+              <a:rPr lang="pt-BR" noProof="0" dirty="0"/>
+              <a:t>: Cross-</a:t>
+            </a:r>
+            <a:r>
+              <a:rPr lang="pt-BR" noProof="0" dirty="0" err="1"/>
+              <a:t>Entropy</a:t>
+            </a:r>
+            <a:r>
+              <a:rPr lang="pt-BR" noProof="0" dirty="0"/>
+              <a:t> </a:t>
+            </a:r>
+            <a:r>
+              <a:rPr lang="pt-BR" noProof="0" dirty="0" err="1"/>
+              <a:t>Loss</a:t>
+            </a:r>
+            <a:r>
+              <a:rPr lang="pt-BR" noProof="0" dirty="0"/>
+              <a:t>.</a:t>
+            </a:r>
+          </a:p>
+        </p:txBody>
+      </p:sp>
+    </p:spTree>
+    <p:extLst>
+      <p:ext uri="{BB962C8B-B14F-4D97-AF65-F5344CB8AC3E}">
+        <p14:creationId xmlns:p14="http://schemas.microsoft.com/office/powerpoint/2010/main" val="3495645898"/>
+      </p:ext>
+    </p:extLst>
+  </p:cSld>
+  <p:clrMapOvr>
+    <a:masterClrMapping/>
+  </p:clrMapOvr>
+</p:sld>
+</file>
+
+<file path=ppt/slides/slide17.xml><?xml version="1.0" encoding="utf-8"?>
+<p:sld xmlns:a="http://schemas.openxmlformats.org/drawingml/2006/main" xmlns:r="http://schemas.openxmlformats.org/officeDocument/2006/relationships" xmlns:p="http://schemas.openxmlformats.org/presentationml/2006/main">
+  <p:cSld>
+    <p:spTree>
+      <p:nvGrpSpPr>
+        <p:cNvPr id="1" name="">
+          <a:extLst>
+            <a:ext uri="{FF2B5EF4-FFF2-40B4-BE49-F238E27FC236}">
+              <a16:creationId xmlns:a16="http://schemas.microsoft.com/office/drawing/2014/main" id="{3147467F-41CC-1416-DF5D-4E8929A686EF}"/>
+            </a:ext>
+          </a:extLst>
+        </p:cNvPr>
+        <p:cNvGrpSpPr/>
+        <p:nvPr/>
+      </p:nvGrpSpPr>
+      <p:grpSpPr>
+        <a:xfrm>
+          <a:off x="0" y="0"/>
+          <a:ext cx="0" cy="0"/>
+          <a:chOff x="0" y="0"/>
+          <a:chExt cx="0" cy="0"/>
+        </a:xfrm>
+      </p:grpSpPr>
+      <p:sp>
+        <p:nvSpPr>
+          <p:cNvPr id="2" name="Título 1">
+            <a:extLst>
+              <a:ext uri="{FF2B5EF4-FFF2-40B4-BE49-F238E27FC236}">
+                <a16:creationId xmlns:a16="http://schemas.microsoft.com/office/drawing/2014/main" id="{97F33A22-E7D9-9164-7762-2B9B826643F4}"/>
+              </a:ext>
+            </a:extLst>
+          </p:cNvPr>
+          <p:cNvSpPr>
+            <a:spLocks noGrp="1"/>
+          </p:cNvSpPr>
+          <p:nvPr>
+            <p:ph type="title"/>
+          </p:nvPr>
+        </p:nvSpPr>
+        <p:spPr/>
+        <p:txBody>
+          <a:bodyPr/>
+          <a:lstStyle/>
+          <a:p>
+            <a:r>
+              <a:rPr lang="pt-BR" noProof="0" dirty="0"/>
+              <a:t>Treinamento e otimização</a:t>
+            </a:r>
+          </a:p>
+        </p:txBody>
+      </p:sp>
+      <p:sp>
+        <p:nvSpPr>
+          <p:cNvPr id="3" name="Espaço Reservado para Conteúdo 2">
+            <a:extLst>
+              <a:ext uri="{FF2B5EF4-FFF2-40B4-BE49-F238E27FC236}">
+                <a16:creationId xmlns:a16="http://schemas.microsoft.com/office/drawing/2014/main" id="{FA52D896-EB98-E818-F60D-44192973DEA9}"/>
+              </a:ext>
+            </a:extLst>
+          </p:cNvPr>
+          <p:cNvSpPr>
+            <a:spLocks noGrp="1"/>
+          </p:cNvSpPr>
+          <p:nvPr>
+            <p:ph idx="1"/>
+          </p:nvPr>
+        </p:nvSpPr>
+        <p:spPr/>
+        <p:txBody>
+          <a:bodyPr anchor="t">
+            <a:normAutofit/>
+          </a:bodyPr>
+          <a:lstStyle/>
+          <a:p>
+            <a:pPr marL="525462" indent="-514350">
+              <a:buFont typeface="+mj-lt"/>
+              <a:buAutoNum type="arabicPeriod" startAt="3"/>
+            </a:pPr>
+            <a:r>
+              <a:rPr lang="pt-BR" sz="2900" b="1" noProof="0" dirty="0"/>
+              <a:t>Avaliação (Fitness)</a:t>
+            </a:r>
+          </a:p>
+          <a:p>
+            <a:pPr lvl="1"/>
+            <a:r>
+              <a:rPr lang="pt-BR" noProof="0" dirty="0"/>
+              <a:t>O desempenho é medido pela </a:t>
+            </a:r>
+            <a:r>
+              <a:rPr lang="pt-BR" b="1" noProof="0" dirty="0"/>
+              <a:t>acurácia no conjunto de teste</a:t>
+            </a:r>
+            <a:r>
+              <a:rPr lang="pt-BR" noProof="0" dirty="0"/>
+              <a:t>.</a:t>
+            </a:r>
+          </a:p>
+          <a:p>
+            <a:pPr lvl="1"/>
+            <a:r>
+              <a:rPr lang="pt-BR" noProof="0" dirty="0"/>
+              <a:t>Esse valor é usado como </a:t>
+            </a:r>
+            <a:r>
+              <a:rPr lang="pt-BR" b="1" noProof="0" dirty="0"/>
+              <a:t>fitness</a:t>
+            </a:r>
+            <a:r>
+              <a:rPr lang="pt-BR" noProof="0" dirty="0"/>
+              <a:t> no </a:t>
+            </a:r>
+            <a:r>
+              <a:rPr lang="pt-BR" b="1" noProof="0" dirty="0"/>
+              <a:t>Network </a:t>
+            </a:r>
+            <a:r>
+              <a:rPr lang="pt-BR" b="1" noProof="0" dirty="0" err="1"/>
+              <a:t>Archive</a:t>
+            </a:r>
+            <a:r>
+              <a:rPr lang="pt-BR" noProof="0" dirty="0"/>
+              <a:t>.</a:t>
+            </a:r>
+          </a:p>
+          <a:p>
+            <a:pPr marL="495300" indent="-484188">
+              <a:buFont typeface="+mj-lt"/>
+              <a:buAutoNum type="arabicPeriod" startAt="3"/>
+            </a:pPr>
+            <a:r>
+              <a:rPr lang="pt-BR" sz="2900" b="1" dirty="0"/>
+              <a:t>Atualização do Prompt </a:t>
+            </a:r>
+            <a:r>
+              <a:rPr lang="pt-BR" sz="2900" b="1" dirty="0" err="1"/>
+              <a:t>Archive</a:t>
+            </a:r>
+            <a:endParaRPr lang="pt-BR" sz="2900" b="1" dirty="0"/>
+          </a:p>
+          <a:p>
+            <a:pPr lvl="1"/>
+            <a:r>
+              <a:rPr lang="pt-BR" noProof="0" dirty="0"/>
+              <a:t>Se o prompt gerou uma rede que entrou no Network </a:t>
+            </a:r>
+            <a:r>
+              <a:rPr lang="pt-BR" noProof="0" dirty="0" err="1"/>
+              <a:t>Archive</a:t>
+            </a:r>
+            <a:r>
+              <a:rPr lang="pt-BR" noProof="0" dirty="0"/>
+              <a:t> ou superou a geração anterior, seu </a:t>
+            </a:r>
+            <a:r>
+              <a:rPr lang="pt-BR" b="1" noProof="0" dirty="0"/>
+              <a:t>fitness aumenta</a:t>
+            </a:r>
+            <a:r>
+              <a:rPr lang="pt-BR" noProof="0" dirty="0"/>
+              <a:t>.</a:t>
+            </a:r>
+          </a:p>
+          <a:p>
+            <a:pPr lvl="1"/>
+            <a:r>
+              <a:rPr lang="pt-BR" noProof="0" dirty="0"/>
+              <a:t>Caso contrário, o fitness cai, e a curiosidade associada ao prompt também diminui.</a:t>
+            </a:r>
+          </a:p>
+        </p:txBody>
+      </p:sp>
+    </p:spTree>
+    <p:extLst>
+      <p:ext uri="{BB962C8B-B14F-4D97-AF65-F5344CB8AC3E}">
+        <p14:creationId xmlns:p14="http://schemas.microsoft.com/office/powerpoint/2010/main" val="3348551742"/>
+      </p:ext>
+    </p:extLst>
+  </p:cSld>
+  <p:clrMapOvr>
+    <a:masterClrMapping/>
+  </p:clrMapOvr>
+</p:sld>
+</file>
+
+<file path=ppt/slides/slide18.xml><?xml version="1.0" encoding="utf-8"?>
 <p:sld xmlns:a="http://schemas.openxmlformats.org/drawingml/2006/main" xmlns:r="http://schemas.openxmlformats.org/officeDocument/2006/relationships" xmlns:p="http://schemas.openxmlformats.org/presentationml/2006/main">
   <p:cSld>
     <p:spTree>
@@ -5448,7 +7387,7 @@
 </p:sld>
 </file>
 
-<file path=ppt/slides/slide12.xml><?xml version="1.0" encoding="utf-8"?>
+<file path=ppt/slides/slide19.xml><?xml version="1.0" encoding="utf-8"?>
 <p:sld xmlns:a="http://schemas.openxmlformats.org/drawingml/2006/main" xmlns:r="http://schemas.openxmlformats.org/officeDocument/2006/relationships" xmlns:p="http://schemas.openxmlformats.org/presentationml/2006/main">
   <p:cSld>
     <p:spTree>
@@ -5530,344 +7469,6 @@
     <p:extLst>
       <p:ext uri="{BB962C8B-B14F-4D97-AF65-F5344CB8AC3E}">
         <p14:creationId xmlns:p14="http://schemas.microsoft.com/office/powerpoint/2010/main" val="1532530965"/>
-      </p:ext>
-    </p:extLst>
-  </p:cSld>
-  <p:clrMapOvr>
-    <a:masterClrMapping/>
-  </p:clrMapOvr>
-</p:sld>
-</file>
-
-<file path=ppt/slides/slide13.xml><?xml version="1.0" encoding="utf-8"?>
-<p:sld xmlns:a="http://schemas.openxmlformats.org/drawingml/2006/main" xmlns:r="http://schemas.openxmlformats.org/officeDocument/2006/relationships" xmlns:p="http://schemas.openxmlformats.org/presentationml/2006/main">
-  <p:cSld>
-    <p:spTree>
-      <p:nvGrpSpPr>
-        <p:cNvPr id="1" name=""/>
-        <p:cNvGrpSpPr/>
-        <p:nvPr/>
-      </p:nvGrpSpPr>
-      <p:grpSpPr>
-        <a:xfrm>
-          <a:off x="0" y="0"/>
-          <a:ext cx="0" cy="0"/>
-          <a:chOff x="0" y="0"/>
-          <a:chExt cx="0" cy="0"/>
-        </a:xfrm>
-      </p:grpSpPr>
-      <p:sp>
-        <p:nvSpPr>
-          <p:cNvPr id="2" name="Título 1">
-            <a:extLst>
-              <a:ext uri="{FF2B5EF4-FFF2-40B4-BE49-F238E27FC236}">
-                <a16:creationId xmlns:a16="http://schemas.microsoft.com/office/drawing/2014/main" id="{B7EBC8F7-03EF-338A-A90B-280A41AF9688}"/>
-              </a:ext>
-            </a:extLst>
-          </p:cNvPr>
-          <p:cNvSpPr>
-            <a:spLocks noGrp="1"/>
-          </p:cNvSpPr>
-          <p:nvPr>
-            <p:ph type="title"/>
-          </p:nvPr>
-        </p:nvSpPr>
-        <p:spPr/>
-        <p:txBody>
-          <a:bodyPr/>
-          <a:lstStyle/>
-          <a:p>
-            <a:r>
-              <a:rPr lang="pt-BR" noProof="0" dirty="0"/>
-              <a:t>Comparação com outros algoritmos</a:t>
-            </a:r>
-          </a:p>
-        </p:txBody>
-      </p:sp>
-      <p:sp>
-        <p:nvSpPr>
-          <p:cNvPr id="3" name="Espaço Reservado para Conteúdo 2">
-            <a:extLst>
-              <a:ext uri="{FF2B5EF4-FFF2-40B4-BE49-F238E27FC236}">
-                <a16:creationId xmlns:a16="http://schemas.microsoft.com/office/drawing/2014/main" id="{C525BCE7-C19D-7DDA-016A-E3016C398CBA}"/>
-              </a:ext>
-            </a:extLst>
-          </p:cNvPr>
-          <p:cNvSpPr>
-            <a:spLocks noGrp="1"/>
-          </p:cNvSpPr>
-          <p:nvPr>
-            <p:ph idx="1"/>
-          </p:nvPr>
-        </p:nvSpPr>
-        <p:spPr/>
-        <p:txBody>
-          <a:bodyPr/>
-          <a:lstStyle/>
-          <a:p>
-            <a:endParaRPr lang="pt-BR" noProof="0" dirty="0"/>
-          </a:p>
-        </p:txBody>
-      </p:sp>
-    </p:spTree>
-    <p:extLst>
-      <p:ext uri="{BB962C8B-B14F-4D97-AF65-F5344CB8AC3E}">
-        <p14:creationId xmlns:p14="http://schemas.microsoft.com/office/powerpoint/2010/main" val="3601469261"/>
-      </p:ext>
-    </p:extLst>
-  </p:cSld>
-  <p:clrMapOvr>
-    <a:masterClrMapping/>
-  </p:clrMapOvr>
-</p:sld>
-</file>
-
-<file path=ppt/slides/slide14.xml><?xml version="1.0" encoding="utf-8"?>
-<p:sld xmlns:a="http://schemas.openxmlformats.org/drawingml/2006/main" xmlns:r="http://schemas.openxmlformats.org/officeDocument/2006/relationships" xmlns:p="http://schemas.openxmlformats.org/presentationml/2006/main">
-  <p:cSld>
-    <p:spTree>
-      <p:nvGrpSpPr>
-        <p:cNvPr id="1" name=""/>
-        <p:cNvGrpSpPr/>
-        <p:nvPr/>
-      </p:nvGrpSpPr>
-      <p:grpSpPr>
-        <a:xfrm>
-          <a:off x="0" y="0"/>
-          <a:ext cx="0" cy="0"/>
-          <a:chOff x="0" y="0"/>
-          <a:chExt cx="0" cy="0"/>
-        </a:xfrm>
-      </p:grpSpPr>
-      <p:sp>
-        <p:nvSpPr>
-          <p:cNvPr id="4" name="Título 1">
-            <a:extLst>
-              <a:ext uri="{FF2B5EF4-FFF2-40B4-BE49-F238E27FC236}">
-                <a16:creationId xmlns:a16="http://schemas.microsoft.com/office/drawing/2014/main" id="{32666AC8-2E17-4DB4-B0F5-60C640CCFD2E}"/>
-              </a:ext>
-            </a:extLst>
-          </p:cNvPr>
-          <p:cNvSpPr txBox="1">
-            <a:spLocks/>
-          </p:cNvSpPr>
-          <p:nvPr/>
-        </p:nvSpPr>
-        <p:spPr>
-          <a:xfrm>
-            <a:off x="1431533" y="2720526"/>
-            <a:ext cx="9144000" cy="1029541"/>
-          </a:xfrm>
-          <a:prstGeom prst="rect">
-            <a:avLst/>
-          </a:prstGeom>
-        </p:spPr>
-        <p:txBody>
-          <a:bodyPr vert="horz" lIns="91440" tIns="45720" rIns="91440" bIns="45720" rtlCol="0" anchor="ctr">
-            <a:normAutofit/>
-          </a:bodyPr>
-          <a:lstStyle>
-            <a:lvl1pPr algn="l" defTabSz="914400" rtl="0" eaLnBrk="1" latinLnBrk="0" hangingPunct="1">
-              <a:lnSpc>
-                <a:spcPct val="90000"/>
-              </a:lnSpc>
-              <a:spcBef>
-                <a:spcPct val="0"/>
-              </a:spcBef>
-              <a:buNone/>
-              <a:defRPr sz="4400" kern="1200">
-                <a:solidFill>
-                  <a:schemeClr val="tx1"/>
-                </a:solidFill>
-                <a:latin typeface="+mj-lt"/>
-                <a:ea typeface="+mj-ea"/>
-                <a:cs typeface="+mj-cs"/>
-              </a:defRPr>
-            </a:lvl1pPr>
-          </a:lstStyle>
-          <a:p>
-            <a:pPr algn="ctr"/>
-            <a:r>
-              <a:rPr lang="pt-BR" sz="6600" noProof="0" dirty="0"/>
-              <a:t>Perguntas?</a:t>
-            </a:r>
-            <a:endParaRPr lang="pt-BR" sz="6600" b="1" i="1" noProof="0" dirty="0"/>
-          </a:p>
-        </p:txBody>
-      </p:sp>
-    </p:spTree>
-    <p:extLst>
-      <p:ext uri="{BB962C8B-B14F-4D97-AF65-F5344CB8AC3E}">
-        <p14:creationId xmlns:p14="http://schemas.microsoft.com/office/powerpoint/2010/main" val="3773005660"/>
-      </p:ext>
-    </p:extLst>
-  </p:cSld>
-  <p:clrMapOvr>
-    <a:masterClrMapping/>
-  </p:clrMapOvr>
-</p:sld>
-</file>
-
-<file path=ppt/slides/slide15.xml><?xml version="1.0" encoding="utf-8"?>
-<p:sld xmlns:a="http://schemas.openxmlformats.org/drawingml/2006/main" xmlns:r="http://schemas.openxmlformats.org/officeDocument/2006/relationships" xmlns:p="http://schemas.openxmlformats.org/presentationml/2006/main">
-  <p:cSld>
-    <p:spTree>
-      <p:nvGrpSpPr>
-        <p:cNvPr id="1" name=""/>
-        <p:cNvGrpSpPr/>
-        <p:nvPr/>
-      </p:nvGrpSpPr>
-      <p:grpSpPr>
-        <a:xfrm>
-          <a:off x="0" y="0"/>
-          <a:ext cx="0" cy="0"/>
-          <a:chOff x="0" y="0"/>
-          <a:chExt cx="0" cy="0"/>
-        </a:xfrm>
-      </p:grpSpPr>
-      <p:sp>
-        <p:nvSpPr>
-          <p:cNvPr id="2" name="Título 1">
-            <a:extLst>
-              <a:ext uri="{FF2B5EF4-FFF2-40B4-BE49-F238E27FC236}">
-                <a16:creationId xmlns:a16="http://schemas.microsoft.com/office/drawing/2014/main" id="{3CA32550-8C76-B013-2EC7-989D8C3B19BE}"/>
-              </a:ext>
-            </a:extLst>
-          </p:cNvPr>
-          <p:cNvSpPr>
-            <a:spLocks noGrp="1"/>
-          </p:cNvSpPr>
-          <p:nvPr>
-            <p:ph type="title"/>
-          </p:nvPr>
-        </p:nvSpPr>
-        <p:spPr/>
-        <p:txBody>
-          <a:bodyPr/>
-          <a:lstStyle/>
-          <a:p>
-            <a:r>
-              <a:rPr lang="pt-BR" noProof="0" dirty="0"/>
-              <a:t>Referências</a:t>
-            </a:r>
-          </a:p>
-        </p:txBody>
-      </p:sp>
-      <p:sp>
-        <p:nvSpPr>
-          <p:cNvPr id="3" name="Espaço Reservado para Conteúdo 2">
-            <a:extLst>
-              <a:ext uri="{FF2B5EF4-FFF2-40B4-BE49-F238E27FC236}">
-                <a16:creationId xmlns:a16="http://schemas.microsoft.com/office/drawing/2014/main" id="{EF043237-7757-7557-B63E-D4EB5152D44B}"/>
-              </a:ext>
-            </a:extLst>
-          </p:cNvPr>
-          <p:cNvSpPr>
-            <a:spLocks noGrp="1"/>
-          </p:cNvSpPr>
-          <p:nvPr>
-            <p:ph idx="1"/>
-          </p:nvPr>
-        </p:nvSpPr>
-        <p:spPr/>
-        <p:txBody>
-          <a:bodyPr/>
-          <a:lstStyle/>
-          <a:p>
-            <a:endParaRPr lang="pt-BR" noProof="0" dirty="0"/>
-          </a:p>
-        </p:txBody>
-      </p:sp>
-    </p:spTree>
-    <p:extLst>
-      <p:ext uri="{BB962C8B-B14F-4D97-AF65-F5344CB8AC3E}">
-        <p14:creationId xmlns:p14="http://schemas.microsoft.com/office/powerpoint/2010/main" val="1787264919"/>
-      </p:ext>
-    </p:extLst>
-  </p:cSld>
-  <p:clrMapOvr>
-    <a:masterClrMapping/>
-  </p:clrMapOvr>
-</p:sld>
-</file>
-
-<file path=ppt/slides/slide16.xml><?xml version="1.0" encoding="utf-8"?>
-<p:sld xmlns:a="http://schemas.openxmlformats.org/drawingml/2006/main" xmlns:r="http://schemas.openxmlformats.org/officeDocument/2006/relationships" xmlns:p="http://schemas.openxmlformats.org/presentationml/2006/main">
-  <p:cSld>
-    <p:spTree>
-      <p:nvGrpSpPr>
-        <p:cNvPr id="1" name=""/>
-        <p:cNvGrpSpPr/>
-        <p:nvPr/>
-      </p:nvGrpSpPr>
-      <p:grpSpPr>
-        <a:xfrm>
-          <a:off x="0" y="0"/>
-          <a:ext cx="0" cy="0"/>
-          <a:chOff x="0" y="0"/>
-          <a:chExt cx="0" cy="0"/>
-        </a:xfrm>
-      </p:grpSpPr>
-      <p:sp>
-        <p:nvSpPr>
-          <p:cNvPr id="4" name="Título 1">
-            <a:extLst>
-              <a:ext uri="{FF2B5EF4-FFF2-40B4-BE49-F238E27FC236}">
-                <a16:creationId xmlns:a16="http://schemas.microsoft.com/office/drawing/2014/main" id="{32666AC8-2E17-4DB4-B0F5-60C640CCFD2E}"/>
-              </a:ext>
-            </a:extLst>
-          </p:cNvPr>
-          <p:cNvSpPr txBox="1">
-            <a:spLocks/>
-          </p:cNvSpPr>
-          <p:nvPr/>
-        </p:nvSpPr>
-        <p:spPr>
-          <a:xfrm>
-            <a:off x="1431533" y="2720526"/>
-            <a:ext cx="9144000" cy="1029541"/>
-          </a:xfrm>
-          <a:prstGeom prst="rect">
-            <a:avLst/>
-          </a:prstGeom>
-        </p:spPr>
-        <p:txBody>
-          <a:bodyPr vert="horz" lIns="91440" tIns="45720" rIns="91440" bIns="45720" rtlCol="0" anchor="ctr">
-            <a:normAutofit/>
-          </a:bodyPr>
-          <a:lstStyle>
-            <a:lvl1pPr algn="l" defTabSz="914400" rtl="0" eaLnBrk="1" latinLnBrk="0" hangingPunct="1">
-              <a:lnSpc>
-                <a:spcPct val="90000"/>
-              </a:lnSpc>
-              <a:spcBef>
-                <a:spcPct val="0"/>
-              </a:spcBef>
-              <a:buNone/>
-              <a:defRPr sz="4400" kern="1200">
-                <a:solidFill>
-                  <a:schemeClr val="tx1"/>
-                </a:solidFill>
-                <a:latin typeface="+mj-lt"/>
-                <a:ea typeface="+mj-ea"/>
-                <a:cs typeface="+mj-cs"/>
-              </a:defRPr>
-            </a:lvl1pPr>
-          </a:lstStyle>
-          <a:p>
-            <a:pPr algn="ctr"/>
-            <a:r>
-              <a:rPr lang="pt-BR" sz="6600" noProof="0" dirty="0"/>
-              <a:t>Obrigado!</a:t>
-            </a:r>
-            <a:endParaRPr lang="pt-BR" sz="6600" b="1" i="1" noProof="0" dirty="0"/>
-          </a:p>
-        </p:txBody>
-      </p:sp>
-    </p:spTree>
-    <p:extLst>
-      <p:ext uri="{BB962C8B-B14F-4D97-AF65-F5344CB8AC3E}">
-        <p14:creationId xmlns:p14="http://schemas.microsoft.com/office/powerpoint/2010/main" val="2655704619"/>
       </p:ext>
     </p:extLst>
   </p:cSld>
@@ -5996,6 +7597,344 @@
     <p:extLst>
       <p:ext uri="{BB962C8B-B14F-4D97-AF65-F5344CB8AC3E}">
         <p14:creationId xmlns:p14="http://schemas.microsoft.com/office/powerpoint/2010/main" val="364118245"/>
+      </p:ext>
+    </p:extLst>
+  </p:cSld>
+  <p:clrMapOvr>
+    <a:masterClrMapping/>
+  </p:clrMapOvr>
+</p:sld>
+</file>
+
+<file path=ppt/slides/slide20.xml><?xml version="1.0" encoding="utf-8"?>
+<p:sld xmlns:a="http://schemas.openxmlformats.org/drawingml/2006/main" xmlns:r="http://schemas.openxmlformats.org/officeDocument/2006/relationships" xmlns:p="http://schemas.openxmlformats.org/presentationml/2006/main">
+  <p:cSld>
+    <p:spTree>
+      <p:nvGrpSpPr>
+        <p:cNvPr id="1" name=""/>
+        <p:cNvGrpSpPr/>
+        <p:nvPr/>
+      </p:nvGrpSpPr>
+      <p:grpSpPr>
+        <a:xfrm>
+          <a:off x="0" y="0"/>
+          <a:ext cx="0" cy="0"/>
+          <a:chOff x="0" y="0"/>
+          <a:chExt cx="0" cy="0"/>
+        </a:xfrm>
+      </p:grpSpPr>
+      <p:sp>
+        <p:nvSpPr>
+          <p:cNvPr id="2" name="Título 1">
+            <a:extLst>
+              <a:ext uri="{FF2B5EF4-FFF2-40B4-BE49-F238E27FC236}">
+                <a16:creationId xmlns:a16="http://schemas.microsoft.com/office/drawing/2014/main" id="{B7EBC8F7-03EF-338A-A90B-280A41AF9688}"/>
+              </a:ext>
+            </a:extLst>
+          </p:cNvPr>
+          <p:cNvSpPr>
+            <a:spLocks noGrp="1"/>
+          </p:cNvSpPr>
+          <p:nvPr>
+            <p:ph type="title"/>
+          </p:nvPr>
+        </p:nvSpPr>
+        <p:spPr/>
+        <p:txBody>
+          <a:bodyPr/>
+          <a:lstStyle/>
+          <a:p>
+            <a:r>
+              <a:rPr lang="pt-BR" noProof="0" dirty="0"/>
+              <a:t>Comparação com outros algoritmos</a:t>
+            </a:r>
+          </a:p>
+        </p:txBody>
+      </p:sp>
+      <p:sp>
+        <p:nvSpPr>
+          <p:cNvPr id="3" name="Espaço Reservado para Conteúdo 2">
+            <a:extLst>
+              <a:ext uri="{FF2B5EF4-FFF2-40B4-BE49-F238E27FC236}">
+                <a16:creationId xmlns:a16="http://schemas.microsoft.com/office/drawing/2014/main" id="{C525BCE7-C19D-7DDA-016A-E3016C398CBA}"/>
+              </a:ext>
+            </a:extLst>
+          </p:cNvPr>
+          <p:cNvSpPr>
+            <a:spLocks noGrp="1"/>
+          </p:cNvSpPr>
+          <p:nvPr>
+            <p:ph idx="1"/>
+          </p:nvPr>
+        </p:nvSpPr>
+        <p:spPr/>
+        <p:txBody>
+          <a:bodyPr/>
+          <a:lstStyle/>
+          <a:p>
+            <a:endParaRPr lang="pt-BR" noProof="0" dirty="0"/>
+          </a:p>
+        </p:txBody>
+      </p:sp>
+    </p:spTree>
+    <p:extLst>
+      <p:ext uri="{BB962C8B-B14F-4D97-AF65-F5344CB8AC3E}">
+        <p14:creationId xmlns:p14="http://schemas.microsoft.com/office/powerpoint/2010/main" val="3601469261"/>
+      </p:ext>
+    </p:extLst>
+  </p:cSld>
+  <p:clrMapOvr>
+    <a:masterClrMapping/>
+  </p:clrMapOvr>
+</p:sld>
+</file>
+
+<file path=ppt/slides/slide21.xml><?xml version="1.0" encoding="utf-8"?>
+<p:sld xmlns:a="http://schemas.openxmlformats.org/drawingml/2006/main" xmlns:r="http://schemas.openxmlformats.org/officeDocument/2006/relationships" xmlns:p="http://schemas.openxmlformats.org/presentationml/2006/main">
+  <p:cSld>
+    <p:spTree>
+      <p:nvGrpSpPr>
+        <p:cNvPr id="1" name=""/>
+        <p:cNvGrpSpPr/>
+        <p:nvPr/>
+      </p:nvGrpSpPr>
+      <p:grpSpPr>
+        <a:xfrm>
+          <a:off x="0" y="0"/>
+          <a:ext cx="0" cy="0"/>
+          <a:chOff x="0" y="0"/>
+          <a:chExt cx="0" cy="0"/>
+        </a:xfrm>
+      </p:grpSpPr>
+      <p:sp>
+        <p:nvSpPr>
+          <p:cNvPr id="4" name="Título 1">
+            <a:extLst>
+              <a:ext uri="{FF2B5EF4-FFF2-40B4-BE49-F238E27FC236}">
+                <a16:creationId xmlns:a16="http://schemas.microsoft.com/office/drawing/2014/main" id="{32666AC8-2E17-4DB4-B0F5-60C640CCFD2E}"/>
+              </a:ext>
+            </a:extLst>
+          </p:cNvPr>
+          <p:cNvSpPr txBox="1">
+            <a:spLocks/>
+          </p:cNvSpPr>
+          <p:nvPr/>
+        </p:nvSpPr>
+        <p:spPr>
+          <a:xfrm>
+            <a:off x="1431533" y="2720526"/>
+            <a:ext cx="9144000" cy="1029541"/>
+          </a:xfrm>
+          <a:prstGeom prst="rect">
+            <a:avLst/>
+          </a:prstGeom>
+        </p:spPr>
+        <p:txBody>
+          <a:bodyPr vert="horz" lIns="91440" tIns="45720" rIns="91440" bIns="45720" rtlCol="0" anchor="ctr">
+            <a:normAutofit/>
+          </a:bodyPr>
+          <a:lstStyle>
+            <a:lvl1pPr algn="l" defTabSz="914400" rtl="0" eaLnBrk="1" latinLnBrk="0" hangingPunct="1">
+              <a:lnSpc>
+                <a:spcPct val="90000"/>
+              </a:lnSpc>
+              <a:spcBef>
+                <a:spcPct val="0"/>
+              </a:spcBef>
+              <a:buNone/>
+              <a:defRPr sz="4400" kern="1200">
+                <a:solidFill>
+                  <a:schemeClr val="tx1"/>
+                </a:solidFill>
+                <a:latin typeface="+mj-lt"/>
+                <a:ea typeface="+mj-ea"/>
+                <a:cs typeface="+mj-cs"/>
+              </a:defRPr>
+            </a:lvl1pPr>
+          </a:lstStyle>
+          <a:p>
+            <a:pPr algn="ctr"/>
+            <a:r>
+              <a:rPr lang="pt-BR" sz="6600" noProof="0" dirty="0"/>
+              <a:t>Perguntas?</a:t>
+            </a:r>
+            <a:endParaRPr lang="pt-BR" sz="6600" b="1" i="1" noProof="0" dirty="0"/>
+          </a:p>
+        </p:txBody>
+      </p:sp>
+    </p:spTree>
+    <p:extLst>
+      <p:ext uri="{BB962C8B-B14F-4D97-AF65-F5344CB8AC3E}">
+        <p14:creationId xmlns:p14="http://schemas.microsoft.com/office/powerpoint/2010/main" val="3773005660"/>
+      </p:ext>
+    </p:extLst>
+  </p:cSld>
+  <p:clrMapOvr>
+    <a:masterClrMapping/>
+  </p:clrMapOvr>
+</p:sld>
+</file>
+
+<file path=ppt/slides/slide22.xml><?xml version="1.0" encoding="utf-8"?>
+<p:sld xmlns:a="http://schemas.openxmlformats.org/drawingml/2006/main" xmlns:r="http://schemas.openxmlformats.org/officeDocument/2006/relationships" xmlns:p="http://schemas.openxmlformats.org/presentationml/2006/main">
+  <p:cSld>
+    <p:spTree>
+      <p:nvGrpSpPr>
+        <p:cNvPr id="1" name=""/>
+        <p:cNvGrpSpPr/>
+        <p:nvPr/>
+      </p:nvGrpSpPr>
+      <p:grpSpPr>
+        <a:xfrm>
+          <a:off x="0" y="0"/>
+          <a:ext cx="0" cy="0"/>
+          <a:chOff x="0" y="0"/>
+          <a:chExt cx="0" cy="0"/>
+        </a:xfrm>
+      </p:grpSpPr>
+      <p:sp>
+        <p:nvSpPr>
+          <p:cNvPr id="2" name="Título 1">
+            <a:extLst>
+              <a:ext uri="{FF2B5EF4-FFF2-40B4-BE49-F238E27FC236}">
+                <a16:creationId xmlns:a16="http://schemas.microsoft.com/office/drawing/2014/main" id="{3CA32550-8C76-B013-2EC7-989D8C3B19BE}"/>
+              </a:ext>
+            </a:extLst>
+          </p:cNvPr>
+          <p:cNvSpPr>
+            <a:spLocks noGrp="1"/>
+          </p:cNvSpPr>
+          <p:nvPr>
+            <p:ph type="title"/>
+          </p:nvPr>
+        </p:nvSpPr>
+        <p:spPr/>
+        <p:txBody>
+          <a:bodyPr/>
+          <a:lstStyle/>
+          <a:p>
+            <a:r>
+              <a:rPr lang="pt-BR" noProof="0" dirty="0"/>
+              <a:t>Referências</a:t>
+            </a:r>
+          </a:p>
+        </p:txBody>
+      </p:sp>
+      <p:sp>
+        <p:nvSpPr>
+          <p:cNvPr id="3" name="Espaço Reservado para Conteúdo 2">
+            <a:extLst>
+              <a:ext uri="{FF2B5EF4-FFF2-40B4-BE49-F238E27FC236}">
+                <a16:creationId xmlns:a16="http://schemas.microsoft.com/office/drawing/2014/main" id="{EF043237-7757-7557-B63E-D4EB5152D44B}"/>
+              </a:ext>
+            </a:extLst>
+          </p:cNvPr>
+          <p:cNvSpPr>
+            <a:spLocks noGrp="1"/>
+          </p:cNvSpPr>
+          <p:nvPr>
+            <p:ph idx="1"/>
+          </p:nvPr>
+        </p:nvSpPr>
+        <p:spPr/>
+        <p:txBody>
+          <a:bodyPr/>
+          <a:lstStyle/>
+          <a:p>
+            <a:endParaRPr lang="pt-BR" noProof="0" dirty="0"/>
+          </a:p>
+        </p:txBody>
+      </p:sp>
+    </p:spTree>
+    <p:extLst>
+      <p:ext uri="{BB962C8B-B14F-4D97-AF65-F5344CB8AC3E}">
+        <p14:creationId xmlns:p14="http://schemas.microsoft.com/office/powerpoint/2010/main" val="1787264919"/>
+      </p:ext>
+    </p:extLst>
+  </p:cSld>
+  <p:clrMapOvr>
+    <a:masterClrMapping/>
+  </p:clrMapOvr>
+</p:sld>
+</file>
+
+<file path=ppt/slides/slide23.xml><?xml version="1.0" encoding="utf-8"?>
+<p:sld xmlns:a="http://schemas.openxmlformats.org/drawingml/2006/main" xmlns:r="http://schemas.openxmlformats.org/officeDocument/2006/relationships" xmlns:p="http://schemas.openxmlformats.org/presentationml/2006/main">
+  <p:cSld>
+    <p:spTree>
+      <p:nvGrpSpPr>
+        <p:cNvPr id="1" name=""/>
+        <p:cNvGrpSpPr/>
+        <p:nvPr/>
+      </p:nvGrpSpPr>
+      <p:grpSpPr>
+        <a:xfrm>
+          <a:off x="0" y="0"/>
+          <a:ext cx="0" cy="0"/>
+          <a:chOff x="0" y="0"/>
+          <a:chExt cx="0" cy="0"/>
+        </a:xfrm>
+      </p:grpSpPr>
+      <p:sp>
+        <p:nvSpPr>
+          <p:cNvPr id="4" name="Título 1">
+            <a:extLst>
+              <a:ext uri="{FF2B5EF4-FFF2-40B4-BE49-F238E27FC236}">
+                <a16:creationId xmlns:a16="http://schemas.microsoft.com/office/drawing/2014/main" id="{32666AC8-2E17-4DB4-B0F5-60C640CCFD2E}"/>
+              </a:ext>
+            </a:extLst>
+          </p:cNvPr>
+          <p:cNvSpPr txBox="1">
+            <a:spLocks/>
+          </p:cNvSpPr>
+          <p:nvPr/>
+        </p:nvSpPr>
+        <p:spPr>
+          <a:xfrm>
+            <a:off x="1431533" y="2720526"/>
+            <a:ext cx="9144000" cy="1029541"/>
+          </a:xfrm>
+          <a:prstGeom prst="rect">
+            <a:avLst/>
+          </a:prstGeom>
+        </p:spPr>
+        <p:txBody>
+          <a:bodyPr vert="horz" lIns="91440" tIns="45720" rIns="91440" bIns="45720" rtlCol="0" anchor="ctr">
+            <a:normAutofit/>
+          </a:bodyPr>
+          <a:lstStyle>
+            <a:lvl1pPr algn="l" defTabSz="914400" rtl="0" eaLnBrk="1" latinLnBrk="0" hangingPunct="1">
+              <a:lnSpc>
+                <a:spcPct val="90000"/>
+              </a:lnSpc>
+              <a:spcBef>
+                <a:spcPct val="0"/>
+              </a:spcBef>
+              <a:buNone/>
+              <a:defRPr sz="4400" kern="1200">
+                <a:solidFill>
+                  <a:schemeClr val="tx1"/>
+                </a:solidFill>
+                <a:latin typeface="+mj-lt"/>
+                <a:ea typeface="+mj-ea"/>
+                <a:cs typeface="+mj-cs"/>
+              </a:defRPr>
+            </a:lvl1pPr>
+          </a:lstStyle>
+          <a:p>
+            <a:pPr algn="ctr"/>
+            <a:r>
+              <a:rPr lang="pt-BR" sz="6600" noProof="0" dirty="0"/>
+              <a:t>Obrigado!</a:t>
+            </a:r>
+            <a:endParaRPr lang="pt-BR" sz="6600" b="1" i="1" noProof="0" dirty="0"/>
+          </a:p>
+        </p:txBody>
+      </p:sp>
+    </p:spTree>
+    <p:extLst>
+      <p:ext uri="{BB962C8B-B14F-4D97-AF65-F5344CB8AC3E}">
+        <p14:creationId xmlns:p14="http://schemas.microsoft.com/office/powerpoint/2010/main" val="2655704619"/>
       </p:ext>
     </p:extLst>
   </p:cSld>
@@ -6641,9 +8580,10 @@
           <a:lstStyle/>
           <a:p>
             <a:r>
-              <a:rPr lang="pt-BR" noProof="0" dirty="0"/>
-              <a:t>Introdução</a:t>
-            </a:r>
+              <a:rPr lang="pt-BR" dirty="0"/>
+              <a:t>Fundamentação teórica</a:t>
+            </a:r>
+            <a:endParaRPr lang="pt-BR" noProof="0" dirty="0"/>
           </a:p>
         </p:txBody>
       </p:sp>
@@ -6801,9 +8741,10 @@
           <a:lstStyle/>
           <a:p>
             <a:r>
-              <a:rPr lang="pt-BR" noProof="0" dirty="0"/>
-              <a:t>Introdução</a:t>
-            </a:r>
+              <a:rPr lang="pt-BR" dirty="0"/>
+              <a:t>Fundamentação teórica</a:t>
+            </a:r>
+            <a:endParaRPr lang="pt-BR" noProof="0" dirty="0"/>
           </a:p>
         </p:txBody>
       </p:sp>
@@ -6891,7 +8832,7 @@
             </a:r>
             <a:r>
               <a:rPr lang="pt-BR" noProof="0" dirty="0"/>
-              <a:t>” de Nasir et al. propõe combinar LLM com algoritmo evolucionário para gerar arquiteturas com performances no estado da arte.</a:t>
+              <a:t>” de Nasir et al. propõe combinar LLM com algoritmo evolucionário para gerar arquiteturas com performances no estado da arte na atividade de NAS.</a:t>
             </a:r>
           </a:p>
         </p:txBody>
@@ -6914,7 +8855,13 @@
   <p:cSld>
     <p:spTree>
       <p:nvGrpSpPr>
-        <p:cNvPr id="1" name=""/>
+        <p:cNvPr id="1" name="">
+          <a:extLst>
+            <a:ext uri="{FF2B5EF4-FFF2-40B4-BE49-F238E27FC236}">
+              <a16:creationId xmlns:a16="http://schemas.microsoft.com/office/drawing/2014/main" id="{A25CFCB0-63F1-0A2D-9631-2FD670A2B192}"/>
+            </a:ext>
+          </a:extLst>
+        </p:cNvPr>
         <p:cNvGrpSpPr/>
         <p:nvPr/>
       </p:nvGrpSpPr>
@@ -6931,7 +8878,7 @@
           <p:cNvPr id="2" name="Título 1">
             <a:extLst>
               <a:ext uri="{FF2B5EF4-FFF2-40B4-BE49-F238E27FC236}">
-                <a16:creationId xmlns:a16="http://schemas.microsoft.com/office/drawing/2014/main" id="{94AB8438-E56E-2412-517C-8456E4CA773C}"/>
+                <a16:creationId xmlns:a16="http://schemas.microsoft.com/office/drawing/2014/main" id="{A2E650A5-6BF2-77CF-35C2-CD3D538E1C24}"/>
               </a:ext>
             </a:extLst>
           </p:cNvPr>
@@ -6948,9 +8895,10 @@
           <a:lstStyle/>
           <a:p>
             <a:r>
-              <a:rPr lang="pt-BR" noProof="0" dirty="0"/>
+              <a:rPr lang="pt-BR" dirty="0"/>
               <a:t>Fundamentação teórica</a:t>
             </a:r>
+            <a:endParaRPr lang="pt-BR" noProof="0" dirty="0"/>
           </a:p>
         </p:txBody>
       </p:sp>
@@ -6959,7 +8907,7 @@
           <p:cNvPr id="3" name="Espaço Reservado para Conteúdo 2">
             <a:extLst>
               <a:ext uri="{FF2B5EF4-FFF2-40B4-BE49-F238E27FC236}">
-                <a16:creationId xmlns:a16="http://schemas.microsoft.com/office/drawing/2014/main" id="{F7E2B09C-6D56-4C9F-A364-B904CCE2F1A0}"/>
+                <a16:creationId xmlns:a16="http://schemas.microsoft.com/office/drawing/2014/main" id="{3D5FD461-D2DB-BF46-0782-0CEC1D446011}"/>
               </a:ext>
             </a:extLst>
           </p:cNvPr>
@@ -6972,17 +8920,96 @@
         </p:nvSpPr>
         <p:spPr/>
         <p:txBody>
-          <a:bodyPr/>
-          <a:lstStyle/>
-          <a:p>
-            <a:endParaRPr lang="pt-BR" noProof="0" dirty="0"/>
+          <a:bodyPr anchor="ctr">
+            <a:normAutofit/>
+          </a:bodyPr>
+          <a:lstStyle/>
+          <a:p>
+            <a:pPr marL="0" indent="0" algn="just">
+              <a:buNone/>
+            </a:pPr>
+            <a:r>
+              <a:rPr lang="pt-BR" b="1" noProof="0" dirty="0">
+                <a:solidFill>
+                  <a:schemeClr val="accent6">
+                    <a:lumMod val="75000"/>
+                  </a:schemeClr>
+                </a:solidFill>
+              </a:rPr>
+              <a:t>Os </a:t>
+            </a:r>
+            <a:r>
+              <a:rPr lang="pt-BR" b="1" noProof="0" dirty="0" err="1">
+                <a:solidFill>
+                  <a:schemeClr val="accent6">
+                    <a:lumMod val="75000"/>
+                  </a:schemeClr>
+                </a:solidFill>
+              </a:rPr>
+              <a:t>LLMs</a:t>
+            </a:r>
+            <a:r>
+              <a:rPr lang="pt-BR" b="1" noProof="0" dirty="0">
+                <a:solidFill>
+                  <a:schemeClr val="accent6">
+                    <a:lumMod val="75000"/>
+                  </a:schemeClr>
+                </a:solidFill>
+              </a:rPr>
+              <a:t> são reconhecidos por sua capacidade de gerar código e pelo conhecimento do estado da arte por</a:t>
+            </a:r>
+            <a:r>
+              <a:rPr lang="pt-BR" b="1" dirty="0">
+                <a:solidFill>
+                  <a:schemeClr val="accent6">
+                    <a:lumMod val="75000"/>
+                  </a:schemeClr>
+                </a:solidFill>
+              </a:rPr>
+              <a:t> ser treinado por diversas fontes</a:t>
+            </a:r>
+            <a:r>
+              <a:rPr lang="pt-BR" noProof="0" dirty="0"/>
+              <a:t>. O artigo propõe usar essa habilidade para introduzir variações significativas no código que define as redes neurais.</a:t>
+            </a:r>
+          </a:p>
+          <a:p>
+            <a:pPr marL="0" indent="0" algn="just">
+              <a:buNone/>
+            </a:pPr>
+            <a:r>
+              <a:rPr lang="pt-BR" noProof="0" dirty="0"/>
+              <a:t>No entanto, um </a:t>
+            </a:r>
+            <a:r>
+              <a:rPr lang="pt-BR" b="1" noProof="0" dirty="0">
+                <a:solidFill>
+                  <a:schemeClr val="accent6">
+                    <a:lumMod val="75000"/>
+                  </a:schemeClr>
+                </a:solidFill>
+              </a:rPr>
+              <a:t>LLM por si só não consegue encontrar uma arquitetura ideal</a:t>
+            </a:r>
+            <a:r>
+              <a:rPr lang="pt-BR" noProof="0" dirty="0"/>
+              <a:t>, pois não pode testar as arquiteturas e aprender com os resultados. Por isso, o artigo sugere combinar o conhecimento de domínio dos </a:t>
+            </a:r>
+            <a:r>
+              <a:rPr lang="pt-BR" noProof="0" dirty="0" err="1"/>
+              <a:t>LLMs</a:t>
+            </a:r>
+            <a:r>
+              <a:rPr lang="pt-BR" noProof="0" dirty="0"/>
+              <a:t> geradores de código com um mecanismo de busca robusto.</a:t>
+            </a:r>
           </a:p>
         </p:txBody>
       </p:sp>
     </p:spTree>
     <p:extLst>
       <p:ext uri="{BB962C8B-B14F-4D97-AF65-F5344CB8AC3E}">
-        <p14:creationId xmlns:p14="http://schemas.microsoft.com/office/powerpoint/2010/main" val="3187071590"/>
+        <p14:creationId xmlns:p14="http://schemas.microsoft.com/office/powerpoint/2010/main" val="860951895"/>
       </p:ext>
     </p:extLst>
   </p:cSld>
@@ -6997,7 +9024,13 @@
   <p:cSld>
     <p:spTree>
       <p:nvGrpSpPr>
-        <p:cNvPr id="1" name=""/>
+        <p:cNvPr id="1" name="">
+          <a:extLst>
+            <a:ext uri="{FF2B5EF4-FFF2-40B4-BE49-F238E27FC236}">
+              <a16:creationId xmlns:a16="http://schemas.microsoft.com/office/drawing/2014/main" id="{8518182E-C2A6-6852-FBD4-60737DDD75FD}"/>
+            </a:ext>
+          </a:extLst>
+        </p:cNvPr>
         <p:cNvGrpSpPr/>
         <p:nvPr/>
       </p:nvGrpSpPr>
@@ -7014,7 +9047,7 @@
           <p:cNvPr id="2" name="Título 1">
             <a:extLst>
               <a:ext uri="{FF2B5EF4-FFF2-40B4-BE49-F238E27FC236}">
-                <a16:creationId xmlns:a16="http://schemas.microsoft.com/office/drawing/2014/main" id="{083FFF02-0FC8-9F0B-AAB0-565FC99EA70D}"/>
+                <a16:creationId xmlns:a16="http://schemas.microsoft.com/office/drawing/2014/main" id="{D38C651B-8E6F-608A-3364-AD91CD78C947}"/>
               </a:ext>
             </a:extLst>
           </p:cNvPr>
@@ -7031,9 +9064,10 @@
           <a:lstStyle/>
           <a:p>
             <a:r>
-              <a:rPr lang="pt-BR" noProof="0" dirty="0"/>
-              <a:t>Arquitetura e funcionamento</a:t>
-            </a:r>
+              <a:rPr lang="pt-BR" dirty="0"/>
+              <a:t>Fundamentação teórica</a:t>
+            </a:r>
+            <a:endParaRPr lang="pt-BR" noProof="0" dirty="0"/>
           </a:p>
         </p:txBody>
       </p:sp>
@@ -7042,7 +9076,7 @@
           <p:cNvPr id="3" name="Espaço Reservado para Conteúdo 2">
             <a:extLst>
               <a:ext uri="{FF2B5EF4-FFF2-40B4-BE49-F238E27FC236}">
-                <a16:creationId xmlns:a16="http://schemas.microsoft.com/office/drawing/2014/main" id="{8C5488AE-34B4-EF1D-F674-507FF2FCD122}"/>
+                <a16:creationId xmlns:a16="http://schemas.microsoft.com/office/drawing/2014/main" id="{CA6182EC-7BE7-8D5E-99C8-A1BA186B9180}"/>
               </a:ext>
             </a:extLst>
           </p:cNvPr>
@@ -7055,9 +9089,138 @@
         </p:nvSpPr>
         <p:spPr/>
         <p:txBody>
-          <a:bodyPr/>
-          <a:lstStyle/>
-          <a:p>
+          <a:bodyPr anchor="ctr">
+            <a:normAutofit lnSpcReduction="10000"/>
+          </a:bodyPr>
+          <a:lstStyle/>
+          <a:p>
+            <a:pPr marL="0" indent="0" algn="just">
+              <a:buNone/>
+            </a:pPr>
+            <a:r>
+              <a:rPr lang="pt-BR" noProof="0" dirty="0"/>
+              <a:t>Sendo assim, é possível adotar a estratégia de utilizar algoritmos de </a:t>
+            </a:r>
+            <a:r>
+              <a:rPr lang="pt-BR" i="1" dirty="0" err="1"/>
+              <a:t>Quality</a:t>
+            </a:r>
+            <a:r>
+              <a:rPr lang="pt-BR" i="1" dirty="0"/>
+              <a:t> </a:t>
+            </a:r>
+            <a:r>
+              <a:rPr lang="pt-BR" i="1" dirty="0" err="1"/>
+              <a:t>Diversity</a:t>
+            </a:r>
+            <a:r>
+              <a:rPr lang="pt-BR" i="1" dirty="0"/>
+              <a:t> </a:t>
+            </a:r>
+            <a:r>
+              <a:rPr lang="pt-BR" dirty="0"/>
+              <a:t>(QD) </a:t>
+            </a:r>
+            <a:r>
+              <a:rPr lang="pt-BR" i="1" dirty="0" err="1"/>
+              <a:t>Optimization</a:t>
+            </a:r>
+            <a:r>
+              <a:rPr lang="pt-BR" dirty="0"/>
+              <a:t> que permite encontrar um conjunto de soluções.</a:t>
+            </a:r>
+          </a:p>
+          <a:p>
+            <a:pPr marL="0" indent="0" algn="just">
+              <a:buNone/>
+            </a:pPr>
+            <a:r>
+              <a:rPr lang="pt-BR" noProof="0" dirty="0"/>
+              <a:t>QD é um campo de pesquisa dentro de </a:t>
+            </a:r>
+            <a:r>
+              <a:rPr lang="pt-BR" b="1" noProof="0" dirty="0">
+                <a:solidFill>
+                  <a:schemeClr val="accent6">
+                    <a:lumMod val="75000"/>
+                  </a:schemeClr>
+                </a:solidFill>
+              </a:rPr>
+              <a:t>algoritmos evolucionários e otimização</a:t>
+            </a:r>
+            <a:r>
+              <a:rPr lang="pt-BR" noProof="0" dirty="0"/>
+              <a:t> que busca </a:t>
+            </a:r>
+            <a:r>
+              <a:rPr lang="pt-BR" b="1" noProof="0" dirty="0">
+                <a:solidFill>
+                  <a:schemeClr val="accent6">
+                    <a:lumMod val="75000"/>
+                  </a:schemeClr>
+                </a:solidFill>
+              </a:rPr>
+              <a:t>não apenas encontrar a melhor solução possível</a:t>
+            </a:r>
+            <a:r>
+              <a:rPr lang="pt-BR" b="1" noProof="0" dirty="0"/>
+              <a:t>, </a:t>
+            </a:r>
+            <a:r>
+              <a:rPr lang="pt-BR" noProof="0" dirty="0"/>
+              <a:t>mas sim </a:t>
+            </a:r>
+            <a:r>
+              <a:rPr lang="pt-BR" b="1" noProof="0" dirty="0">
+                <a:solidFill>
+                  <a:schemeClr val="accent1">
+                    <a:lumMod val="75000"/>
+                  </a:schemeClr>
+                </a:solidFill>
+              </a:rPr>
+              <a:t>descobrir um conjunto diverso de soluções de alta qualidade</a:t>
+            </a:r>
+            <a:r>
+              <a:rPr lang="pt-BR" noProof="0" dirty="0"/>
+              <a:t>.</a:t>
+            </a:r>
+          </a:p>
+          <a:p>
+            <a:pPr marL="0" indent="0" algn="just">
+              <a:buNone/>
+            </a:pPr>
+            <a:r>
+              <a:rPr lang="pt-BR" dirty="0"/>
+              <a:t>Em contraste com a otimização tradicional, que tende a convergir para uma única solução ótima, os algoritmos QD exploram o espaço de busca de forma a </a:t>
+            </a:r>
+            <a:r>
+              <a:rPr lang="pt-BR" b="1" dirty="0">
+                <a:solidFill>
+                  <a:srgbClr val="C00000"/>
+                </a:solidFill>
+              </a:rPr>
+              <a:t>equilibrar qualidade (performance)</a:t>
+            </a:r>
+            <a:r>
+              <a:rPr lang="pt-BR" dirty="0">
+                <a:solidFill>
+                  <a:srgbClr val="C00000"/>
+                </a:solidFill>
+              </a:rPr>
+              <a:t> e </a:t>
+            </a:r>
+            <a:r>
+              <a:rPr lang="pt-BR" b="1" dirty="0">
+                <a:solidFill>
+                  <a:srgbClr val="C00000"/>
+                </a:solidFill>
+              </a:rPr>
+              <a:t>diversidade (variedade de soluções com características diferentes)</a:t>
+            </a:r>
+            <a:r>
+              <a:rPr lang="pt-BR" dirty="0"/>
+              <a:t>.</a:t>
+            </a:r>
             <a:endParaRPr lang="pt-BR" noProof="0" dirty="0"/>
           </a:p>
         </p:txBody>
@@ -7065,7 +9228,7 @@
     </p:spTree>
     <p:extLst>
       <p:ext uri="{BB962C8B-B14F-4D97-AF65-F5344CB8AC3E}">
-        <p14:creationId xmlns:p14="http://schemas.microsoft.com/office/powerpoint/2010/main" val="1547259554"/>
+        <p14:creationId xmlns:p14="http://schemas.microsoft.com/office/powerpoint/2010/main" val="2132643594"/>
       </p:ext>
     </p:extLst>
   </p:cSld>

</xml_diff>

<commit_message>
Add title and the rest of content
</commit_message>
<xml_diff>
--- a/seminarios/TP558_LLM_QD.pptx
+++ b/seminarios/TP558_LLM_QD.pptx
@@ -5,10 +5,10 @@
     <p:sldMasterId id="2147483648" r:id="rId1"/>
   </p:sldMasterIdLst>
   <p:notesMasterIdLst>
-    <p:notesMasterId r:id="rId25"/>
+    <p:notesMasterId r:id="rId28"/>
   </p:notesMasterIdLst>
   <p:handoutMasterIdLst>
-    <p:handoutMasterId r:id="rId26"/>
+    <p:handoutMasterId r:id="rId29"/>
   </p:handoutMasterIdLst>
   <p:sldIdLst>
     <p:sldId id="256" r:id="rId2"/>
@@ -29,11 +29,14 @@
     <p:sldId id="327" r:id="rId17"/>
     <p:sldId id="328" r:id="rId18"/>
     <p:sldId id="311" r:id="rId19"/>
-    <p:sldId id="312" r:id="rId20"/>
-    <p:sldId id="313" r:id="rId21"/>
-    <p:sldId id="293" r:id="rId22"/>
-    <p:sldId id="314" r:id="rId23"/>
-    <p:sldId id="306" r:id="rId24"/>
+    <p:sldId id="330" r:id="rId20"/>
+    <p:sldId id="329" r:id="rId21"/>
+    <p:sldId id="312" r:id="rId22"/>
+    <p:sldId id="313" r:id="rId23"/>
+    <p:sldId id="331" r:id="rId24"/>
+    <p:sldId id="293" r:id="rId25"/>
+    <p:sldId id="314" r:id="rId26"/>
+    <p:sldId id="306" r:id="rId27"/>
   </p:sldIdLst>
   <p:sldSz cx="12192000" cy="6858000"/>
   <p:notesSz cx="7315200" cy="9601200"/>
@@ -1104,6 +1107,2355 @@
     <p:extLst>
       <p:ext uri="{BB962C8B-B14F-4D97-AF65-F5344CB8AC3E}">
         <p14:creationId xmlns:p14="http://schemas.microsoft.com/office/powerpoint/2010/main" val="4198859561"/>
+      </p:ext>
+    </p:extLst>
+  </p:cSld>
+  <p:clrMapOvr>
+    <a:masterClrMapping/>
+  </p:clrMapOvr>
+</p:notes>
+</file>
+
+<file path=ppt/notesSlides/notesSlide13.xml><?xml version="1.0" encoding="utf-8"?>
+<p:notes xmlns:a="http://schemas.openxmlformats.org/drawingml/2006/main" xmlns:r="http://schemas.openxmlformats.org/officeDocument/2006/relationships" xmlns:p="http://schemas.openxmlformats.org/presentationml/2006/main">
+  <p:cSld>
+    <p:spTree>
+      <p:nvGrpSpPr>
+        <p:cNvPr id="1" name=""/>
+        <p:cNvGrpSpPr/>
+        <p:nvPr/>
+      </p:nvGrpSpPr>
+      <p:grpSpPr>
+        <a:xfrm>
+          <a:off x="0" y="0"/>
+          <a:ext cx="0" cy="0"/>
+          <a:chOff x="0" y="0"/>
+          <a:chExt cx="0" cy="0"/>
+        </a:xfrm>
+      </p:grpSpPr>
+      <p:sp>
+        <p:nvSpPr>
+          <p:cNvPr id="2" name="Slide Image Placeholder 1"/>
+          <p:cNvSpPr>
+            <a:spLocks noGrp="1" noRot="1" noChangeAspect="1"/>
+          </p:cNvSpPr>
+          <p:nvPr>
+            <p:ph type="sldImg"/>
+          </p:nvPr>
+        </p:nvSpPr>
+        <p:spPr/>
+      </p:sp>
+      <p:sp>
+        <p:nvSpPr>
+          <p:cNvPr id="3" name="Notes Placeholder 2"/>
+          <p:cNvSpPr>
+            <a:spLocks noGrp="1"/>
+          </p:cNvSpPr>
+          <p:nvPr>
+            <p:ph type="body" idx="1"/>
+          </p:nvPr>
+        </p:nvSpPr>
+        <p:spPr/>
+        <p:txBody>
+          <a:bodyPr/>
+          <a:lstStyle/>
+          <a:p>
+            <a:r>
+              <a:rPr lang="en-US" b="1" dirty="0" err="1"/>
+              <a:t>Eficiência</a:t>
+            </a:r>
+            <a:r>
+              <a:rPr lang="en-US" b="1" dirty="0"/>
+              <a:t> </a:t>
+            </a:r>
+            <a:r>
+              <a:rPr lang="en-US" b="1" dirty="0" err="1"/>
+              <a:t>em</a:t>
+            </a:r>
+            <a:r>
+              <a:rPr lang="en-US" b="1" dirty="0"/>
+              <a:t> </a:t>
+            </a:r>
+            <a:r>
+              <a:rPr lang="en-US" b="1" dirty="0" err="1"/>
+              <a:t>número</a:t>
+            </a:r>
+            <a:r>
+              <a:rPr lang="en-US" b="1" dirty="0"/>
+              <a:t> de </a:t>
+            </a:r>
+            <a:r>
+              <a:rPr lang="en-US" b="1" dirty="0" err="1"/>
+              <a:t>avaliações</a:t>
+            </a:r>
+            <a:endParaRPr lang="en-US" dirty="0"/>
+          </a:p>
+          <a:p>
+            <a:r>
+              <a:rPr lang="en-US" dirty="0" err="1"/>
+              <a:t>Encontra</a:t>
+            </a:r>
+            <a:r>
+              <a:rPr lang="en-US" dirty="0"/>
+              <a:t> </a:t>
+            </a:r>
+            <a:r>
+              <a:rPr lang="en-US" dirty="0" err="1"/>
+              <a:t>arquiteturas</a:t>
+            </a:r>
+            <a:r>
+              <a:rPr lang="en-US" dirty="0"/>
+              <a:t> </a:t>
+            </a:r>
+            <a:r>
+              <a:rPr lang="en-US" dirty="0" err="1"/>
+              <a:t>competitivas</a:t>
+            </a:r>
+            <a:r>
+              <a:rPr lang="en-US" dirty="0"/>
+              <a:t> </a:t>
+            </a:r>
+            <a:r>
+              <a:rPr lang="en-US" dirty="0" err="1"/>
+              <a:t>em</a:t>
+            </a:r>
+            <a:r>
+              <a:rPr lang="en-US" dirty="0"/>
+              <a:t> </a:t>
+            </a:r>
+            <a:r>
+              <a:rPr lang="en-US" b="1" dirty="0"/>
+              <a:t>~2.000 </a:t>
+            </a:r>
+            <a:r>
+              <a:rPr lang="en-US" b="1" dirty="0" err="1"/>
+              <a:t>avaliações</a:t>
+            </a:r>
+            <a:r>
+              <a:rPr lang="en-US" dirty="0"/>
+              <a:t>, </a:t>
+            </a:r>
+            <a:r>
+              <a:rPr lang="en-US" dirty="0" err="1"/>
+              <a:t>enquanto</a:t>
+            </a:r>
+            <a:r>
+              <a:rPr lang="en-US" dirty="0"/>
+              <a:t> </a:t>
+            </a:r>
+            <a:r>
+              <a:rPr lang="en-US" dirty="0" err="1"/>
+              <a:t>métodos</a:t>
+            </a:r>
+            <a:r>
+              <a:rPr lang="en-US" dirty="0"/>
+              <a:t> </a:t>
+            </a:r>
+            <a:r>
+              <a:rPr lang="en-US" dirty="0" err="1"/>
+              <a:t>tradicionais</a:t>
+            </a:r>
+            <a:r>
+              <a:rPr lang="en-US" dirty="0"/>
+              <a:t> (ex.: EfficientNet-B0) </a:t>
+            </a:r>
+            <a:r>
+              <a:rPr lang="en-US" dirty="0" err="1"/>
+              <a:t>precisaram</a:t>
+            </a:r>
+            <a:r>
+              <a:rPr lang="en-US" dirty="0"/>
+              <a:t> de </a:t>
+            </a:r>
+            <a:r>
+              <a:rPr lang="en-US" b="1" dirty="0"/>
+              <a:t>~8.000</a:t>
+            </a:r>
+            <a:r>
+              <a:rPr lang="en-US" dirty="0"/>
+              <a:t>.</a:t>
+            </a:r>
+          </a:p>
+          <a:p>
+            <a:r>
+              <a:rPr lang="en-US" dirty="0" err="1"/>
+              <a:t>Isso</a:t>
+            </a:r>
+            <a:r>
+              <a:rPr lang="en-US" dirty="0"/>
+              <a:t> </a:t>
+            </a:r>
+            <a:r>
+              <a:rPr lang="en-US" dirty="0" err="1"/>
+              <a:t>significa</a:t>
+            </a:r>
+            <a:r>
+              <a:rPr lang="en-US" dirty="0"/>
+              <a:t> </a:t>
+            </a:r>
+            <a:r>
+              <a:rPr lang="en-US" dirty="0" err="1"/>
+              <a:t>menor</a:t>
+            </a:r>
+            <a:r>
+              <a:rPr lang="en-US" dirty="0"/>
+              <a:t> </a:t>
+            </a:r>
+            <a:r>
+              <a:rPr lang="en-US" dirty="0" err="1"/>
+              <a:t>custo</a:t>
+            </a:r>
+            <a:r>
+              <a:rPr lang="en-US" dirty="0"/>
+              <a:t> </a:t>
+            </a:r>
+            <a:r>
+              <a:rPr lang="en-US" dirty="0" err="1"/>
+              <a:t>computacional</a:t>
+            </a:r>
+            <a:r>
+              <a:rPr lang="en-US" dirty="0"/>
+              <a:t> para </a:t>
+            </a:r>
+            <a:r>
+              <a:rPr lang="en-US" dirty="0" err="1"/>
+              <a:t>chegar</a:t>
+            </a:r>
+            <a:r>
+              <a:rPr lang="en-US" dirty="0"/>
+              <a:t> a bons </a:t>
+            </a:r>
+            <a:r>
+              <a:rPr lang="en-US" dirty="0" err="1"/>
+              <a:t>resultados</a:t>
+            </a:r>
+            <a:r>
+              <a:rPr lang="en-US" dirty="0"/>
+              <a:t>.</a:t>
+            </a:r>
+          </a:p>
+          <a:p>
+            <a:endParaRPr lang="en-US" b="1" dirty="0"/>
+          </a:p>
+          <a:p>
+            <a:r>
+              <a:rPr lang="en-US" b="1" dirty="0" err="1"/>
+              <a:t>Exploração</a:t>
+            </a:r>
+            <a:r>
+              <a:rPr lang="en-US" b="1" dirty="0"/>
+              <a:t> </a:t>
+            </a:r>
+            <a:r>
+              <a:rPr lang="en-US" b="1" dirty="0" err="1"/>
+              <a:t>guiada</a:t>
+            </a:r>
+            <a:r>
+              <a:rPr lang="en-US" b="1" dirty="0"/>
+              <a:t> </a:t>
+            </a:r>
+            <a:r>
+              <a:rPr lang="en-US" b="1" dirty="0" err="1"/>
+              <a:t>por</a:t>
+            </a:r>
+            <a:r>
+              <a:rPr lang="en-US" b="1" dirty="0"/>
+              <a:t> </a:t>
+            </a:r>
+            <a:r>
+              <a:rPr lang="en-US" b="1" dirty="0" err="1"/>
+              <a:t>conhecimento</a:t>
+            </a:r>
+            <a:r>
+              <a:rPr lang="en-US" b="1" dirty="0"/>
+              <a:t> </a:t>
+            </a:r>
+            <a:r>
+              <a:rPr lang="en-US" b="1" dirty="0" err="1"/>
+              <a:t>prévio</a:t>
+            </a:r>
+            <a:endParaRPr lang="en-US" dirty="0"/>
+          </a:p>
+          <a:p>
+            <a:r>
+              <a:rPr lang="en-US" dirty="0"/>
+              <a:t>Ao usar </a:t>
+            </a:r>
+            <a:r>
+              <a:rPr lang="en-US" b="1" dirty="0"/>
+              <a:t>LLMs </a:t>
+            </a:r>
+            <a:r>
+              <a:rPr lang="en-US" b="1" dirty="0" err="1"/>
+              <a:t>treinados</a:t>
+            </a:r>
+            <a:r>
+              <a:rPr lang="en-US" b="1" dirty="0"/>
+              <a:t> </a:t>
+            </a:r>
+            <a:r>
+              <a:rPr lang="en-US" b="1" dirty="0" err="1"/>
+              <a:t>em</a:t>
+            </a:r>
+            <a:r>
+              <a:rPr lang="en-US" b="1" dirty="0"/>
+              <a:t> </a:t>
+            </a:r>
+            <a:r>
+              <a:rPr lang="en-US" b="1" dirty="0" err="1"/>
+              <a:t>código</a:t>
+            </a:r>
+            <a:r>
+              <a:rPr lang="en-US" dirty="0"/>
+              <a:t>, o </a:t>
+            </a:r>
+            <a:r>
+              <a:rPr lang="en-US" dirty="0" err="1"/>
+              <a:t>sistema</a:t>
+            </a:r>
+            <a:r>
+              <a:rPr lang="en-US" dirty="0"/>
+              <a:t> </a:t>
+            </a:r>
+            <a:r>
+              <a:rPr lang="en-US" dirty="0" err="1"/>
+              <a:t>aproveita</a:t>
+            </a:r>
+            <a:r>
+              <a:rPr lang="en-US" dirty="0"/>
+              <a:t> o </a:t>
+            </a:r>
+            <a:r>
+              <a:rPr lang="en-US" b="1" dirty="0" err="1"/>
+              <a:t>conhecimento</a:t>
+            </a:r>
+            <a:r>
+              <a:rPr lang="en-US" b="1" dirty="0"/>
+              <a:t> </a:t>
+            </a:r>
+            <a:r>
+              <a:rPr lang="en-US" b="1" dirty="0" err="1"/>
+              <a:t>prévio</a:t>
+            </a:r>
+            <a:r>
+              <a:rPr lang="en-US" b="1" dirty="0"/>
+              <a:t> de </a:t>
+            </a:r>
+            <a:r>
+              <a:rPr lang="en-US" b="1" dirty="0" err="1"/>
+              <a:t>arquiteturas</a:t>
+            </a:r>
+            <a:r>
+              <a:rPr lang="en-US" b="1" dirty="0"/>
+              <a:t> de redes </a:t>
+            </a:r>
+            <a:r>
+              <a:rPr lang="en-US" b="1" dirty="0" err="1"/>
+              <a:t>neurais</a:t>
+            </a:r>
+            <a:r>
+              <a:rPr lang="en-US" dirty="0"/>
+              <a:t> </a:t>
+            </a:r>
+            <a:r>
+              <a:rPr lang="en-US" dirty="0" err="1"/>
+              <a:t>já</a:t>
+            </a:r>
+            <a:r>
+              <a:rPr lang="en-US" dirty="0"/>
+              <a:t> </a:t>
+            </a:r>
+            <a:r>
+              <a:rPr lang="en-US" dirty="0" err="1"/>
+              <a:t>embutido</a:t>
+            </a:r>
+            <a:r>
+              <a:rPr lang="en-US" dirty="0"/>
+              <a:t> nesses </a:t>
+            </a:r>
+            <a:r>
+              <a:rPr lang="en-US" dirty="0" err="1"/>
+              <a:t>modelos</a:t>
+            </a:r>
+            <a:r>
+              <a:rPr lang="en-US" dirty="0"/>
+              <a:t>.</a:t>
+            </a:r>
+          </a:p>
+          <a:p>
+            <a:r>
+              <a:rPr lang="en-US" dirty="0" err="1"/>
+              <a:t>Diferente</a:t>
+            </a:r>
+            <a:r>
+              <a:rPr lang="en-US" dirty="0"/>
+              <a:t> de </a:t>
+            </a:r>
+            <a:r>
+              <a:rPr lang="en-US" dirty="0" err="1"/>
+              <a:t>uma</a:t>
+            </a:r>
+            <a:r>
+              <a:rPr lang="en-US" dirty="0"/>
+              <a:t> </a:t>
+            </a:r>
+            <a:r>
+              <a:rPr lang="en-US" dirty="0" err="1"/>
+              <a:t>busca</a:t>
+            </a:r>
+            <a:r>
+              <a:rPr lang="en-US" dirty="0"/>
+              <a:t> </a:t>
+            </a:r>
+            <a:r>
+              <a:rPr lang="en-US" dirty="0" err="1"/>
+              <a:t>aleatória</a:t>
+            </a:r>
+            <a:r>
+              <a:rPr lang="en-US" dirty="0"/>
+              <a:t> </a:t>
+            </a:r>
+            <a:r>
+              <a:rPr lang="en-US" dirty="0" err="1"/>
+              <a:t>ou</a:t>
+            </a:r>
+            <a:r>
+              <a:rPr lang="en-US" dirty="0"/>
+              <a:t> “</a:t>
+            </a:r>
+            <a:r>
+              <a:rPr lang="en-US" dirty="0" err="1"/>
+              <a:t>cego</a:t>
+            </a:r>
+            <a:r>
+              <a:rPr lang="en-US" dirty="0"/>
+              <a:t>” de </a:t>
+            </a:r>
+            <a:r>
+              <a:rPr lang="en-US" dirty="0" err="1"/>
+              <a:t>evolução</a:t>
+            </a:r>
+            <a:r>
+              <a:rPr lang="en-US" dirty="0"/>
+              <a:t>, as </a:t>
+            </a:r>
+            <a:r>
+              <a:rPr lang="en-US" dirty="0" err="1"/>
+              <a:t>mutações</a:t>
+            </a:r>
+            <a:r>
+              <a:rPr lang="en-US" dirty="0"/>
+              <a:t> </a:t>
+            </a:r>
+            <a:r>
+              <a:rPr lang="en-US" dirty="0" err="1"/>
+              <a:t>são</a:t>
+            </a:r>
+            <a:r>
+              <a:rPr lang="en-US" dirty="0"/>
+              <a:t> </a:t>
+            </a:r>
+            <a:r>
+              <a:rPr lang="en-US" b="1" dirty="0" err="1"/>
+              <a:t>mais</a:t>
+            </a:r>
+            <a:r>
+              <a:rPr lang="en-US" b="1" dirty="0"/>
+              <a:t> </a:t>
+            </a:r>
+            <a:r>
+              <a:rPr lang="en-US" b="1" dirty="0" err="1"/>
+              <a:t>informadas</a:t>
+            </a:r>
+            <a:r>
+              <a:rPr lang="en-US" dirty="0"/>
+              <a:t>.</a:t>
+            </a:r>
+          </a:p>
+          <a:p>
+            <a:endParaRPr lang="en-US" b="1" dirty="0"/>
+          </a:p>
+          <a:p>
+            <a:r>
+              <a:rPr lang="en-US" b="1" dirty="0" err="1"/>
+              <a:t>Diversidade</a:t>
+            </a:r>
+            <a:r>
+              <a:rPr lang="en-US" b="1" dirty="0"/>
+              <a:t> de </a:t>
+            </a:r>
+            <a:r>
+              <a:rPr lang="en-US" b="1" dirty="0" err="1"/>
+              <a:t>soluções</a:t>
+            </a:r>
+            <a:r>
+              <a:rPr lang="en-US" b="1" dirty="0"/>
+              <a:t> (Quality Diversity)</a:t>
+            </a:r>
+            <a:endParaRPr lang="en-US" dirty="0"/>
+          </a:p>
+          <a:p>
+            <a:r>
+              <a:rPr lang="en-US" dirty="0"/>
+              <a:t>Em </a:t>
+            </a:r>
+            <a:r>
+              <a:rPr lang="en-US" dirty="0" err="1"/>
+              <a:t>vez</a:t>
+            </a:r>
+            <a:r>
+              <a:rPr lang="en-US" dirty="0"/>
+              <a:t> de </a:t>
+            </a:r>
+            <a:r>
+              <a:rPr lang="en-US" dirty="0" err="1"/>
+              <a:t>encontrar</a:t>
+            </a:r>
+            <a:r>
+              <a:rPr lang="en-US" dirty="0"/>
+              <a:t> </a:t>
+            </a:r>
+            <a:r>
+              <a:rPr lang="en-US" b="1" dirty="0" err="1"/>
+              <a:t>apenas</a:t>
+            </a:r>
+            <a:r>
+              <a:rPr lang="en-US" b="1" dirty="0"/>
+              <a:t> </a:t>
+            </a:r>
+            <a:r>
+              <a:rPr lang="en-US" b="1" dirty="0" err="1"/>
+              <a:t>uma</a:t>
+            </a:r>
+            <a:r>
+              <a:rPr lang="en-US" b="1" dirty="0"/>
+              <a:t> rede </a:t>
+            </a:r>
+            <a:r>
+              <a:rPr lang="en-US" b="1" dirty="0" err="1"/>
+              <a:t>ótima</a:t>
+            </a:r>
+            <a:r>
+              <a:rPr lang="en-US" dirty="0"/>
+              <a:t>, o </a:t>
+            </a:r>
+            <a:r>
+              <a:rPr lang="en-US" dirty="0" err="1"/>
+              <a:t>LLMatic</a:t>
+            </a:r>
+            <a:r>
+              <a:rPr lang="en-US" dirty="0"/>
+              <a:t> </a:t>
+            </a:r>
+            <a:r>
+              <a:rPr lang="en-US" dirty="0" err="1"/>
+              <a:t>gera</a:t>
+            </a:r>
+            <a:r>
+              <a:rPr lang="en-US" dirty="0"/>
+              <a:t> um </a:t>
+            </a:r>
+            <a:r>
+              <a:rPr lang="en-US" b="1" dirty="0"/>
+              <a:t>conjunto de </a:t>
+            </a:r>
+            <a:r>
+              <a:rPr lang="en-US" b="1" dirty="0" err="1"/>
+              <a:t>arquiteturas</a:t>
+            </a:r>
+            <a:r>
+              <a:rPr lang="en-US" b="1" dirty="0"/>
+              <a:t> </a:t>
+            </a:r>
+            <a:r>
+              <a:rPr lang="en-US" b="1" dirty="0" err="1"/>
+              <a:t>diversas</a:t>
+            </a:r>
+            <a:r>
+              <a:rPr lang="en-US" b="1" dirty="0"/>
+              <a:t> e de </a:t>
+            </a:r>
+            <a:r>
+              <a:rPr lang="en-US" b="1" dirty="0" err="1"/>
+              <a:t>qualidade</a:t>
+            </a:r>
+            <a:r>
+              <a:rPr lang="en-US" dirty="0"/>
+              <a:t> (redes </a:t>
+            </a:r>
+            <a:r>
+              <a:rPr lang="en-US" dirty="0" err="1"/>
+              <a:t>pequenas</a:t>
+            </a:r>
+            <a:r>
+              <a:rPr lang="en-US" dirty="0"/>
+              <a:t>, </a:t>
+            </a:r>
+            <a:r>
+              <a:rPr lang="en-US" dirty="0" err="1"/>
+              <a:t>médias</a:t>
+            </a:r>
+            <a:r>
+              <a:rPr lang="en-US" dirty="0"/>
+              <a:t> e </a:t>
+            </a:r>
+            <a:r>
+              <a:rPr lang="en-US" dirty="0" err="1"/>
+              <a:t>grandes</a:t>
+            </a:r>
+            <a:r>
+              <a:rPr lang="en-US" dirty="0"/>
+              <a:t>).</a:t>
+            </a:r>
+          </a:p>
+          <a:p>
+            <a:r>
+              <a:rPr lang="en-US" dirty="0" err="1"/>
+              <a:t>Isso</a:t>
+            </a:r>
+            <a:r>
+              <a:rPr lang="en-US" dirty="0"/>
+              <a:t> </a:t>
+            </a:r>
+            <a:r>
+              <a:rPr lang="en-US" dirty="0" err="1"/>
+              <a:t>ajuda</a:t>
+            </a:r>
+            <a:r>
+              <a:rPr lang="en-US" dirty="0"/>
+              <a:t> </a:t>
+            </a:r>
+            <a:r>
+              <a:rPr lang="en-US" dirty="0" err="1"/>
+              <a:t>em</a:t>
+            </a:r>
+            <a:r>
+              <a:rPr lang="en-US" dirty="0"/>
+              <a:t> </a:t>
+            </a:r>
+            <a:r>
+              <a:rPr lang="en-US" dirty="0" err="1"/>
+              <a:t>cenários</a:t>
+            </a:r>
+            <a:r>
+              <a:rPr lang="en-US" dirty="0"/>
+              <a:t> </a:t>
+            </a:r>
+            <a:r>
+              <a:rPr lang="en-US" dirty="0" err="1"/>
+              <a:t>práticos</a:t>
+            </a:r>
+            <a:r>
+              <a:rPr lang="en-US" dirty="0"/>
+              <a:t>, </a:t>
+            </a:r>
+            <a:r>
+              <a:rPr lang="en-US" dirty="0" err="1"/>
+              <a:t>como</a:t>
+            </a:r>
+            <a:r>
+              <a:rPr lang="en-US" dirty="0"/>
+              <a:t> </a:t>
+            </a:r>
+            <a:r>
+              <a:rPr lang="en-US" dirty="0" err="1"/>
+              <a:t>escolher</a:t>
+            </a:r>
+            <a:r>
+              <a:rPr lang="en-US" dirty="0"/>
+              <a:t> </a:t>
+            </a:r>
+            <a:r>
+              <a:rPr lang="en-US" dirty="0" err="1"/>
+              <a:t>arquiteturas</a:t>
+            </a:r>
+            <a:r>
+              <a:rPr lang="en-US" dirty="0"/>
+              <a:t> para </a:t>
+            </a:r>
+            <a:r>
+              <a:rPr lang="en-US" b="1" dirty="0" err="1"/>
+              <a:t>dispositivos</a:t>
+            </a:r>
+            <a:r>
+              <a:rPr lang="en-US" b="1" dirty="0"/>
+              <a:t> com </a:t>
+            </a:r>
+            <a:r>
+              <a:rPr lang="en-US" b="1" dirty="0" err="1"/>
+              <a:t>diferentes</a:t>
+            </a:r>
+            <a:r>
+              <a:rPr lang="en-US" b="1" dirty="0"/>
+              <a:t> </a:t>
+            </a:r>
+            <a:r>
+              <a:rPr lang="en-US" b="1" dirty="0" err="1"/>
+              <a:t>restrições</a:t>
+            </a:r>
+            <a:r>
+              <a:rPr lang="en-US" b="1" dirty="0"/>
+              <a:t> de hardware (RAM, FLOPS, etc.)</a:t>
+            </a:r>
+            <a:r>
+              <a:rPr lang="en-US" dirty="0"/>
+              <a:t>.</a:t>
+            </a:r>
+          </a:p>
+          <a:p>
+            <a:endParaRPr lang="en-US" b="1" dirty="0"/>
+          </a:p>
+        </p:txBody>
+      </p:sp>
+      <p:sp>
+        <p:nvSpPr>
+          <p:cNvPr id="4" name="Slide Number Placeholder 3"/>
+          <p:cNvSpPr>
+            <a:spLocks noGrp="1"/>
+          </p:cNvSpPr>
+          <p:nvPr>
+            <p:ph type="sldNum" sz="quarter" idx="5"/>
+          </p:nvPr>
+        </p:nvSpPr>
+        <p:spPr/>
+        <p:txBody>
+          <a:bodyPr/>
+          <a:lstStyle/>
+          <a:p>
+            <a:fld id="{6FC8D850-966F-45A6-8DE7-15B891E7D40D}" type="slidenum">
+              <a:rPr lang="pt-BR" smtClean="0"/>
+              <a:t>18</a:t>
+            </a:fld>
+            <a:endParaRPr lang="pt-BR"/>
+          </a:p>
+        </p:txBody>
+      </p:sp>
+    </p:spTree>
+    <p:extLst>
+      <p:ext uri="{BB962C8B-B14F-4D97-AF65-F5344CB8AC3E}">
+        <p14:creationId xmlns:p14="http://schemas.microsoft.com/office/powerpoint/2010/main" val="4246167462"/>
+      </p:ext>
+    </p:extLst>
+  </p:cSld>
+  <p:clrMapOvr>
+    <a:masterClrMapping/>
+  </p:clrMapOvr>
+</p:notes>
+</file>
+
+<file path=ppt/notesSlides/notesSlide14.xml><?xml version="1.0" encoding="utf-8"?>
+<p:notes xmlns:a="http://schemas.openxmlformats.org/drawingml/2006/main" xmlns:r="http://schemas.openxmlformats.org/officeDocument/2006/relationships" xmlns:p="http://schemas.openxmlformats.org/presentationml/2006/main">
+  <p:cSld>
+    <p:spTree>
+      <p:nvGrpSpPr>
+        <p:cNvPr id="1" name="">
+          <a:extLst>
+            <a:ext uri="{FF2B5EF4-FFF2-40B4-BE49-F238E27FC236}">
+              <a16:creationId xmlns:a16="http://schemas.microsoft.com/office/drawing/2014/main" id="{42ABE6FC-3969-5C0E-D5CB-EB8F03C1160B}"/>
+            </a:ext>
+          </a:extLst>
+        </p:cNvPr>
+        <p:cNvGrpSpPr/>
+        <p:nvPr/>
+      </p:nvGrpSpPr>
+      <p:grpSpPr>
+        <a:xfrm>
+          <a:off x="0" y="0"/>
+          <a:ext cx="0" cy="0"/>
+          <a:chOff x="0" y="0"/>
+          <a:chExt cx="0" cy="0"/>
+        </a:xfrm>
+      </p:grpSpPr>
+      <p:sp>
+        <p:nvSpPr>
+          <p:cNvPr id="2" name="Slide Image Placeholder 1">
+            <a:extLst>
+              <a:ext uri="{FF2B5EF4-FFF2-40B4-BE49-F238E27FC236}">
+                <a16:creationId xmlns:a16="http://schemas.microsoft.com/office/drawing/2014/main" id="{A18D77AB-5331-66EF-BF03-37614C6CE341}"/>
+              </a:ext>
+            </a:extLst>
+          </p:cNvPr>
+          <p:cNvSpPr>
+            <a:spLocks noGrp="1" noRot="1" noChangeAspect="1"/>
+          </p:cNvSpPr>
+          <p:nvPr>
+            <p:ph type="sldImg"/>
+          </p:nvPr>
+        </p:nvSpPr>
+        <p:spPr/>
+      </p:sp>
+      <p:sp>
+        <p:nvSpPr>
+          <p:cNvPr id="3" name="Notes Placeholder 2">
+            <a:extLst>
+              <a:ext uri="{FF2B5EF4-FFF2-40B4-BE49-F238E27FC236}">
+                <a16:creationId xmlns:a16="http://schemas.microsoft.com/office/drawing/2014/main" id="{71F752E6-F982-12E0-6C91-3E4CD38BC08D}"/>
+              </a:ext>
+            </a:extLst>
+          </p:cNvPr>
+          <p:cNvSpPr>
+            <a:spLocks noGrp="1"/>
+          </p:cNvSpPr>
+          <p:nvPr>
+            <p:ph type="body" idx="1"/>
+          </p:nvPr>
+        </p:nvSpPr>
+        <p:spPr/>
+        <p:txBody>
+          <a:bodyPr/>
+          <a:lstStyle/>
+          <a:p>
+            <a:r>
+              <a:rPr lang="en-US" b="1" dirty="0" err="1"/>
+              <a:t>Combinação</a:t>
+            </a:r>
+            <a:r>
+              <a:rPr lang="en-US" b="1" dirty="0"/>
+              <a:t> </a:t>
+            </a:r>
+            <a:r>
+              <a:rPr lang="en-US" b="1" dirty="0" err="1"/>
+              <a:t>inovadora</a:t>
+            </a:r>
+            <a:r>
+              <a:rPr lang="en-US" b="1" dirty="0"/>
+              <a:t> de </a:t>
+            </a:r>
+            <a:r>
+              <a:rPr lang="en-US" b="1" dirty="0" err="1"/>
+              <a:t>dois</a:t>
+            </a:r>
+            <a:r>
+              <a:rPr lang="en-US" b="1" dirty="0"/>
+              <a:t> </a:t>
+            </a:r>
+            <a:r>
+              <a:rPr lang="en-US" b="1" dirty="0" err="1"/>
+              <a:t>arquivos</a:t>
+            </a:r>
+            <a:r>
+              <a:rPr lang="en-US" b="1" dirty="0"/>
+              <a:t> </a:t>
+            </a:r>
+            <a:r>
+              <a:rPr lang="en-US" b="1" dirty="0" err="1"/>
+              <a:t>cooperativos</a:t>
+            </a:r>
+            <a:endParaRPr lang="en-US" dirty="0"/>
+          </a:p>
+          <a:p>
+            <a:r>
+              <a:rPr lang="en-US" b="1" dirty="0"/>
+              <a:t>Network Archive</a:t>
+            </a:r>
+            <a:r>
+              <a:rPr lang="en-US" dirty="0"/>
+              <a:t> → </a:t>
+            </a:r>
+            <a:r>
+              <a:rPr lang="en-US" dirty="0" err="1"/>
+              <a:t>avalia</a:t>
+            </a:r>
+            <a:r>
+              <a:rPr lang="en-US" dirty="0"/>
+              <a:t> </a:t>
+            </a:r>
+            <a:r>
+              <a:rPr lang="en-US" dirty="0" err="1"/>
+              <a:t>arquiteturas</a:t>
+            </a:r>
+            <a:r>
+              <a:rPr lang="en-US" dirty="0"/>
+              <a:t> </a:t>
+            </a:r>
+            <a:r>
+              <a:rPr lang="en-US" dirty="0" err="1"/>
+              <a:t>em</a:t>
+            </a:r>
+            <a:r>
+              <a:rPr lang="en-US" dirty="0"/>
+              <a:t> </a:t>
+            </a:r>
+            <a:r>
+              <a:rPr lang="en-US" dirty="0" err="1"/>
+              <a:t>termos</a:t>
+            </a:r>
+            <a:r>
+              <a:rPr lang="en-US" dirty="0"/>
+              <a:t> de </a:t>
+            </a:r>
+            <a:r>
+              <a:rPr lang="en-US" dirty="0" err="1"/>
+              <a:t>acurácia</a:t>
+            </a:r>
+            <a:r>
+              <a:rPr lang="en-US" dirty="0"/>
+              <a:t> + </a:t>
+            </a:r>
+            <a:r>
+              <a:rPr lang="en-US" dirty="0" err="1"/>
+              <a:t>descritores</a:t>
+            </a:r>
+            <a:r>
+              <a:rPr lang="en-US" dirty="0"/>
+              <a:t> (</a:t>
+            </a:r>
+            <a:r>
+              <a:rPr lang="en-US" dirty="0" err="1"/>
+              <a:t>largura</a:t>
+            </a:r>
+            <a:r>
+              <a:rPr lang="en-US" dirty="0"/>
+              <a:t>/</a:t>
+            </a:r>
+            <a:r>
+              <a:rPr lang="en-US" dirty="0" err="1"/>
+              <a:t>profundidade</a:t>
+            </a:r>
+            <a:r>
+              <a:rPr lang="en-US" dirty="0"/>
+              <a:t>, FLOPS).</a:t>
+            </a:r>
+          </a:p>
+          <a:p>
+            <a:r>
+              <a:rPr lang="en-US" b="1" dirty="0"/>
+              <a:t>Prompt Archive</a:t>
+            </a:r>
+            <a:r>
+              <a:rPr lang="en-US" dirty="0"/>
+              <a:t> → </a:t>
+            </a:r>
+            <a:r>
+              <a:rPr lang="en-US" dirty="0" err="1"/>
+              <a:t>avalia</a:t>
+            </a:r>
+            <a:r>
+              <a:rPr lang="en-US" dirty="0"/>
+              <a:t> a </a:t>
+            </a:r>
+            <a:r>
+              <a:rPr lang="en-US" dirty="0" err="1"/>
+              <a:t>eficácia</a:t>
+            </a:r>
+            <a:r>
+              <a:rPr lang="en-US" dirty="0"/>
+              <a:t> dos prompts e </a:t>
+            </a:r>
+            <a:r>
+              <a:rPr lang="en-US" dirty="0" err="1"/>
+              <a:t>ajusta</a:t>
+            </a:r>
+            <a:r>
+              <a:rPr lang="en-US" dirty="0"/>
+              <a:t> </a:t>
+            </a:r>
+            <a:r>
+              <a:rPr lang="en-US" dirty="0" err="1"/>
+              <a:t>automaticamente</a:t>
+            </a:r>
+            <a:r>
+              <a:rPr lang="en-US" dirty="0"/>
+              <a:t> a </a:t>
+            </a:r>
+            <a:r>
+              <a:rPr lang="en-US" dirty="0" err="1"/>
+              <a:t>temperatura</a:t>
+            </a:r>
+            <a:r>
+              <a:rPr lang="en-US" dirty="0"/>
+              <a:t> do LLM.</a:t>
+            </a:r>
+          </a:p>
+          <a:p>
+            <a:r>
+              <a:rPr lang="en-US" dirty="0"/>
+              <a:t>Essa </a:t>
+            </a:r>
+            <a:r>
+              <a:rPr lang="en-US" b="1" dirty="0" err="1"/>
+              <a:t>cooperação</a:t>
+            </a:r>
+            <a:r>
+              <a:rPr lang="en-US" dirty="0"/>
+              <a:t> </a:t>
+            </a:r>
+            <a:r>
+              <a:rPr lang="en-US" dirty="0" err="1"/>
+              <a:t>gera</a:t>
+            </a:r>
+            <a:r>
+              <a:rPr lang="en-US" dirty="0"/>
+              <a:t> um </a:t>
+            </a:r>
+            <a:r>
+              <a:rPr lang="en-US" dirty="0" err="1"/>
+              <a:t>ciclo</a:t>
+            </a:r>
+            <a:r>
+              <a:rPr lang="en-US" dirty="0"/>
+              <a:t> virtuoso: bons prompts → boas redes → </a:t>
+            </a:r>
+            <a:r>
+              <a:rPr lang="en-US" dirty="0" err="1"/>
+              <a:t>melhora</a:t>
+            </a:r>
+            <a:r>
+              <a:rPr lang="en-US" dirty="0"/>
+              <a:t> dos </a:t>
+            </a:r>
+            <a:r>
+              <a:rPr lang="en-US" dirty="0" err="1"/>
+              <a:t>arquivos</a:t>
+            </a:r>
+            <a:r>
+              <a:rPr lang="en-US" dirty="0"/>
+              <a:t> → </a:t>
+            </a:r>
+            <a:r>
+              <a:rPr lang="en-US" dirty="0" err="1"/>
+              <a:t>melhores</a:t>
+            </a:r>
+            <a:r>
+              <a:rPr lang="en-US" dirty="0"/>
+              <a:t> </a:t>
+            </a:r>
+            <a:r>
+              <a:rPr lang="en-US" dirty="0" err="1"/>
+              <a:t>próximos</a:t>
+            </a:r>
+            <a:r>
+              <a:rPr lang="en-US" dirty="0"/>
+              <a:t> prompts.</a:t>
+            </a:r>
+          </a:p>
+          <a:p>
+            <a:endParaRPr lang="en-US" b="1" dirty="0"/>
+          </a:p>
+          <a:p>
+            <a:r>
+              <a:rPr lang="en-US" b="1" dirty="0" err="1"/>
+              <a:t>Resultados</a:t>
+            </a:r>
+            <a:r>
+              <a:rPr lang="en-US" b="1" dirty="0"/>
+              <a:t> </a:t>
+            </a:r>
+            <a:r>
+              <a:rPr lang="en-US" b="1" dirty="0" err="1"/>
+              <a:t>competitivos</a:t>
+            </a:r>
+            <a:r>
+              <a:rPr lang="en-US" b="1" dirty="0"/>
+              <a:t> com SOTA (state-of-the-art)</a:t>
+            </a:r>
+            <a:endParaRPr lang="en-US" dirty="0"/>
+          </a:p>
+          <a:p>
+            <a:r>
+              <a:rPr lang="en-US" dirty="0"/>
+              <a:t>Em CIFAR-10 e NAS-Bench-201, o </a:t>
+            </a:r>
+            <a:r>
+              <a:rPr lang="en-US" dirty="0" err="1"/>
+              <a:t>LLMatic</a:t>
+            </a:r>
+            <a:r>
+              <a:rPr lang="en-US" dirty="0"/>
+              <a:t> </a:t>
+            </a:r>
+            <a:r>
+              <a:rPr lang="en-US" dirty="0" err="1"/>
+              <a:t>chegou</a:t>
+            </a:r>
+            <a:r>
+              <a:rPr lang="en-US" dirty="0"/>
+              <a:t> </a:t>
+            </a:r>
+            <a:r>
+              <a:rPr lang="en-US" dirty="0" err="1"/>
+              <a:t>muito</a:t>
+            </a:r>
+            <a:r>
+              <a:rPr lang="en-US" dirty="0"/>
+              <a:t> </a:t>
+            </a:r>
+            <a:r>
+              <a:rPr lang="en-US" dirty="0" err="1"/>
+              <a:t>próximo</a:t>
+            </a:r>
+            <a:r>
+              <a:rPr lang="en-US" dirty="0"/>
+              <a:t> dos </a:t>
+            </a:r>
+            <a:r>
+              <a:rPr lang="en-US" b="1" dirty="0" err="1"/>
+              <a:t>melhores</a:t>
+            </a:r>
+            <a:r>
+              <a:rPr lang="en-US" b="1" dirty="0"/>
+              <a:t> </a:t>
+            </a:r>
+            <a:r>
+              <a:rPr lang="en-US" b="1" dirty="0" err="1"/>
+              <a:t>resultados</a:t>
+            </a:r>
+            <a:r>
+              <a:rPr lang="en-US" b="1" dirty="0"/>
+              <a:t> </a:t>
+            </a:r>
+            <a:r>
+              <a:rPr lang="en-US" b="1" dirty="0" err="1"/>
+              <a:t>conhecidos</a:t>
+            </a:r>
+            <a:r>
+              <a:rPr lang="en-US" dirty="0"/>
+              <a:t>, </a:t>
+            </a:r>
+            <a:r>
+              <a:rPr lang="en-US" dirty="0" err="1"/>
+              <a:t>apesar</a:t>
+            </a:r>
+            <a:r>
+              <a:rPr lang="en-US" dirty="0"/>
+              <a:t> de usar </a:t>
+            </a:r>
+            <a:r>
+              <a:rPr lang="en-US" dirty="0" err="1"/>
+              <a:t>menos</a:t>
+            </a:r>
+            <a:r>
+              <a:rPr lang="en-US" dirty="0"/>
+              <a:t> </a:t>
+            </a:r>
+            <a:r>
+              <a:rPr lang="en-US" dirty="0" err="1"/>
+              <a:t>recursos</a:t>
+            </a:r>
+            <a:r>
+              <a:rPr lang="en-US" dirty="0"/>
+              <a:t>.</a:t>
+            </a:r>
+          </a:p>
+          <a:p>
+            <a:r>
+              <a:rPr lang="en-US" dirty="0" err="1"/>
+              <a:t>Superou</a:t>
+            </a:r>
+            <a:r>
+              <a:rPr lang="en-US" dirty="0"/>
+              <a:t> outros </a:t>
+            </a:r>
+            <a:r>
+              <a:rPr lang="en-US" dirty="0" err="1"/>
+              <a:t>métodos</a:t>
+            </a:r>
+            <a:r>
+              <a:rPr lang="en-US" dirty="0"/>
+              <a:t> </a:t>
+            </a:r>
+            <a:r>
+              <a:rPr lang="en-US" dirty="0" err="1"/>
+              <a:t>baseados</a:t>
+            </a:r>
+            <a:r>
+              <a:rPr lang="en-US" dirty="0"/>
+              <a:t> </a:t>
+            </a:r>
+            <a:r>
+              <a:rPr lang="en-US" dirty="0" err="1"/>
+              <a:t>em</a:t>
+            </a:r>
+            <a:r>
+              <a:rPr lang="en-US" dirty="0"/>
+              <a:t> LLM (</a:t>
+            </a:r>
+            <a:r>
+              <a:rPr lang="en-US" dirty="0" err="1"/>
+              <a:t>como</a:t>
+            </a:r>
+            <a:r>
+              <a:rPr lang="en-US" dirty="0"/>
+              <a:t> </a:t>
+            </a:r>
+            <a:r>
+              <a:rPr lang="en-US" b="1" dirty="0"/>
+              <a:t>GENIUS, com GPT-4</a:t>
+            </a:r>
+            <a:r>
+              <a:rPr lang="en-US" dirty="0"/>
+              <a:t>).</a:t>
+            </a:r>
+          </a:p>
+        </p:txBody>
+      </p:sp>
+      <p:sp>
+        <p:nvSpPr>
+          <p:cNvPr id="4" name="Slide Number Placeholder 3">
+            <a:extLst>
+              <a:ext uri="{FF2B5EF4-FFF2-40B4-BE49-F238E27FC236}">
+                <a16:creationId xmlns:a16="http://schemas.microsoft.com/office/drawing/2014/main" id="{B7FF37E7-5E79-E642-2B11-1E52814B052F}"/>
+              </a:ext>
+            </a:extLst>
+          </p:cNvPr>
+          <p:cNvSpPr>
+            <a:spLocks noGrp="1"/>
+          </p:cNvSpPr>
+          <p:nvPr>
+            <p:ph type="sldNum" sz="quarter" idx="5"/>
+          </p:nvPr>
+        </p:nvSpPr>
+        <p:spPr/>
+        <p:txBody>
+          <a:bodyPr/>
+          <a:lstStyle/>
+          <a:p>
+            <a:fld id="{6FC8D850-966F-45A6-8DE7-15B891E7D40D}" type="slidenum">
+              <a:rPr lang="pt-BR" smtClean="0"/>
+              <a:t>19</a:t>
+            </a:fld>
+            <a:endParaRPr lang="pt-BR"/>
+          </a:p>
+        </p:txBody>
+      </p:sp>
+    </p:spTree>
+    <p:extLst>
+      <p:ext uri="{BB962C8B-B14F-4D97-AF65-F5344CB8AC3E}">
+        <p14:creationId xmlns:p14="http://schemas.microsoft.com/office/powerpoint/2010/main" val="3899773407"/>
+      </p:ext>
+    </p:extLst>
+  </p:cSld>
+  <p:clrMapOvr>
+    <a:masterClrMapping/>
+  </p:clrMapOvr>
+</p:notes>
+</file>
+
+<file path=ppt/notesSlides/notesSlide15.xml><?xml version="1.0" encoding="utf-8"?>
+<p:notes xmlns:a="http://schemas.openxmlformats.org/drawingml/2006/main" xmlns:r="http://schemas.openxmlformats.org/officeDocument/2006/relationships" xmlns:p="http://schemas.openxmlformats.org/presentationml/2006/main">
+  <p:cSld>
+    <p:spTree>
+      <p:nvGrpSpPr>
+        <p:cNvPr id="1" name="">
+          <a:extLst>
+            <a:ext uri="{FF2B5EF4-FFF2-40B4-BE49-F238E27FC236}">
+              <a16:creationId xmlns:a16="http://schemas.microsoft.com/office/drawing/2014/main" id="{984D4255-2128-E11B-6691-F09306F41F83}"/>
+            </a:ext>
+          </a:extLst>
+        </p:cNvPr>
+        <p:cNvGrpSpPr/>
+        <p:nvPr/>
+      </p:nvGrpSpPr>
+      <p:grpSpPr>
+        <a:xfrm>
+          <a:off x="0" y="0"/>
+          <a:ext cx="0" cy="0"/>
+          <a:chOff x="0" y="0"/>
+          <a:chExt cx="0" cy="0"/>
+        </a:xfrm>
+      </p:grpSpPr>
+      <p:sp>
+        <p:nvSpPr>
+          <p:cNvPr id="2" name="Slide Image Placeholder 1">
+            <a:extLst>
+              <a:ext uri="{FF2B5EF4-FFF2-40B4-BE49-F238E27FC236}">
+                <a16:creationId xmlns:a16="http://schemas.microsoft.com/office/drawing/2014/main" id="{4706B31F-04E9-C35C-7716-C3CCEB1073CC}"/>
+              </a:ext>
+            </a:extLst>
+          </p:cNvPr>
+          <p:cNvSpPr>
+            <a:spLocks noGrp="1" noRot="1" noChangeAspect="1"/>
+          </p:cNvSpPr>
+          <p:nvPr>
+            <p:ph type="sldImg"/>
+          </p:nvPr>
+        </p:nvSpPr>
+        <p:spPr/>
+      </p:sp>
+      <p:sp>
+        <p:nvSpPr>
+          <p:cNvPr id="3" name="Notes Placeholder 2">
+            <a:extLst>
+              <a:ext uri="{FF2B5EF4-FFF2-40B4-BE49-F238E27FC236}">
+                <a16:creationId xmlns:a16="http://schemas.microsoft.com/office/drawing/2014/main" id="{39B8DE94-5F00-35EB-0DEB-FA800303F48F}"/>
+              </a:ext>
+            </a:extLst>
+          </p:cNvPr>
+          <p:cNvSpPr>
+            <a:spLocks noGrp="1"/>
+          </p:cNvSpPr>
+          <p:nvPr>
+            <p:ph type="body" idx="1"/>
+          </p:nvPr>
+        </p:nvSpPr>
+        <p:spPr/>
+        <p:txBody>
+          <a:bodyPr/>
+          <a:lstStyle/>
+          <a:p>
+            <a:r>
+              <a:rPr lang="en-US" b="1" dirty="0" err="1"/>
+              <a:t>Eficiência</a:t>
+            </a:r>
+            <a:r>
+              <a:rPr lang="en-US" b="1" dirty="0"/>
+              <a:t> </a:t>
+            </a:r>
+            <a:r>
+              <a:rPr lang="en-US" b="1" dirty="0" err="1"/>
+              <a:t>em</a:t>
+            </a:r>
+            <a:r>
+              <a:rPr lang="en-US" b="1" dirty="0"/>
+              <a:t> </a:t>
+            </a:r>
+            <a:r>
+              <a:rPr lang="en-US" b="1" dirty="0" err="1"/>
+              <a:t>número</a:t>
+            </a:r>
+            <a:r>
+              <a:rPr lang="en-US" b="1" dirty="0"/>
+              <a:t> de </a:t>
+            </a:r>
+            <a:r>
+              <a:rPr lang="en-US" b="1" dirty="0" err="1"/>
+              <a:t>avaliações</a:t>
+            </a:r>
+            <a:endParaRPr lang="en-US" dirty="0"/>
+          </a:p>
+          <a:p>
+            <a:r>
+              <a:rPr lang="en-US" dirty="0" err="1"/>
+              <a:t>Encontra</a:t>
+            </a:r>
+            <a:r>
+              <a:rPr lang="en-US" dirty="0"/>
+              <a:t> </a:t>
+            </a:r>
+            <a:r>
+              <a:rPr lang="en-US" dirty="0" err="1"/>
+              <a:t>arquiteturas</a:t>
+            </a:r>
+            <a:r>
+              <a:rPr lang="en-US" dirty="0"/>
+              <a:t> </a:t>
+            </a:r>
+            <a:r>
+              <a:rPr lang="en-US" dirty="0" err="1"/>
+              <a:t>competitivas</a:t>
+            </a:r>
+            <a:r>
+              <a:rPr lang="en-US" dirty="0"/>
+              <a:t> </a:t>
+            </a:r>
+            <a:r>
+              <a:rPr lang="en-US" dirty="0" err="1"/>
+              <a:t>em</a:t>
+            </a:r>
+            <a:r>
+              <a:rPr lang="en-US" dirty="0"/>
+              <a:t> </a:t>
+            </a:r>
+            <a:r>
+              <a:rPr lang="en-US" b="1" dirty="0"/>
+              <a:t>~2.000 </a:t>
+            </a:r>
+            <a:r>
+              <a:rPr lang="en-US" b="1" dirty="0" err="1"/>
+              <a:t>avaliações</a:t>
+            </a:r>
+            <a:r>
+              <a:rPr lang="en-US" dirty="0"/>
+              <a:t>, </a:t>
+            </a:r>
+            <a:r>
+              <a:rPr lang="en-US" dirty="0" err="1"/>
+              <a:t>enquanto</a:t>
+            </a:r>
+            <a:r>
+              <a:rPr lang="en-US" dirty="0"/>
+              <a:t> </a:t>
+            </a:r>
+            <a:r>
+              <a:rPr lang="en-US" dirty="0" err="1"/>
+              <a:t>métodos</a:t>
+            </a:r>
+            <a:r>
+              <a:rPr lang="en-US" dirty="0"/>
+              <a:t> </a:t>
+            </a:r>
+            <a:r>
+              <a:rPr lang="en-US" dirty="0" err="1"/>
+              <a:t>tradicionais</a:t>
+            </a:r>
+            <a:r>
+              <a:rPr lang="en-US" dirty="0"/>
+              <a:t> (ex.: EfficientNet-B0) </a:t>
+            </a:r>
+            <a:r>
+              <a:rPr lang="en-US" dirty="0" err="1"/>
+              <a:t>precisaram</a:t>
+            </a:r>
+            <a:r>
+              <a:rPr lang="en-US" dirty="0"/>
+              <a:t> de </a:t>
+            </a:r>
+            <a:r>
+              <a:rPr lang="en-US" b="1" dirty="0"/>
+              <a:t>~8.000</a:t>
+            </a:r>
+            <a:r>
+              <a:rPr lang="en-US" dirty="0"/>
+              <a:t>.</a:t>
+            </a:r>
+          </a:p>
+          <a:p>
+            <a:r>
+              <a:rPr lang="en-US" dirty="0" err="1"/>
+              <a:t>Isso</a:t>
+            </a:r>
+            <a:r>
+              <a:rPr lang="en-US" dirty="0"/>
+              <a:t> </a:t>
+            </a:r>
+            <a:r>
+              <a:rPr lang="en-US" dirty="0" err="1"/>
+              <a:t>significa</a:t>
+            </a:r>
+            <a:r>
+              <a:rPr lang="en-US" dirty="0"/>
+              <a:t> </a:t>
+            </a:r>
+            <a:r>
+              <a:rPr lang="en-US" dirty="0" err="1"/>
+              <a:t>menor</a:t>
+            </a:r>
+            <a:r>
+              <a:rPr lang="en-US" dirty="0"/>
+              <a:t> </a:t>
+            </a:r>
+            <a:r>
+              <a:rPr lang="en-US" dirty="0" err="1"/>
+              <a:t>custo</a:t>
+            </a:r>
+            <a:r>
+              <a:rPr lang="en-US" dirty="0"/>
+              <a:t> </a:t>
+            </a:r>
+            <a:r>
+              <a:rPr lang="en-US" dirty="0" err="1"/>
+              <a:t>computacional</a:t>
+            </a:r>
+            <a:r>
+              <a:rPr lang="en-US" dirty="0"/>
+              <a:t> para </a:t>
+            </a:r>
+            <a:r>
+              <a:rPr lang="en-US" dirty="0" err="1"/>
+              <a:t>chegar</a:t>
+            </a:r>
+            <a:r>
+              <a:rPr lang="en-US" dirty="0"/>
+              <a:t> a bons </a:t>
+            </a:r>
+            <a:r>
+              <a:rPr lang="en-US" dirty="0" err="1"/>
+              <a:t>resultados</a:t>
+            </a:r>
+            <a:r>
+              <a:rPr lang="en-US" dirty="0"/>
+              <a:t>.</a:t>
+            </a:r>
+          </a:p>
+          <a:p>
+            <a:endParaRPr lang="en-US" b="1" dirty="0"/>
+          </a:p>
+          <a:p>
+            <a:r>
+              <a:rPr lang="en-US" b="1" dirty="0" err="1"/>
+              <a:t>Exploração</a:t>
+            </a:r>
+            <a:r>
+              <a:rPr lang="en-US" b="1" dirty="0"/>
+              <a:t> </a:t>
+            </a:r>
+            <a:r>
+              <a:rPr lang="en-US" b="1" dirty="0" err="1"/>
+              <a:t>guiada</a:t>
+            </a:r>
+            <a:r>
+              <a:rPr lang="en-US" b="1" dirty="0"/>
+              <a:t> </a:t>
+            </a:r>
+            <a:r>
+              <a:rPr lang="en-US" b="1" dirty="0" err="1"/>
+              <a:t>por</a:t>
+            </a:r>
+            <a:r>
+              <a:rPr lang="en-US" b="1" dirty="0"/>
+              <a:t> </a:t>
+            </a:r>
+            <a:r>
+              <a:rPr lang="en-US" b="1" dirty="0" err="1"/>
+              <a:t>conhecimento</a:t>
+            </a:r>
+            <a:r>
+              <a:rPr lang="en-US" b="1" dirty="0"/>
+              <a:t> </a:t>
+            </a:r>
+            <a:r>
+              <a:rPr lang="en-US" b="1" dirty="0" err="1"/>
+              <a:t>prévio</a:t>
+            </a:r>
+            <a:endParaRPr lang="en-US" dirty="0"/>
+          </a:p>
+          <a:p>
+            <a:r>
+              <a:rPr lang="en-US" dirty="0"/>
+              <a:t>Ao usar </a:t>
+            </a:r>
+            <a:r>
+              <a:rPr lang="en-US" b="1" dirty="0"/>
+              <a:t>LLMs </a:t>
+            </a:r>
+            <a:r>
+              <a:rPr lang="en-US" b="1" dirty="0" err="1"/>
+              <a:t>treinados</a:t>
+            </a:r>
+            <a:r>
+              <a:rPr lang="en-US" b="1" dirty="0"/>
+              <a:t> </a:t>
+            </a:r>
+            <a:r>
+              <a:rPr lang="en-US" b="1" dirty="0" err="1"/>
+              <a:t>em</a:t>
+            </a:r>
+            <a:r>
+              <a:rPr lang="en-US" b="1" dirty="0"/>
+              <a:t> </a:t>
+            </a:r>
+            <a:r>
+              <a:rPr lang="en-US" b="1" dirty="0" err="1"/>
+              <a:t>código</a:t>
+            </a:r>
+            <a:r>
+              <a:rPr lang="en-US" dirty="0"/>
+              <a:t>, o </a:t>
+            </a:r>
+            <a:r>
+              <a:rPr lang="en-US" dirty="0" err="1"/>
+              <a:t>sistema</a:t>
+            </a:r>
+            <a:r>
+              <a:rPr lang="en-US" dirty="0"/>
+              <a:t> </a:t>
+            </a:r>
+            <a:r>
+              <a:rPr lang="en-US" dirty="0" err="1"/>
+              <a:t>aproveita</a:t>
+            </a:r>
+            <a:r>
+              <a:rPr lang="en-US" dirty="0"/>
+              <a:t> o </a:t>
+            </a:r>
+            <a:r>
+              <a:rPr lang="en-US" b="1" dirty="0" err="1"/>
+              <a:t>conhecimento</a:t>
+            </a:r>
+            <a:r>
+              <a:rPr lang="en-US" b="1" dirty="0"/>
+              <a:t> </a:t>
+            </a:r>
+            <a:r>
+              <a:rPr lang="en-US" b="1" dirty="0" err="1"/>
+              <a:t>prévio</a:t>
+            </a:r>
+            <a:r>
+              <a:rPr lang="en-US" b="1" dirty="0"/>
+              <a:t> de </a:t>
+            </a:r>
+            <a:r>
+              <a:rPr lang="en-US" b="1" dirty="0" err="1"/>
+              <a:t>arquiteturas</a:t>
+            </a:r>
+            <a:r>
+              <a:rPr lang="en-US" b="1" dirty="0"/>
+              <a:t> de redes </a:t>
+            </a:r>
+            <a:r>
+              <a:rPr lang="en-US" b="1" dirty="0" err="1"/>
+              <a:t>neurais</a:t>
+            </a:r>
+            <a:r>
+              <a:rPr lang="en-US" dirty="0"/>
+              <a:t> </a:t>
+            </a:r>
+            <a:r>
+              <a:rPr lang="en-US" dirty="0" err="1"/>
+              <a:t>já</a:t>
+            </a:r>
+            <a:r>
+              <a:rPr lang="en-US" dirty="0"/>
+              <a:t> </a:t>
+            </a:r>
+            <a:r>
+              <a:rPr lang="en-US" dirty="0" err="1"/>
+              <a:t>embutido</a:t>
+            </a:r>
+            <a:r>
+              <a:rPr lang="en-US" dirty="0"/>
+              <a:t> nesses </a:t>
+            </a:r>
+            <a:r>
+              <a:rPr lang="en-US" dirty="0" err="1"/>
+              <a:t>modelos</a:t>
+            </a:r>
+            <a:r>
+              <a:rPr lang="en-US" dirty="0"/>
+              <a:t>.</a:t>
+            </a:r>
+          </a:p>
+          <a:p>
+            <a:r>
+              <a:rPr lang="en-US" dirty="0" err="1"/>
+              <a:t>Diferente</a:t>
+            </a:r>
+            <a:r>
+              <a:rPr lang="en-US" dirty="0"/>
+              <a:t> de </a:t>
+            </a:r>
+            <a:r>
+              <a:rPr lang="en-US" dirty="0" err="1"/>
+              <a:t>uma</a:t>
+            </a:r>
+            <a:r>
+              <a:rPr lang="en-US" dirty="0"/>
+              <a:t> </a:t>
+            </a:r>
+            <a:r>
+              <a:rPr lang="en-US" dirty="0" err="1"/>
+              <a:t>busca</a:t>
+            </a:r>
+            <a:r>
+              <a:rPr lang="en-US" dirty="0"/>
+              <a:t> </a:t>
+            </a:r>
+            <a:r>
+              <a:rPr lang="en-US" dirty="0" err="1"/>
+              <a:t>aleatória</a:t>
+            </a:r>
+            <a:r>
+              <a:rPr lang="en-US" dirty="0"/>
+              <a:t> </a:t>
+            </a:r>
+            <a:r>
+              <a:rPr lang="en-US" dirty="0" err="1"/>
+              <a:t>ou</a:t>
+            </a:r>
+            <a:r>
+              <a:rPr lang="en-US" dirty="0"/>
+              <a:t> “</a:t>
+            </a:r>
+            <a:r>
+              <a:rPr lang="en-US" dirty="0" err="1"/>
+              <a:t>cego</a:t>
+            </a:r>
+            <a:r>
+              <a:rPr lang="en-US" dirty="0"/>
+              <a:t>” de </a:t>
+            </a:r>
+            <a:r>
+              <a:rPr lang="en-US" dirty="0" err="1"/>
+              <a:t>evolução</a:t>
+            </a:r>
+            <a:r>
+              <a:rPr lang="en-US" dirty="0"/>
+              <a:t>, as </a:t>
+            </a:r>
+            <a:r>
+              <a:rPr lang="en-US" dirty="0" err="1"/>
+              <a:t>mutações</a:t>
+            </a:r>
+            <a:r>
+              <a:rPr lang="en-US" dirty="0"/>
+              <a:t> </a:t>
+            </a:r>
+            <a:r>
+              <a:rPr lang="en-US" dirty="0" err="1"/>
+              <a:t>são</a:t>
+            </a:r>
+            <a:r>
+              <a:rPr lang="en-US" dirty="0"/>
+              <a:t> </a:t>
+            </a:r>
+            <a:r>
+              <a:rPr lang="en-US" b="1" dirty="0" err="1"/>
+              <a:t>mais</a:t>
+            </a:r>
+            <a:r>
+              <a:rPr lang="en-US" b="1" dirty="0"/>
+              <a:t> </a:t>
+            </a:r>
+            <a:r>
+              <a:rPr lang="en-US" b="1" dirty="0" err="1"/>
+              <a:t>informadas</a:t>
+            </a:r>
+            <a:r>
+              <a:rPr lang="en-US" dirty="0"/>
+              <a:t>.</a:t>
+            </a:r>
+          </a:p>
+          <a:p>
+            <a:endParaRPr lang="en-US" b="1" dirty="0"/>
+          </a:p>
+          <a:p>
+            <a:r>
+              <a:rPr lang="en-US" b="1" dirty="0" err="1"/>
+              <a:t>Diversidade</a:t>
+            </a:r>
+            <a:r>
+              <a:rPr lang="en-US" b="1" dirty="0"/>
+              <a:t> de </a:t>
+            </a:r>
+            <a:r>
+              <a:rPr lang="en-US" b="1" dirty="0" err="1"/>
+              <a:t>soluções</a:t>
+            </a:r>
+            <a:r>
+              <a:rPr lang="en-US" b="1" dirty="0"/>
+              <a:t> (Quality Diversity)</a:t>
+            </a:r>
+            <a:endParaRPr lang="en-US" dirty="0"/>
+          </a:p>
+          <a:p>
+            <a:r>
+              <a:rPr lang="en-US" dirty="0"/>
+              <a:t>Em </a:t>
+            </a:r>
+            <a:r>
+              <a:rPr lang="en-US" dirty="0" err="1"/>
+              <a:t>vez</a:t>
+            </a:r>
+            <a:r>
+              <a:rPr lang="en-US" dirty="0"/>
+              <a:t> de </a:t>
+            </a:r>
+            <a:r>
+              <a:rPr lang="en-US" dirty="0" err="1"/>
+              <a:t>encontrar</a:t>
+            </a:r>
+            <a:r>
+              <a:rPr lang="en-US" dirty="0"/>
+              <a:t> </a:t>
+            </a:r>
+            <a:r>
+              <a:rPr lang="en-US" b="1" dirty="0" err="1"/>
+              <a:t>apenas</a:t>
+            </a:r>
+            <a:r>
+              <a:rPr lang="en-US" b="1" dirty="0"/>
+              <a:t> </a:t>
+            </a:r>
+            <a:r>
+              <a:rPr lang="en-US" b="1" dirty="0" err="1"/>
+              <a:t>uma</a:t>
+            </a:r>
+            <a:r>
+              <a:rPr lang="en-US" b="1" dirty="0"/>
+              <a:t> rede </a:t>
+            </a:r>
+            <a:r>
+              <a:rPr lang="en-US" b="1" dirty="0" err="1"/>
+              <a:t>ótima</a:t>
+            </a:r>
+            <a:r>
+              <a:rPr lang="en-US" dirty="0"/>
+              <a:t>, o </a:t>
+            </a:r>
+            <a:r>
+              <a:rPr lang="en-US" dirty="0" err="1"/>
+              <a:t>LLMatic</a:t>
+            </a:r>
+            <a:r>
+              <a:rPr lang="en-US" dirty="0"/>
+              <a:t> </a:t>
+            </a:r>
+            <a:r>
+              <a:rPr lang="en-US" dirty="0" err="1"/>
+              <a:t>gera</a:t>
+            </a:r>
+            <a:r>
+              <a:rPr lang="en-US" dirty="0"/>
+              <a:t> um </a:t>
+            </a:r>
+            <a:r>
+              <a:rPr lang="en-US" b="1" dirty="0"/>
+              <a:t>conjunto de </a:t>
+            </a:r>
+            <a:r>
+              <a:rPr lang="en-US" b="1" dirty="0" err="1"/>
+              <a:t>arquiteturas</a:t>
+            </a:r>
+            <a:r>
+              <a:rPr lang="en-US" b="1" dirty="0"/>
+              <a:t> </a:t>
+            </a:r>
+            <a:r>
+              <a:rPr lang="en-US" b="1" dirty="0" err="1"/>
+              <a:t>diversas</a:t>
+            </a:r>
+            <a:r>
+              <a:rPr lang="en-US" b="1" dirty="0"/>
+              <a:t> e de </a:t>
+            </a:r>
+            <a:r>
+              <a:rPr lang="en-US" b="1" dirty="0" err="1"/>
+              <a:t>qualidade</a:t>
+            </a:r>
+            <a:r>
+              <a:rPr lang="en-US" dirty="0"/>
+              <a:t> (redes </a:t>
+            </a:r>
+            <a:r>
+              <a:rPr lang="en-US" dirty="0" err="1"/>
+              <a:t>pequenas</a:t>
+            </a:r>
+            <a:r>
+              <a:rPr lang="en-US" dirty="0"/>
+              <a:t>, </a:t>
+            </a:r>
+            <a:r>
+              <a:rPr lang="en-US" dirty="0" err="1"/>
+              <a:t>médias</a:t>
+            </a:r>
+            <a:r>
+              <a:rPr lang="en-US" dirty="0"/>
+              <a:t> e </a:t>
+            </a:r>
+            <a:r>
+              <a:rPr lang="en-US" dirty="0" err="1"/>
+              <a:t>grandes</a:t>
+            </a:r>
+            <a:r>
+              <a:rPr lang="en-US" dirty="0"/>
+              <a:t>).</a:t>
+            </a:r>
+          </a:p>
+          <a:p>
+            <a:r>
+              <a:rPr lang="en-US" dirty="0" err="1"/>
+              <a:t>Isso</a:t>
+            </a:r>
+            <a:r>
+              <a:rPr lang="en-US" dirty="0"/>
+              <a:t> </a:t>
+            </a:r>
+            <a:r>
+              <a:rPr lang="en-US" dirty="0" err="1"/>
+              <a:t>ajuda</a:t>
+            </a:r>
+            <a:r>
+              <a:rPr lang="en-US" dirty="0"/>
+              <a:t> </a:t>
+            </a:r>
+            <a:r>
+              <a:rPr lang="en-US" dirty="0" err="1"/>
+              <a:t>em</a:t>
+            </a:r>
+            <a:r>
+              <a:rPr lang="en-US" dirty="0"/>
+              <a:t> </a:t>
+            </a:r>
+            <a:r>
+              <a:rPr lang="en-US" dirty="0" err="1"/>
+              <a:t>cenários</a:t>
+            </a:r>
+            <a:r>
+              <a:rPr lang="en-US" dirty="0"/>
+              <a:t> </a:t>
+            </a:r>
+            <a:r>
+              <a:rPr lang="en-US" dirty="0" err="1"/>
+              <a:t>práticos</a:t>
+            </a:r>
+            <a:r>
+              <a:rPr lang="en-US" dirty="0"/>
+              <a:t>, </a:t>
+            </a:r>
+            <a:r>
+              <a:rPr lang="en-US" dirty="0" err="1"/>
+              <a:t>como</a:t>
+            </a:r>
+            <a:r>
+              <a:rPr lang="en-US" dirty="0"/>
+              <a:t> </a:t>
+            </a:r>
+            <a:r>
+              <a:rPr lang="en-US" dirty="0" err="1"/>
+              <a:t>escolher</a:t>
+            </a:r>
+            <a:r>
+              <a:rPr lang="en-US" dirty="0"/>
+              <a:t> </a:t>
+            </a:r>
+            <a:r>
+              <a:rPr lang="en-US" dirty="0" err="1"/>
+              <a:t>arquiteturas</a:t>
+            </a:r>
+            <a:r>
+              <a:rPr lang="en-US" dirty="0"/>
+              <a:t> para </a:t>
+            </a:r>
+            <a:r>
+              <a:rPr lang="en-US" b="1" dirty="0" err="1"/>
+              <a:t>dispositivos</a:t>
+            </a:r>
+            <a:r>
+              <a:rPr lang="en-US" b="1" dirty="0"/>
+              <a:t> com </a:t>
+            </a:r>
+            <a:r>
+              <a:rPr lang="en-US" b="1" dirty="0" err="1"/>
+              <a:t>diferentes</a:t>
+            </a:r>
+            <a:r>
+              <a:rPr lang="en-US" b="1" dirty="0"/>
+              <a:t> </a:t>
+            </a:r>
+            <a:r>
+              <a:rPr lang="en-US" b="1" dirty="0" err="1"/>
+              <a:t>restrições</a:t>
+            </a:r>
+            <a:r>
+              <a:rPr lang="en-US" b="1" dirty="0"/>
+              <a:t> de hardware (RAM, FLOPS, etc.)</a:t>
+            </a:r>
+            <a:r>
+              <a:rPr lang="en-US" dirty="0"/>
+              <a:t>.</a:t>
+            </a:r>
+          </a:p>
+          <a:p>
+            <a:endParaRPr lang="en-US" b="1" dirty="0"/>
+          </a:p>
+          <a:p>
+            <a:r>
+              <a:rPr lang="en-US" b="1" dirty="0" err="1"/>
+              <a:t>Combinação</a:t>
+            </a:r>
+            <a:r>
+              <a:rPr lang="en-US" b="1" dirty="0"/>
+              <a:t> </a:t>
+            </a:r>
+            <a:r>
+              <a:rPr lang="en-US" b="1" dirty="0" err="1"/>
+              <a:t>inovadora</a:t>
+            </a:r>
+            <a:r>
+              <a:rPr lang="en-US" b="1" dirty="0"/>
+              <a:t> de </a:t>
+            </a:r>
+            <a:r>
+              <a:rPr lang="en-US" b="1" dirty="0" err="1"/>
+              <a:t>dois</a:t>
+            </a:r>
+            <a:r>
+              <a:rPr lang="en-US" b="1" dirty="0"/>
+              <a:t> </a:t>
+            </a:r>
+            <a:r>
+              <a:rPr lang="en-US" b="1" dirty="0" err="1"/>
+              <a:t>arquivos</a:t>
+            </a:r>
+            <a:r>
+              <a:rPr lang="en-US" b="1" dirty="0"/>
+              <a:t> </a:t>
+            </a:r>
+            <a:r>
+              <a:rPr lang="en-US" b="1" dirty="0" err="1"/>
+              <a:t>cooperativos</a:t>
+            </a:r>
+            <a:endParaRPr lang="en-US" dirty="0"/>
+          </a:p>
+          <a:p>
+            <a:r>
+              <a:rPr lang="en-US" b="1" dirty="0"/>
+              <a:t>Network Archive</a:t>
+            </a:r>
+            <a:r>
+              <a:rPr lang="en-US" dirty="0"/>
+              <a:t> → </a:t>
+            </a:r>
+            <a:r>
+              <a:rPr lang="en-US" dirty="0" err="1"/>
+              <a:t>avalia</a:t>
+            </a:r>
+            <a:r>
+              <a:rPr lang="en-US" dirty="0"/>
+              <a:t> </a:t>
+            </a:r>
+            <a:r>
+              <a:rPr lang="en-US" dirty="0" err="1"/>
+              <a:t>arquiteturas</a:t>
+            </a:r>
+            <a:r>
+              <a:rPr lang="en-US" dirty="0"/>
+              <a:t> </a:t>
+            </a:r>
+            <a:r>
+              <a:rPr lang="en-US" dirty="0" err="1"/>
+              <a:t>em</a:t>
+            </a:r>
+            <a:r>
+              <a:rPr lang="en-US" dirty="0"/>
+              <a:t> </a:t>
+            </a:r>
+            <a:r>
+              <a:rPr lang="en-US" dirty="0" err="1"/>
+              <a:t>termos</a:t>
+            </a:r>
+            <a:r>
+              <a:rPr lang="en-US" dirty="0"/>
+              <a:t> de </a:t>
+            </a:r>
+            <a:r>
+              <a:rPr lang="en-US" dirty="0" err="1"/>
+              <a:t>acurácia</a:t>
+            </a:r>
+            <a:r>
+              <a:rPr lang="en-US" dirty="0"/>
+              <a:t> + </a:t>
+            </a:r>
+            <a:r>
+              <a:rPr lang="en-US" dirty="0" err="1"/>
+              <a:t>descritores</a:t>
+            </a:r>
+            <a:r>
+              <a:rPr lang="en-US" dirty="0"/>
+              <a:t> (</a:t>
+            </a:r>
+            <a:r>
+              <a:rPr lang="en-US" dirty="0" err="1"/>
+              <a:t>largura</a:t>
+            </a:r>
+            <a:r>
+              <a:rPr lang="en-US" dirty="0"/>
+              <a:t>/</a:t>
+            </a:r>
+            <a:r>
+              <a:rPr lang="en-US" dirty="0" err="1"/>
+              <a:t>profundidade</a:t>
+            </a:r>
+            <a:r>
+              <a:rPr lang="en-US" dirty="0"/>
+              <a:t>, FLOPS).</a:t>
+            </a:r>
+          </a:p>
+          <a:p>
+            <a:r>
+              <a:rPr lang="en-US" b="1" dirty="0"/>
+              <a:t>Prompt Archive</a:t>
+            </a:r>
+            <a:r>
+              <a:rPr lang="en-US" dirty="0"/>
+              <a:t> → </a:t>
+            </a:r>
+            <a:r>
+              <a:rPr lang="en-US" dirty="0" err="1"/>
+              <a:t>avalia</a:t>
+            </a:r>
+            <a:r>
+              <a:rPr lang="en-US" dirty="0"/>
+              <a:t> a </a:t>
+            </a:r>
+            <a:r>
+              <a:rPr lang="en-US" dirty="0" err="1"/>
+              <a:t>eficácia</a:t>
+            </a:r>
+            <a:r>
+              <a:rPr lang="en-US" dirty="0"/>
+              <a:t> dos prompts e </a:t>
+            </a:r>
+            <a:r>
+              <a:rPr lang="en-US" dirty="0" err="1"/>
+              <a:t>ajusta</a:t>
+            </a:r>
+            <a:r>
+              <a:rPr lang="en-US" dirty="0"/>
+              <a:t> </a:t>
+            </a:r>
+            <a:r>
+              <a:rPr lang="en-US" dirty="0" err="1"/>
+              <a:t>automaticamente</a:t>
+            </a:r>
+            <a:r>
+              <a:rPr lang="en-US" dirty="0"/>
+              <a:t> a </a:t>
+            </a:r>
+            <a:r>
+              <a:rPr lang="en-US" dirty="0" err="1"/>
+              <a:t>temperatura</a:t>
+            </a:r>
+            <a:r>
+              <a:rPr lang="en-US" dirty="0"/>
+              <a:t> do LLM.</a:t>
+            </a:r>
+          </a:p>
+          <a:p>
+            <a:r>
+              <a:rPr lang="en-US" dirty="0"/>
+              <a:t>Essa </a:t>
+            </a:r>
+            <a:r>
+              <a:rPr lang="en-US" b="1" dirty="0" err="1"/>
+              <a:t>cooperação</a:t>
+            </a:r>
+            <a:r>
+              <a:rPr lang="en-US" dirty="0"/>
+              <a:t> </a:t>
+            </a:r>
+            <a:r>
+              <a:rPr lang="en-US" dirty="0" err="1"/>
+              <a:t>gera</a:t>
+            </a:r>
+            <a:r>
+              <a:rPr lang="en-US" dirty="0"/>
+              <a:t> um </a:t>
+            </a:r>
+            <a:r>
+              <a:rPr lang="en-US" dirty="0" err="1"/>
+              <a:t>ciclo</a:t>
+            </a:r>
+            <a:r>
+              <a:rPr lang="en-US" dirty="0"/>
+              <a:t> virtuoso: bons prompts → boas redes → </a:t>
+            </a:r>
+            <a:r>
+              <a:rPr lang="en-US" dirty="0" err="1"/>
+              <a:t>melhora</a:t>
+            </a:r>
+            <a:r>
+              <a:rPr lang="en-US" dirty="0"/>
+              <a:t> dos </a:t>
+            </a:r>
+            <a:r>
+              <a:rPr lang="en-US" dirty="0" err="1"/>
+              <a:t>arquivos</a:t>
+            </a:r>
+            <a:r>
+              <a:rPr lang="en-US" dirty="0"/>
+              <a:t> → </a:t>
+            </a:r>
+            <a:r>
+              <a:rPr lang="en-US" dirty="0" err="1"/>
+              <a:t>melhores</a:t>
+            </a:r>
+            <a:r>
+              <a:rPr lang="en-US" dirty="0"/>
+              <a:t> </a:t>
+            </a:r>
+            <a:r>
+              <a:rPr lang="en-US" dirty="0" err="1"/>
+              <a:t>próximos</a:t>
+            </a:r>
+            <a:r>
+              <a:rPr lang="en-US" dirty="0"/>
+              <a:t> prompts.</a:t>
+            </a:r>
+          </a:p>
+          <a:p>
+            <a:endParaRPr lang="en-US" b="1" dirty="0"/>
+          </a:p>
+          <a:p>
+            <a:r>
+              <a:rPr lang="en-US" b="1" dirty="0" err="1"/>
+              <a:t>Resultados</a:t>
+            </a:r>
+            <a:r>
+              <a:rPr lang="en-US" b="1" dirty="0"/>
+              <a:t> </a:t>
+            </a:r>
+            <a:r>
+              <a:rPr lang="en-US" b="1" dirty="0" err="1"/>
+              <a:t>competitivos</a:t>
+            </a:r>
+            <a:r>
+              <a:rPr lang="en-US" b="1" dirty="0"/>
+              <a:t> com SOTA (state-of-the-art)</a:t>
+            </a:r>
+            <a:endParaRPr lang="en-US" dirty="0"/>
+          </a:p>
+          <a:p>
+            <a:r>
+              <a:rPr lang="en-US" dirty="0"/>
+              <a:t>Em CIFAR-10 e NAS-Bench-201, o </a:t>
+            </a:r>
+            <a:r>
+              <a:rPr lang="en-US" dirty="0" err="1"/>
+              <a:t>LLMatic</a:t>
+            </a:r>
+            <a:r>
+              <a:rPr lang="en-US" dirty="0"/>
+              <a:t> </a:t>
+            </a:r>
+            <a:r>
+              <a:rPr lang="en-US" dirty="0" err="1"/>
+              <a:t>chegou</a:t>
+            </a:r>
+            <a:r>
+              <a:rPr lang="en-US" dirty="0"/>
+              <a:t> </a:t>
+            </a:r>
+            <a:r>
+              <a:rPr lang="en-US" dirty="0" err="1"/>
+              <a:t>muito</a:t>
+            </a:r>
+            <a:r>
+              <a:rPr lang="en-US" dirty="0"/>
+              <a:t> </a:t>
+            </a:r>
+            <a:r>
+              <a:rPr lang="en-US" dirty="0" err="1"/>
+              <a:t>próximo</a:t>
+            </a:r>
+            <a:r>
+              <a:rPr lang="en-US" dirty="0"/>
+              <a:t> dos </a:t>
+            </a:r>
+            <a:r>
+              <a:rPr lang="en-US" b="1" dirty="0" err="1"/>
+              <a:t>melhores</a:t>
+            </a:r>
+            <a:r>
+              <a:rPr lang="en-US" b="1" dirty="0"/>
+              <a:t> </a:t>
+            </a:r>
+            <a:r>
+              <a:rPr lang="en-US" b="1" dirty="0" err="1"/>
+              <a:t>resultados</a:t>
+            </a:r>
+            <a:r>
+              <a:rPr lang="en-US" b="1" dirty="0"/>
+              <a:t> </a:t>
+            </a:r>
+            <a:r>
+              <a:rPr lang="en-US" b="1" dirty="0" err="1"/>
+              <a:t>conhecidos</a:t>
+            </a:r>
+            <a:r>
+              <a:rPr lang="en-US" dirty="0"/>
+              <a:t>, </a:t>
+            </a:r>
+            <a:r>
+              <a:rPr lang="en-US" dirty="0" err="1"/>
+              <a:t>apesar</a:t>
+            </a:r>
+            <a:r>
+              <a:rPr lang="en-US" dirty="0"/>
+              <a:t> de usar </a:t>
+            </a:r>
+            <a:r>
+              <a:rPr lang="en-US" dirty="0" err="1"/>
+              <a:t>menos</a:t>
+            </a:r>
+            <a:r>
+              <a:rPr lang="en-US" dirty="0"/>
+              <a:t> </a:t>
+            </a:r>
+            <a:r>
+              <a:rPr lang="en-US" dirty="0" err="1"/>
+              <a:t>recursos</a:t>
+            </a:r>
+            <a:r>
+              <a:rPr lang="en-US" dirty="0"/>
+              <a:t>.</a:t>
+            </a:r>
+          </a:p>
+          <a:p>
+            <a:r>
+              <a:rPr lang="en-US" dirty="0" err="1"/>
+              <a:t>Superou</a:t>
+            </a:r>
+            <a:r>
+              <a:rPr lang="en-US" dirty="0"/>
+              <a:t> outros </a:t>
+            </a:r>
+            <a:r>
+              <a:rPr lang="en-US" dirty="0" err="1"/>
+              <a:t>métodos</a:t>
+            </a:r>
+            <a:r>
+              <a:rPr lang="en-US" dirty="0"/>
+              <a:t> </a:t>
+            </a:r>
+            <a:r>
+              <a:rPr lang="en-US" dirty="0" err="1"/>
+              <a:t>baseados</a:t>
+            </a:r>
+            <a:r>
+              <a:rPr lang="en-US" dirty="0"/>
+              <a:t> </a:t>
+            </a:r>
+            <a:r>
+              <a:rPr lang="en-US" dirty="0" err="1"/>
+              <a:t>em</a:t>
+            </a:r>
+            <a:r>
+              <a:rPr lang="en-US" dirty="0"/>
+              <a:t> LLM (</a:t>
+            </a:r>
+            <a:r>
+              <a:rPr lang="en-US" dirty="0" err="1"/>
+              <a:t>como</a:t>
+            </a:r>
+            <a:r>
+              <a:rPr lang="en-US" dirty="0"/>
+              <a:t> </a:t>
+            </a:r>
+            <a:r>
+              <a:rPr lang="en-US" b="1" dirty="0"/>
+              <a:t>GENIUS, com GPT-4</a:t>
+            </a:r>
+            <a:r>
+              <a:rPr lang="en-US" dirty="0"/>
+              <a:t>).</a:t>
+            </a:r>
+          </a:p>
+        </p:txBody>
+      </p:sp>
+      <p:sp>
+        <p:nvSpPr>
+          <p:cNvPr id="4" name="Slide Number Placeholder 3">
+            <a:extLst>
+              <a:ext uri="{FF2B5EF4-FFF2-40B4-BE49-F238E27FC236}">
+                <a16:creationId xmlns:a16="http://schemas.microsoft.com/office/drawing/2014/main" id="{E72B1FE6-2CAF-5CA1-846E-280E6F803194}"/>
+              </a:ext>
+            </a:extLst>
+          </p:cNvPr>
+          <p:cNvSpPr>
+            <a:spLocks noGrp="1"/>
+          </p:cNvSpPr>
+          <p:nvPr>
+            <p:ph type="sldNum" sz="quarter" idx="5"/>
+          </p:nvPr>
+        </p:nvSpPr>
+        <p:spPr/>
+        <p:txBody>
+          <a:bodyPr/>
+          <a:lstStyle/>
+          <a:p>
+            <a:fld id="{6FC8D850-966F-45A6-8DE7-15B891E7D40D}" type="slidenum">
+              <a:rPr lang="pt-BR" smtClean="0"/>
+              <a:t>20</a:t>
+            </a:fld>
+            <a:endParaRPr lang="pt-BR"/>
+          </a:p>
+        </p:txBody>
+      </p:sp>
+    </p:spTree>
+    <p:extLst>
+      <p:ext uri="{BB962C8B-B14F-4D97-AF65-F5344CB8AC3E}">
+        <p14:creationId xmlns:p14="http://schemas.microsoft.com/office/powerpoint/2010/main" val="3462305635"/>
       </p:ext>
     </p:extLst>
   </p:cSld>
@@ -5630,7 +7982,7 @@
         </p:spPr>
         <p:txBody>
           <a:bodyPr>
-            <a:normAutofit/>
+            <a:normAutofit fontScale="90000"/>
           </a:bodyPr>
           <a:lstStyle/>
           <a:p>
@@ -5642,9 +7994,22 @@
               <a:rPr lang="pt-BR" noProof="0" dirty="0"/>
             </a:br>
             <a:r>
+              <a:rPr lang="pt-BR" b="1" i="1" noProof="0" dirty="0" err="1"/>
+              <a:t>LLMatic</a:t>
+            </a:r>
+            <a:r>
               <a:rPr lang="pt-BR" b="1" i="1" noProof="0" dirty="0"/>
-              <a:t>Adicione aqui seu tema</a:t>
-            </a:r>
+              <a:t>: NAS via LLM e QD </a:t>
+            </a:r>
+            <a:r>
+              <a:rPr lang="pt-BR" b="1" i="1" dirty="0"/>
+              <a:t>O</a:t>
+            </a:r>
+            <a:r>
+              <a:rPr lang="pt-BR" b="1" i="1" noProof="0" dirty="0" err="1"/>
+              <a:t>ptimization</a:t>
+            </a:r>
+            <a:endParaRPr lang="pt-BR" b="1" i="1" noProof="0" dirty="0"/>
           </a:p>
         </p:txBody>
       </p:sp>
@@ -7344,7 +9709,7 @@
           <a:p>
             <a:r>
               <a:rPr lang="pt-BR" noProof="0" dirty="0"/>
-              <a:t>Vantagens e desvantagens</a:t>
+              <a:t>Vantagens</a:t>
             </a:r>
           </a:p>
         </p:txBody>
@@ -7367,10 +9732,125 @@
         </p:nvSpPr>
         <p:spPr/>
         <p:txBody>
-          <a:bodyPr/>
+          <a:bodyPr>
+            <a:normAutofit lnSpcReduction="10000"/>
+          </a:bodyPr>
           <a:lstStyle/>
           <a:p>
-            <a:endParaRPr lang="pt-BR" noProof="0" dirty="0"/>
+            <a:pPr marL="393700" indent="-393700">
+              <a:buFont typeface="+mj-lt"/>
+              <a:buAutoNum type="arabicPeriod"/>
+            </a:pPr>
+            <a:r>
+              <a:rPr lang="pt-BR" b="1" noProof="0" dirty="0"/>
+              <a:t>Eficiência em número de avaliações</a:t>
+            </a:r>
+          </a:p>
+          <a:p>
+            <a:pPr marL="457200" lvl="1" indent="0">
+              <a:buNone/>
+            </a:pPr>
+            <a:r>
+              <a:rPr lang="pt-BR" noProof="0" dirty="0"/>
+              <a:t>Encontra arquiteturas competitivas em </a:t>
+            </a:r>
+            <a:r>
+              <a:rPr lang="pt-BR" b="1" noProof="0" dirty="0">
+                <a:solidFill>
+                  <a:schemeClr val="accent6">
+                    <a:lumMod val="75000"/>
+                  </a:schemeClr>
+                </a:solidFill>
+              </a:rPr>
+              <a:t>~2.000 avaliações</a:t>
+            </a:r>
+            <a:r>
+              <a:rPr lang="pt-BR" noProof="0" dirty="0"/>
+              <a:t>, enquanto métodos tradicionais (ex.: EfficientNet-B0) precisaram de </a:t>
+            </a:r>
+            <a:r>
+              <a:rPr lang="pt-BR" b="1" noProof="0" dirty="0"/>
+              <a:t>~8.000</a:t>
+            </a:r>
+            <a:r>
+              <a:rPr lang="pt-BR" noProof="0" dirty="0"/>
+              <a:t>.</a:t>
+            </a:r>
+          </a:p>
+          <a:p>
+            <a:pPr marL="393700" indent="-393700">
+              <a:buFont typeface="+mj-lt"/>
+              <a:buAutoNum type="arabicPeriod"/>
+            </a:pPr>
+            <a:r>
+              <a:rPr lang="pt-BR" b="1" noProof="0" dirty="0"/>
+              <a:t>Exploração guiada por conhecimento prévio</a:t>
+            </a:r>
+          </a:p>
+          <a:p>
+            <a:pPr marL="457200" lvl="1" indent="0">
+              <a:buNone/>
+            </a:pPr>
+            <a:r>
+              <a:rPr lang="pt-BR" noProof="0" dirty="0"/>
+              <a:t>Ao usar </a:t>
+            </a:r>
+            <a:r>
+              <a:rPr lang="pt-BR" noProof="0" dirty="0" err="1"/>
+              <a:t>LLMs</a:t>
+            </a:r>
+            <a:r>
+              <a:rPr lang="pt-BR" noProof="0" dirty="0"/>
+              <a:t> treinados em código, o sistema aproveita o conhecimento prévio de arquiteturas de redes neurais já embutido nesses modelos.</a:t>
+            </a:r>
+          </a:p>
+          <a:p>
+            <a:pPr marL="393700" indent="-393700">
+              <a:buFont typeface="+mj-lt"/>
+              <a:buAutoNum type="arabicPeriod"/>
+            </a:pPr>
+            <a:r>
+              <a:rPr lang="pt-BR" b="1" noProof="0" dirty="0"/>
+              <a:t>Diversidade de soluções (</a:t>
+            </a:r>
+            <a:r>
+              <a:rPr lang="pt-BR" b="1" noProof="0" dirty="0" err="1"/>
+              <a:t>Quality</a:t>
+            </a:r>
+            <a:r>
+              <a:rPr lang="pt-BR" b="1" noProof="0" dirty="0"/>
+              <a:t> </a:t>
+            </a:r>
+            <a:r>
+              <a:rPr lang="pt-BR" b="1" noProof="0" dirty="0" err="1"/>
+              <a:t>Diversity</a:t>
+            </a:r>
+            <a:r>
+              <a:rPr lang="pt-BR" b="1" noProof="0" dirty="0"/>
+              <a:t>)</a:t>
+            </a:r>
+          </a:p>
+          <a:p>
+            <a:pPr lvl="1"/>
+            <a:r>
+              <a:rPr lang="pt-BR" noProof="0" dirty="0"/>
+              <a:t>Em vez de encontrar apenas uma rede ótima, o </a:t>
+            </a:r>
+            <a:r>
+              <a:rPr lang="pt-BR" noProof="0" dirty="0" err="1"/>
+              <a:t>LLMatic</a:t>
+            </a:r>
+            <a:r>
+              <a:rPr lang="pt-BR" noProof="0" dirty="0"/>
+              <a:t> gera um conjunto de arquiteturas diversas e de qualidade (redes pequenas, médias e grandes).</a:t>
+            </a:r>
+          </a:p>
+          <a:p>
+            <a:pPr lvl="1"/>
+            <a:r>
+              <a:rPr lang="pt-BR" noProof="0" dirty="0"/>
+              <a:t>Isso ajuda em cenários práticos, como escolher arquiteturas para dispositivos com diferentes restrições de hardware (RAM, FLOPS, etc.).</a:t>
+            </a:r>
           </a:p>
         </p:txBody>
       </p:sp>
@@ -7392,7 +9872,13 @@
   <p:cSld>
     <p:spTree>
       <p:nvGrpSpPr>
-        <p:cNvPr id="1" name=""/>
+        <p:cNvPr id="1" name="">
+          <a:extLst>
+            <a:ext uri="{FF2B5EF4-FFF2-40B4-BE49-F238E27FC236}">
+              <a16:creationId xmlns:a16="http://schemas.microsoft.com/office/drawing/2014/main" id="{BA25552A-A7DA-825C-E296-D933E40A90FB}"/>
+            </a:ext>
+          </a:extLst>
+        </p:cNvPr>
         <p:cNvGrpSpPr/>
         <p:nvPr/>
       </p:nvGrpSpPr>
@@ -7409,7 +9895,7 @@
           <p:cNvPr id="2" name="Título 1">
             <a:extLst>
               <a:ext uri="{FF2B5EF4-FFF2-40B4-BE49-F238E27FC236}">
-                <a16:creationId xmlns:a16="http://schemas.microsoft.com/office/drawing/2014/main" id="{B9E502FC-4440-F5DA-F299-69CD15E702AE}"/>
+                <a16:creationId xmlns:a16="http://schemas.microsoft.com/office/drawing/2014/main" id="{C9052B33-D825-9A44-7F64-AFA10A5FB713}"/>
               </a:ext>
             </a:extLst>
           </p:cNvPr>
@@ -7427,15 +9913,7 @@
           <a:p>
             <a:r>
               <a:rPr lang="pt-BR" noProof="0" dirty="0"/>
-              <a:t>Exemplo(</a:t>
-            </a:r>
-            <a:r>
-              <a:rPr lang="pt-BR" noProof="0" dirty="0" err="1"/>
-              <a:t>s</a:t>
-            </a:r>
-            <a:r>
-              <a:rPr lang="pt-BR" noProof="0" dirty="0"/>
-              <a:t>) de aplicação</a:t>
+              <a:t>Vantagens</a:t>
             </a:r>
           </a:p>
         </p:txBody>
@@ -7445,7 +9923,7 @@
           <p:cNvPr id="3" name="Espaço Reservado para Conteúdo 2">
             <a:extLst>
               <a:ext uri="{FF2B5EF4-FFF2-40B4-BE49-F238E27FC236}">
-                <a16:creationId xmlns:a16="http://schemas.microsoft.com/office/drawing/2014/main" id="{69359096-6B47-BEA3-55AD-95F90CDC8489}"/>
+                <a16:creationId xmlns:a16="http://schemas.microsoft.com/office/drawing/2014/main" id="{E4E16273-C819-8417-9A5E-692DE3B56655}"/>
               </a:ext>
             </a:extLst>
           </p:cNvPr>
@@ -7458,17 +9936,129 @@
         </p:nvSpPr>
         <p:spPr/>
         <p:txBody>
-          <a:bodyPr/>
+          <a:bodyPr>
+            <a:normAutofit fontScale="92500" lnSpcReduction="20000"/>
+          </a:bodyPr>
           <a:lstStyle/>
           <a:p>
-            <a:endParaRPr lang="pt-BR" noProof="0" dirty="0"/>
+            <a:pPr marL="393700" indent="-393700">
+              <a:lnSpc>
+                <a:spcPct val="110000"/>
+              </a:lnSpc>
+              <a:buFont typeface="+mj-lt"/>
+              <a:buAutoNum type="arabicPeriod" startAt="4"/>
+            </a:pPr>
+            <a:r>
+              <a:rPr lang="pt-BR" sz="3000" b="1" noProof="0" dirty="0"/>
+              <a:t>Combinação inovadora de dois arquivos cooperativos</a:t>
+            </a:r>
+          </a:p>
+          <a:p>
+            <a:pPr lvl="1">
+              <a:lnSpc>
+                <a:spcPct val="110000"/>
+              </a:lnSpc>
+            </a:pPr>
+            <a:r>
+              <a:rPr lang="pt-BR" sz="2600" noProof="0" dirty="0"/>
+              <a:t>Network </a:t>
+            </a:r>
+            <a:r>
+              <a:rPr lang="pt-BR" sz="2600" noProof="0" dirty="0" err="1"/>
+              <a:t>Archive</a:t>
+            </a:r>
+            <a:r>
+              <a:rPr lang="pt-BR" sz="2600" noProof="0" dirty="0"/>
+              <a:t> → avalia arquiteturas em termos de acurácia + descritores (largura/profundidade, FLOPS).</a:t>
+            </a:r>
+          </a:p>
+          <a:p>
+            <a:pPr lvl="1">
+              <a:lnSpc>
+                <a:spcPct val="110000"/>
+              </a:lnSpc>
+            </a:pPr>
+            <a:r>
+              <a:rPr lang="pt-BR" sz="2600" noProof="0" dirty="0"/>
+              <a:t>Prompt </a:t>
+            </a:r>
+            <a:r>
+              <a:rPr lang="pt-BR" sz="2600" noProof="0" dirty="0" err="1"/>
+              <a:t>Archive</a:t>
+            </a:r>
+            <a:r>
+              <a:rPr lang="pt-BR" sz="2600" noProof="0" dirty="0"/>
+              <a:t> → avalia a eficácia dos prompts e ajusta automaticamente a temperatura do LLM.</a:t>
+            </a:r>
+          </a:p>
+          <a:p>
+            <a:pPr lvl="1">
+              <a:lnSpc>
+                <a:spcPct val="110000"/>
+              </a:lnSpc>
+            </a:pPr>
+            <a:r>
+              <a:rPr lang="pt-BR" sz="2600" noProof="0" dirty="0"/>
+              <a:t>Essa cooperação gera um ciclo virtuoso: bons prompts → boas redes → melhora dos arquivos → melhores próximos prompts.</a:t>
+            </a:r>
+          </a:p>
+          <a:p>
+            <a:pPr marL="444500" indent="-444500">
+              <a:lnSpc>
+                <a:spcPct val="110000"/>
+              </a:lnSpc>
+              <a:buFont typeface="+mj-lt"/>
+              <a:buAutoNum type="arabicPeriod" startAt="5"/>
+            </a:pPr>
+            <a:r>
+              <a:rPr lang="pt-BR" sz="3000" b="1" noProof="0" dirty="0"/>
+              <a:t>Resultados competitivos com SOTA (</a:t>
+            </a:r>
+            <a:r>
+              <a:rPr lang="pt-BR" sz="3000" b="1" noProof="0" dirty="0" err="1"/>
+              <a:t>state-of-the-art</a:t>
+            </a:r>
+            <a:r>
+              <a:rPr lang="pt-BR" sz="3000" b="1" noProof="0" dirty="0"/>
+              <a:t>)</a:t>
+            </a:r>
+          </a:p>
+          <a:p>
+            <a:pPr lvl="1">
+              <a:lnSpc>
+                <a:spcPct val="110000"/>
+              </a:lnSpc>
+            </a:pPr>
+            <a:r>
+              <a:rPr lang="pt-BR" sz="2600" noProof="0" dirty="0"/>
+              <a:t>Em CIFAR-10 e NAS-Bench-201, o </a:t>
+            </a:r>
+            <a:r>
+              <a:rPr lang="pt-BR" sz="2600" noProof="0" dirty="0" err="1"/>
+              <a:t>LLMatic</a:t>
+            </a:r>
+            <a:r>
+              <a:rPr lang="pt-BR" sz="2600" noProof="0" dirty="0"/>
+              <a:t> chegou muito próximo dos melhores resultados conhecidos, apesar de usar menos recursos.</a:t>
+            </a:r>
+          </a:p>
+          <a:p>
+            <a:pPr lvl="1">
+              <a:lnSpc>
+                <a:spcPct val="110000"/>
+              </a:lnSpc>
+            </a:pPr>
+            <a:r>
+              <a:rPr lang="pt-BR" sz="2600" noProof="0" dirty="0"/>
+              <a:t>Superou outros métodos baseados em LLM (como GENIUS, com GPT-4).</a:t>
+            </a:r>
           </a:p>
         </p:txBody>
       </p:sp>
     </p:spTree>
     <p:extLst>
       <p:ext uri="{BB962C8B-B14F-4D97-AF65-F5344CB8AC3E}">
-        <p14:creationId xmlns:p14="http://schemas.microsoft.com/office/powerpoint/2010/main" val="1532530965"/>
+        <p14:creationId xmlns:p14="http://schemas.microsoft.com/office/powerpoint/2010/main" val="516898449"/>
       </p:ext>
     </p:extLst>
   </p:cSld>
@@ -7611,7 +10201,13 @@
   <p:cSld>
     <p:spTree>
       <p:nvGrpSpPr>
-        <p:cNvPr id="1" name=""/>
+        <p:cNvPr id="1" name="">
+          <a:extLst>
+            <a:ext uri="{FF2B5EF4-FFF2-40B4-BE49-F238E27FC236}">
+              <a16:creationId xmlns:a16="http://schemas.microsoft.com/office/drawing/2014/main" id="{241520F5-FF80-7350-34EF-3AAD800D6DE2}"/>
+            </a:ext>
+          </a:extLst>
+        </p:cNvPr>
         <p:cNvGrpSpPr/>
         <p:nvPr/>
       </p:nvGrpSpPr>
@@ -7628,7 +10224,7 @@
           <p:cNvPr id="2" name="Título 1">
             <a:extLst>
               <a:ext uri="{FF2B5EF4-FFF2-40B4-BE49-F238E27FC236}">
-                <a16:creationId xmlns:a16="http://schemas.microsoft.com/office/drawing/2014/main" id="{B7EBC8F7-03EF-338A-A90B-280A41AF9688}"/>
+                <a16:creationId xmlns:a16="http://schemas.microsoft.com/office/drawing/2014/main" id="{0DDC1C02-351A-8144-3638-90E492AAC037}"/>
               </a:ext>
             </a:extLst>
           </p:cNvPr>
@@ -7646,7 +10242,7 @@
           <a:p>
             <a:r>
               <a:rPr lang="pt-BR" noProof="0" dirty="0"/>
-              <a:t>Comparação com outros algoritmos</a:t>
+              <a:t>Desvantagens</a:t>
             </a:r>
           </a:p>
         </p:txBody>
@@ -7656,7 +10252,7 @@
           <p:cNvPr id="3" name="Espaço Reservado para Conteúdo 2">
             <a:extLst>
               <a:ext uri="{FF2B5EF4-FFF2-40B4-BE49-F238E27FC236}">
-                <a16:creationId xmlns:a16="http://schemas.microsoft.com/office/drawing/2014/main" id="{C525BCE7-C19D-7DDA-016A-E3016C398CBA}"/>
+                <a16:creationId xmlns:a16="http://schemas.microsoft.com/office/drawing/2014/main" id="{8D184DEC-F5D4-B32F-4458-723211AB04BA}"/>
               </a:ext>
             </a:extLst>
           </p:cNvPr>
@@ -7672,6 +10268,50 @@
           <a:bodyPr/>
           <a:lstStyle/>
           <a:p>
+            <a:pPr marL="514350" indent="-514350">
+              <a:buFont typeface="+mj-lt"/>
+              <a:buAutoNum type="arabicPeriod"/>
+            </a:pPr>
+            <a:r>
+              <a:rPr lang="pt-BR" noProof="0" dirty="0"/>
+              <a:t>Existem </a:t>
+            </a:r>
+            <a:r>
+              <a:rPr lang="pt-BR" noProof="0" dirty="0" err="1"/>
+              <a:t>LLMs</a:t>
+            </a:r>
+            <a:r>
+              <a:rPr lang="pt-BR" noProof="0" dirty="0"/>
+              <a:t> maiores que possibilitariam </a:t>
+            </a:r>
+            <a:r>
+              <a:rPr lang="pt-BR" dirty="0"/>
+              <a:t>melhorar a </a:t>
+            </a:r>
+            <a:r>
+              <a:rPr lang="pt-BR" b="1" dirty="0"/>
+              <a:t>qualidade e a criatividade das arquiteturas geradas;</a:t>
+            </a:r>
+          </a:p>
+          <a:p>
+            <a:pPr marL="514350" indent="-514350">
+              <a:buFont typeface="+mj-lt"/>
+              <a:buAutoNum type="arabicPeriod"/>
+            </a:pPr>
+            <a:r>
+              <a:rPr lang="pt-BR" dirty="0"/>
+              <a:t>CodeGen-6.1B é pago. Seria interessante o uso de um LLM gratuito;</a:t>
+            </a:r>
+          </a:p>
+          <a:p>
+            <a:pPr marL="514350" indent="-514350">
+              <a:buFont typeface="+mj-lt"/>
+              <a:buAutoNum type="arabicPeriod"/>
+            </a:pPr>
+            <a:r>
+              <a:rPr lang="pt-BR" dirty="0"/>
+              <a:t>Alto custo computacional.</a:t>
+            </a:r>
             <a:endParaRPr lang="pt-BR" noProof="0" dirty="0"/>
           </a:p>
         </p:txBody>
@@ -7679,7 +10319,7 @@
     </p:spTree>
     <p:extLst>
       <p:ext uri="{BB962C8B-B14F-4D97-AF65-F5344CB8AC3E}">
-        <p14:creationId xmlns:p14="http://schemas.microsoft.com/office/powerpoint/2010/main" val="3601469261"/>
+        <p14:creationId xmlns:p14="http://schemas.microsoft.com/office/powerpoint/2010/main" val="226373761"/>
       </p:ext>
     </p:extLst>
   </p:cSld>
@@ -7708,64 +10348,140 @@
       </p:grpSpPr>
       <p:sp>
         <p:nvSpPr>
-          <p:cNvPr id="4" name="Título 1">
-            <a:extLst>
-              <a:ext uri="{FF2B5EF4-FFF2-40B4-BE49-F238E27FC236}">
-                <a16:creationId xmlns:a16="http://schemas.microsoft.com/office/drawing/2014/main" id="{32666AC8-2E17-4DB4-B0F5-60C640CCFD2E}"/>
-              </a:ext>
-            </a:extLst>
-          </p:cNvPr>
-          <p:cNvSpPr txBox="1">
-            <a:spLocks/>
-          </p:cNvSpPr>
-          <p:nvPr/>
-        </p:nvSpPr>
-        <p:spPr>
-          <a:xfrm>
-            <a:off x="1431533" y="2720526"/>
-            <a:ext cx="9144000" cy="1029541"/>
-          </a:xfrm>
-          <a:prstGeom prst="rect">
-            <a:avLst/>
-          </a:prstGeom>
-        </p:spPr>
-        <p:txBody>
-          <a:bodyPr vert="horz" lIns="91440" tIns="45720" rIns="91440" bIns="45720" rtlCol="0" anchor="ctr">
-            <a:normAutofit/>
-          </a:bodyPr>
-          <a:lstStyle>
-            <a:lvl1pPr algn="l" defTabSz="914400" rtl="0" eaLnBrk="1" latinLnBrk="0" hangingPunct="1">
-              <a:lnSpc>
-                <a:spcPct val="90000"/>
-              </a:lnSpc>
-              <a:spcBef>
-                <a:spcPct val="0"/>
-              </a:spcBef>
-              <a:buNone/>
-              <a:defRPr sz="4400" kern="1200">
-                <a:solidFill>
-                  <a:schemeClr val="tx1"/>
-                </a:solidFill>
-                <a:latin typeface="+mj-lt"/>
-                <a:ea typeface="+mj-ea"/>
-                <a:cs typeface="+mj-cs"/>
-              </a:defRPr>
-            </a:lvl1pPr>
-          </a:lstStyle>
-          <a:p>
-            <a:pPr algn="ctr"/>
-            <a:r>
-              <a:rPr lang="pt-BR" sz="6600" noProof="0" dirty="0"/>
-              <a:t>Perguntas?</a:t>
-            </a:r>
-            <a:endParaRPr lang="pt-BR" sz="6600" b="1" i="1" noProof="0" dirty="0"/>
+          <p:cNvPr id="2" name="Título 1">
+            <a:extLst>
+              <a:ext uri="{FF2B5EF4-FFF2-40B4-BE49-F238E27FC236}">
+                <a16:creationId xmlns:a16="http://schemas.microsoft.com/office/drawing/2014/main" id="{B9E502FC-4440-F5DA-F299-69CD15E702AE}"/>
+              </a:ext>
+            </a:extLst>
+          </p:cNvPr>
+          <p:cNvSpPr>
+            <a:spLocks noGrp="1"/>
+          </p:cNvSpPr>
+          <p:nvPr>
+            <p:ph type="title"/>
+          </p:nvPr>
+        </p:nvSpPr>
+        <p:spPr/>
+        <p:txBody>
+          <a:bodyPr/>
+          <a:lstStyle/>
+          <a:p>
+            <a:r>
+              <a:rPr lang="pt-BR" noProof="0" dirty="0"/>
+              <a:t>Exemplo(</a:t>
+            </a:r>
+            <a:r>
+              <a:rPr lang="pt-BR" noProof="0" dirty="0" err="1"/>
+              <a:t>s</a:t>
+            </a:r>
+            <a:r>
+              <a:rPr lang="pt-BR" noProof="0" dirty="0"/>
+              <a:t>) de aplicação</a:t>
+            </a:r>
+          </a:p>
+        </p:txBody>
+      </p:sp>
+      <p:sp>
+        <p:nvSpPr>
+          <p:cNvPr id="3" name="Espaço Reservado para Conteúdo 2">
+            <a:extLst>
+              <a:ext uri="{FF2B5EF4-FFF2-40B4-BE49-F238E27FC236}">
+                <a16:creationId xmlns:a16="http://schemas.microsoft.com/office/drawing/2014/main" id="{69359096-6B47-BEA3-55AD-95F90CDC8489}"/>
+              </a:ext>
+            </a:extLst>
+          </p:cNvPr>
+          <p:cNvSpPr>
+            <a:spLocks noGrp="1"/>
+          </p:cNvSpPr>
+          <p:nvPr>
+            <p:ph idx="1"/>
+          </p:nvPr>
+        </p:nvSpPr>
+        <p:spPr/>
+        <p:txBody>
+          <a:bodyPr/>
+          <a:lstStyle/>
+          <a:p>
+            <a:pPr marL="514350" indent="-514350">
+              <a:buFont typeface="+mj-lt"/>
+              <a:buAutoNum type="arabicPeriod"/>
+            </a:pPr>
+            <a:r>
+              <a:rPr lang="pt-BR" noProof="0" dirty="0"/>
+              <a:t>Implantação em dispositivos com diferentes restrições de hardware (ex. </a:t>
+            </a:r>
+            <a:r>
+              <a:rPr lang="pt-BR" noProof="0" dirty="0" err="1"/>
+              <a:t>TinyML</a:t>
+            </a:r>
+            <a:r>
+              <a:rPr lang="pt-BR" noProof="0" dirty="0"/>
+              <a:t>);</a:t>
+            </a:r>
+          </a:p>
+          <a:p>
+            <a:pPr marL="514350" indent="-514350">
+              <a:buFont typeface="+mj-lt"/>
+              <a:buAutoNum type="arabicPeriod"/>
+            </a:pPr>
+            <a:r>
+              <a:rPr lang="pt-BR" noProof="0" dirty="0"/>
+              <a:t>Cenários de trade-off entre desempenho e custo;</a:t>
+            </a:r>
+          </a:p>
+          <a:p>
+            <a:pPr marL="514350" indent="-514350">
+              <a:buFont typeface="+mj-lt"/>
+              <a:buAutoNum type="arabicPeriod"/>
+            </a:pPr>
+            <a:r>
+              <a:rPr lang="pt-BR" noProof="0" dirty="0"/>
+              <a:t>Uso em cenários em novos domínios precisam ser entrados rapidamente;</a:t>
+            </a:r>
+          </a:p>
+          <a:p>
+            <a:pPr marL="514350" indent="-514350">
+              <a:buFont typeface="+mj-lt"/>
+              <a:buAutoNum type="arabicPeriod"/>
+            </a:pPr>
+            <a:r>
+              <a:rPr lang="pt-BR" noProof="0" dirty="0"/>
+              <a:t>Cenários com risco de </a:t>
+            </a:r>
+            <a:r>
+              <a:rPr lang="pt-BR" noProof="0" dirty="0" err="1"/>
+              <a:t>overfitting</a:t>
+            </a:r>
+            <a:r>
+              <a:rPr lang="pt-BR" noProof="0" dirty="0"/>
+              <a:t> em soluções únicas;</a:t>
+            </a:r>
+          </a:p>
+          <a:p>
+            <a:pPr marL="514350" indent="-514350">
+              <a:buFont typeface="+mj-lt"/>
+              <a:buAutoNum type="arabicPeriod"/>
+            </a:pPr>
+            <a:r>
+              <a:rPr lang="pt-BR" noProof="0" dirty="0"/>
+              <a:t>Aplicações educacionais e de pesquisa em </a:t>
+            </a:r>
+            <a:r>
+              <a:rPr lang="pt-BR" noProof="0" dirty="0" err="1"/>
+              <a:t>AutoML</a:t>
+            </a:r>
+            <a:r>
+              <a:rPr lang="pt-BR" noProof="0" dirty="0"/>
+              <a:t>;</a:t>
+            </a:r>
           </a:p>
         </p:txBody>
       </p:sp>
     </p:spTree>
     <p:extLst>
       <p:ext uri="{BB962C8B-B14F-4D97-AF65-F5344CB8AC3E}">
-        <p14:creationId xmlns:p14="http://schemas.microsoft.com/office/powerpoint/2010/main" val="3773005660"/>
+        <p14:creationId xmlns:p14="http://schemas.microsoft.com/office/powerpoint/2010/main" val="1532530965"/>
       </p:ext>
     </p:extLst>
   </p:cSld>
@@ -7797,7 +10513,7 @@
           <p:cNvPr id="2" name="Título 1">
             <a:extLst>
               <a:ext uri="{FF2B5EF4-FFF2-40B4-BE49-F238E27FC236}">
-                <a16:creationId xmlns:a16="http://schemas.microsoft.com/office/drawing/2014/main" id="{3CA32550-8C76-B013-2EC7-989D8C3B19BE}"/>
+                <a16:creationId xmlns:a16="http://schemas.microsoft.com/office/drawing/2014/main" id="{B7EBC8F7-03EF-338A-A90B-280A41AF9688}"/>
               </a:ext>
             </a:extLst>
           </p:cNvPr>
@@ -7815,7 +10531,7 @@
           <a:p>
             <a:r>
               <a:rPr lang="pt-BR" noProof="0" dirty="0"/>
-              <a:t>Referências</a:t>
+              <a:t>Comparação com outros algoritmos</a:t>
             </a:r>
           </a:p>
         </p:txBody>
@@ -7825,7 +10541,7 @@
           <p:cNvPr id="3" name="Espaço Reservado para Conteúdo 2">
             <a:extLst>
               <a:ext uri="{FF2B5EF4-FFF2-40B4-BE49-F238E27FC236}">
-                <a16:creationId xmlns:a16="http://schemas.microsoft.com/office/drawing/2014/main" id="{EF043237-7757-7557-B63E-D4EB5152D44B}"/>
+                <a16:creationId xmlns:a16="http://schemas.microsoft.com/office/drawing/2014/main" id="{C525BCE7-C19D-7DDA-016A-E3016C398CBA}"/>
               </a:ext>
             </a:extLst>
           </p:cNvPr>
@@ -7841,7 +10557,562 @@
           <a:bodyPr/>
           <a:lstStyle/>
           <a:p>
-            <a:endParaRPr lang="pt-BR" noProof="0" dirty="0"/>
+            <a:pPr marL="0" indent="0">
+              <a:buNone/>
+            </a:pPr>
+            <a:r>
+              <a:rPr lang="pt-BR" b="1" noProof="0" dirty="0"/>
+              <a:t>1. </a:t>
+            </a:r>
+            <a:r>
+              <a:rPr lang="pt-BR" b="1" noProof="0" dirty="0" err="1"/>
+              <a:t>Reinforcement</a:t>
+            </a:r>
+            <a:r>
+              <a:rPr lang="pt-BR" b="1" noProof="0" dirty="0"/>
+              <a:t> Learning (RL-NAS)</a:t>
+            </a:r>
+          </a:p>
+          <a:p>
+            <a:r>
+              <a:rPr lang="pt-BR" b="1" noProof="0" dirty="0"/>
+              <a:t>Como funciona</a:t>
+            </a:r>
+            <a:r>
+              <a:rPr lang="pt-BR" noProof="0" dirty="0"/>
+              <a:t>: um controlador (rede neural) gera arquiteturas, recebe como recompensa a acurácia das redes treinadas.</a:t>
+            </a:r>
+          </a:p>
+          <a:p>
+            <a:r>
+              <a:rPr lang="pt-BR" b="1" noProof="0" dirty="0"/>
+              <a:t>Limitação</a:t>
+            </a:r>
+            <a:r>
+              <a:rPr lang="pt-BR" noProof="0" dirty="0"/>
+              <a:t>: precisa de muitas avaliações (muito caro).</a:t>
+            </a:r>
+          </a:p>
+          <a:p>
+            <a:r>
+              <a:rPr lang="pt-BR" b="1" noProof="0" dirty="0" err="1"/>
+              <a:t>LLMatic</a:t>
+            </a:r>
+            <a:r>
+              <a:rPr lang="pt-BR" b="1" noProof="0" dirty="0"/>
+              <a:t> </a:t>
+            </a:r>
+            <a:r>
+              <a:rPr lang="pt-BR" b="1" noProof="0" dirty="0" err="1"/>
+              <a:t>vs</a:t>
+            </a:r>
+            <a:r>
+              <a:rPr lang="pt-BR" b="1" noProof="0" dirty="0"/>
+              <a:t> RL-NAS</a:t>
+            </a:r>
+            <a:r>
+              <a:rPr lang="pt-BR" noProof="0" dirty="0"/>
+              <a:t>:</a:t>
+            </a:r>
+          </a:p>
+          <a:p>
+            <a:pPr lvl="1"/>
+            <a:r>
+              <a:rPr lang="pt-BR" noProof="0" dirty="0" err="1"/>
+              <a:t>LLMatic</a:t>
+            </a:r>
+            <a:r>
+              <a:rPr lang="pt-BR" noProof="0" dirty="0"/>
+              <a:t> usa </a:t>
+            </a:r>
+            <a:r>
+              <a:rPr lang="pt-BR" b="1" noProof="0" dirty="0"/>
+              <a:t>LLM + evolução/QD</a:t>
+            </a:r>
+            <a:r>
+              <a:rPr lang="pt-BR" noProof="0" dirty="0"/>
+              <a:t>, guiando a busca com conhecimento de código.</a:t>
+            </a:r>
+          </a:p>
+          <a:p>
+            <a:pPr lvl="1"/>
+            <a:r>
+              <a:rPr lang="pt-BR" noProof="0" dirty="0"/>
+              <a:t>Encontra boas arquiteturas em </a:t>
+            </a:r>
+            <a:r>
+              <a:rPr lang="pt-BR" b="1" noProof="0" dirty="0"/>
+              <a:t>menos avaliações</a:t>
+            </a:r>
+            <a:r>
+              <a:rPr lang="pt-BR" noProof="0" dirty="0"/>
+              <a:t> e com mais </a:t>
+            </a:r>
+            <a:r>
+              <a:rPr lang="pt-BR" b="1" noProof="0" dirty="0"/>
+              <a:t>diversidade de soluções</a:t>
+            </a:r>
+            <a:r>
+              <a:rPr lang="pt-BR" noProof="0" dirty="0"/>
+              <a:t>.</a:t>
+            </a:r>
+          </a:p>
+        </p:txBody>
+      </p:sp>
+    </p:spTree>
+    <p:extLst>
+      <p:ext uri="{BB962C8B-B14F-4D97-AF65-F5344CB8AC3E}">
+        <p14:creationId xmlns:p14="http://schemas.microsoft.com/office/powerpoint/2010/main" val="3601469261"/>
+      </p:ext>
+    </p:extLst>
+  </p:cSld>
+  <p:clrMapOvr>
+    <a:masterClrMapping/>
+  </p:clrMapOvr>
+</p:sld>
+</file>
+
+<file path=ppt/slides/slide23.xml><?xml version="1.0" encoding="utf-8"?>
+<p:sld xmlns:a="http://schemas.openxmlformats.org/drawingml/2006/main" xmlns:r="http://schemas.openxmlformats.org/officeDocument/2006/relationships" xmlns:p="http://schemas.openxmlformats.org/presentationml/2006/main">
+  <p:cSld>
+    <p:spTree>
+      <p:nvGrpSpPr>
+        <p:cNvPr id="1" name="">
+          <a:extLst>
+            <a:ext uri="{FF2B5EF4-FFF2-40B4-BE49-F238E27FC236}">
+              <a16:creationId xmlns:a16="http://schemas.microsoft.com/office/drawing/2014/main" id="{3D6E771F-4F99-C00F-CEC0-D502672EE6E6}"/>
+            </a:ext>
+          </a:extLst>
+        </p:cNvPr>
+        <p:cNvGrpSpPr/>
+        <p:nvPr/>
+      </p:nvGrpSpPr>
+      <p:grpSpPr>
+        <a:xfrm>
+          <a:off x="0" y="0"/>
+          <a:ext cx="0" cy="0"/>
+          <a:chOff x="0" y="0"/>
+          <a:chExt cx="0" cy="0"/>
+        </a:xfrm>
+      </p:grpSpPr>
+      <p:sp>
+        <p:nvSpPr>
+          <p:cNvPr id="2" name="Título 1">
+            <a:extLst>
+              <a:ext uri="{FF2B5EF4-FFF2-40B4-BE49-F238E27FC236}">
+                <a16:creationId xmlns:a16="http://schemas.microsoft.com/office/drawing/2014/main" id="{8E18AA88-ACBF-D692-8004-1C4AB183681C}"/>
+              </a:ext>
+            </a:extLst>
+          </p:cNvPr>
+          <p:cNvSpPr>
+            <a:spLocks noGrp="1"/>
+          </p:cNvSpPr>
+          <p:nvPr>
+            <p:ph type="title"/>
+          </p:nvPr>
+        </p:nvSpPr>
+        <p:spPr/>
+        <p:txBody>
+          <a:bodyPr/>
+          <a:lstStyle/>
+          <a:p>
+            <a:r>
+              <a:rPr lang="pt-BR" noProof="0" dirty="0"/>
+              <a:t>Comparação com outros algoritmos</a:t>
+            </a:r>
+          </a:p>
+        </p:txBody>
+      </p:sp>
+      <p:sp>
+        <p:nvSpPr>
+          <p:cNvPr id="3" name="Espaço Reservado para Conteúdo 2">
+            <a:extLst>
+              <a:ext uri="{FF2B5EF4-FFF2-40B4-BE49-F238E27FC236}">
+                <a16:creationId xmlns:a16="http://schemas.microsoft.com/office/drawing/2014/main" id="{53BD56C6-CA60-7B62-DC8B-C303F13B9A50}"/>
+              </a:ext>
+            </a:extLst>
+          </p:cNvPr>
+          <p:cNvSpPr>
+            <a:spLocks noGrp="1"/>
+          </p:cNvSpPr>
+          <p:nvPr>
+            <p:ph idx="1"/>
+          </p:nvPr>
+        </p:nvSpPr>
+        <p:spPr/>
+        <p:txBody>
+          <a:bodyPr/>
+          <a:lstStyle/>
+          <a:p>
+            <a:pPr marL="0" indent="0">
+              <a:buNone/>
+            </a:pPr>
+            <a:r>
+              <a:rPr lang="pt-BR" b="1" noProof="0" dirty="0"/>
+              <a:t>2. Evolução pura (</a:t>
+            </a:r>
+            <a:r>
+              <a:rPr lang="pt-BR" b="1" noProof="0" dirty="0" err="1"/>
+              <a:t>Neuroevolution</a:t>
+            </a:r>
+            <a:r>
+              <a:rPr lang="pt-BR" b="1" noProof="0" dirty="0"/>
+              <a:t> / </a:t>
+            </a:r>
+            <a:r>
+              <a:rPr lang="pt-BR" b="1" noProof="0" dirty="0" err="1"/>
+              <a:t>Evolutionary</a:t>
+            </a:r>
+            <a:r>
+              <a:rPr lang="pt-BR" b="1" noProof="0" dirty="0"/>
+              <a:t> NAS)</a:t>
+            </a:r>
+          </a:p>
+          <a:p>
+            <a:r>
+              <a:rPr lang="pt-BR" b="1" noProof="0" dirty="0"/>
+              <a:t>Como funciona</a:t>
+            </a:r>
+            <a:r>
+              <a:rPr lang="pt-BR" noProof="0" dirty="0"/>
+              <a:t>: populações de redes evoluem por mutação e crossover.</a:t>
+            </a:r>
+          </a:p>
+          <a:p>
+            <a:r>
+              <a:rPr lang="pt-BR" b="1" noProof="0" dirty="0"/>
+              <a:t>Limitação</a:t>
+            </a:r>
+            <a:r>
+              <a:rPr lang="pt-BR" noProof="0" dirty="0"/>
+              <a:t>: busca é </a:t>
+            </a:r>
+            <a:r>
+              <a:rPr lang="pt-BR" b="1" noProof="0" dirty="0"/>
+              <a:t>“cega”</a:t>
+            </a:r>
+            <a:r>
+              <a:rPr lang="pt-BR" noProof="0" dirty="0"/>
+              <a:t> — as mutações não são guiadas por conhecimento prévio.</a:t>
+            </a:r>
+          </a:p>
+          <a:p>
+            <a:r>
+              <a:rPr lang="pt-BR" b="1" noProof="0" dirty="0" err="1"/>
+              <a:t>LLMatic</a:t>
+            </a:r>
+            <a:r>
+              <a:rPr lang="pt-BR" b="1" noProof="0" dirty="0"/>
+              <a:t> </a:t>
+            </a:r>
+            <a:r>
+              <a:rPr lang="pt-BR" b="1" noProof="0" dirty="0" err="1"/>
+              <a:t>vs</a:t>
+            </a:r>
+            <a:r>
+              <a:rPr lang="pt-BR" b="1" noProof="0" dirty="0"/>
+              <a:t> Evolução pura</a:t>
+            </a:r>
+            <a:r>
+              <a:rPr lang="pt-BR" noProof="0" dirty="0"/>
+              <a:t>:</a:t>
+            </a:r>
+          </a:p>
+          <a:p>
+            <a:pPr lvl="1"/>
+            <a:r>
+              <a:rPr lang="pt-BR" noProof="0" dirty="0"/>
+              <a:t>O LLM gera arquiteturas mais </a:t>
+            </a:r>
+            <a:r>
+              <a:rPr lang="pt-BR" b="1" noProof="0" dirty="0"/>
+              <a:t>plausíveis e treináveis</a:t>
+            </a:r>
+            <a:r>
+              <a:rPr lang="pt-BR" noProof="0" dirty="0"/>
+              <a:t>, pois tem </a:t>
+            </a:r>
+            <a:r>
+              <a:rPr lang="pt-BR" b="1" noProof="0" dirty="0"/>
+              <a:t>conhecimento embutido</a:t>
+            </a:r>
+            <a:r>
+              <a:rPr lang="pt-BR" noProof="0" dirty="0"/>
+              <a:t> de boas práticas em código.</a:t>
+            </a:r>
+          </a:p>
+          <a:p>
+            <a:pPr lvl="1"/>
+            <a:r>
+              <a:rPr lang="pt-BR" noProof="0" dirty="0"/>
+              <a:t>Menos arquiteturas inválidas → maior eficiência.</a:t>
+            </a:r>
+          </a:p>
+        </p:txBody>
+      </p:sp>
+    </p:spTree>
+    <p:extLst>
+      <p:ext uri="{BB962C8B-B14F-4D97-AF65-F5344CB8AC3E}">
+        <p14:creationId xmlns:p14="http://schemas.microsoft.com/office/powerpoint/2010/main" val="836209733"/>
+      </p:ext>
+    </p:extLst>
+  </p:cSld>
+  <p:clrMapOvr>
+    <a:masterClrMapping/>
+  </p:clrMapOvr>
+</p:sld>
+</file>
+
+<file path=ppt/slides/slide24.xml><?xml version="1.0" encoding="utf-8"?>
+<p:sld xmlns:a="http://schemas.openxmlformats.org/drawingml/2006/main" xmlns:r="http://schemas.openxmlformats.org/officeDocument/2006/relationships" xmlns:p="http://schemas.openxmlformats.org/presentationml/2006/main">
+  <p:cSld>
+    <p:spTree>
+      <p:nvGrpSpPr>
+        <p:cNvPr id="1" name=""/>
+        <p:cNvGrpSpPr/>
+        <p:nvPr/>
+      </p:nvGrpSpPr>
+      <p:grpSpPr>
+        <a:xfrm>
+          <a:off x="0" y="0"/>
+          <a:ext cx="0" cy="0"/>
+          <a:chOff x="0" y="0"/>
+          <a:chExt cx="0" cy="0"/>
+        </a:xfrm>
+      </p:grpSpPr>
+      <p:sp>
+        <p:nvSpPr>
+          <p:cNvPr id="4" name="Título 1">
+            <a:extLst>
+              <a:ext uri="{FF2B5EF4-FFF2-40B4-BE49-F238E27FC236}">
+                <a16:creationId xmlns:a16="http://schemas.microsoft.com/office/drawing/2014/main" id="{32666AC8-2E17-4DB4-B0F5-60C640CCFD2E}"/>
+              </a:ext>
+            </a:extLst>
+          </p:cNvPr>
+          <p:cNvSpPr txBox="1">
+            <a:spLocks/>
+          </p:cNvSpPr>
+          <p:nvPr/>
+        </p:nvSpPr>
+        <p:spPr>
+          <a:xfrm>
+            <a:off x="1431533" y="2720526"/>
+            <a:ext cx="9144000" cy="1029541"/>
+          </a:xfrm>
+          <a:prstGeom prst="rect">
+            <a:avLst/>
+          </a:prstGeom>
+        </p:spPr>
+        <p:txBody>
+          <a:bodyPr vert="horz" lIns="91440" tIns="45720" rIns="91440" bIns="45720" rtlCol="0" anchor="ctr">
+            <a:normAutofit/>
+          </a:bodyPr>
+          <a:lstStyle>
+            <a:lvl1pPr algn="l" defTabSz="914400" rtl="0" eaLnBrk="1" latinLnBrk="0" hangingPunct="1">
+              <a:lnSpc>
+                <a:spcPct val="90000"/>
+              </a:lnSpc>
+              <a:spcBef>
+                <a:spcPct val="0"/>
+              </a:spcBef>
+              <a:buNone/>
+              <a:defRPr sz="4400" kern="1200">
+                <a:solidFill>
+                  <a:schemeClr val="tx1"/>
+                </a:solidFill>
+                <a:latin typeface="+mj-lt"/>
+                <a:ea typeface="+mj-ea"/>
+                <a:cs typeface="+mj-cs"/>
+              </a:defRPr>
+            </a:lvl1pPr>
+          </a:lstStyle>
+          <a:p>
+            <a:pPr algn="ctr"/>
+            <a:r>
+              <a:rPr lang="pt-BR" sz="6600" noProof="0" dirty="0"/>
+              <a:t>Perguntas?</a:t>
+            </a:r>
+            <a:endParaRPr lang="pt-BR" sz="6600" b="1" i="1" noProof="0" dirty="0"/>
+          </a:p>
+        </p:txBody>
+      </p:sp>
+    </p:spTree>
+    <p:extLst>
+      <p:ext uri="{BB962C8B-B14F-4D97-AF65-F5344CB8AC3E}">
+        <p14:creationId xmlns:p14="http://schemas.microsoft.com/office/powerpoint/2010/main" val="3773005660"/>
+      </p:ext>
+    </p:extLst>
+  </p:cSld>
+  <p:clrMapOvr>
+    <a:masterClrMapping/>
+  </p:clrMapOvr>
+</p:sld>
+</file>
+
+<file path=ppt/slides/slide25.xml><?xml version="1.0" encoding="utf-8"?>
+<p:sld xmlns:a="http://schemas.openxmlformats.org/drawingml/2006/main" xmlns:r="http://schemas.openxmlformats.org/officeDocument/2006/relationships" xmlns:p="http://schemas.openxmlformats.org/presentationml/2006/main">
+  <p:cSld>
+    <p:spTree>
+      <p:nvGrpSpPr>
+        <p:cNvPr id="1" name=""/>
+        <p:cNvGrpSpPr/>
+        <p:nvPr/>
+      </p:nvGrpSpPr>
+      <p:grpSpPr>
+        <a:xfrm>
+          <a:off x="0" y="0"/>
+          <a:ext cx="0" cy="0"/>
+          <a:chOff x="0" y="0"/>
+          <a:chExt cx="0" cy="0"/>
+        </a:xfrm>
+      </p:grpSpPr>
+      <p:sp>
+        <p:nvSpPr>
+          <p:cNvPr id="2" name="Título 1">
+            <a:extLst>
+              <a:ext uri="{FF2B5EF4-FFF2-40B4-BE49-F238E27FC236}">
+                <a16:creationId xmlns:a16="http://schemas.microsoft.com/office/drawing/2014/main" id="{3CA32550-8C76-B013-2EC7-989D8C3B19BE}"/>
+              </a:ext>
+            </a:extLst>
+          </p:cNvPr>
+          <p:cNvSpPr>
+            <a:spLocks noGrp="1"/>
+          </p:cNvSpPr>
+          <p:nvPr>
+            <p:ph type="title"/>
+          </p:nvPr>
+        </p:nvSpPr>
+        <p:spPr/>
+        <p:txBody>
+          <a:bodyPr/>
+          <a:lstStyle/>
+          <a:p>
+            <a:r>
+              <a:rPr lang="pt-BR" noProof="0" dirty="0"/>
+              <a:t>Referências</a:t>
+            </a:r>
+          </a:p>
+        </p:txBody>
+      </p:sp>
+      <p:sp>
+        <p:nvSpPr>
+          <p:cNvPr id="3" name="Espaço Reservado para Conteúdo 2">
+            <a:extLst>
+              <a:ext uri="{FF2B5EF4-FFF2-40B4-BE49-F238E27FC236}">
+                <a16:creationId xmlns:a16="http://schemas.microsoft.com/office/drawing/2014/main" id="{EF043237-7757-7557-B63E-D4EB5152D44B}"/>
+              </a:ext>
+            </a:extLst>
+          </p:cNvPr>
+          <p:cNvSpPr>
+            <a:spLocks noGrp="1"/>
+          </p:cNvSpPr>
+          <p:nvPr>
+            <p:ph idx="1"/>
+          </p:nvPr>
+        </p:nvSpPr>
+        <p:spPr/>
+        <p:txBody>
+          <a:bodyPr/>
+          <a:lstStyle/>
+          <a:p>
+            <a:r>
+              <a:rPr lang="en-US" dirty="0" err="1"/>
+              <a:t>LLMatic</a:t>
+            </a:r>
+            <a:r>
+              <a:rPr lang="en-US" dirty="0"/>
+              <a:t>: Neural Architecture Search via Large Language Models and Quality Diversity Optimization</a:t>
+            </a:r>
+          </a:p>
+          <a:p>
+            <a:pPr marL="457200" lvl="1" indent="0">
+              <a:buNone/>
+            </a:pPr>
+            <a:r>
+              <a:rPr lang="pt-BR" dirty="0">
+                <a:hlinkClick r:id="rId2"/>
+              </a:rPr>
+              <a:t>https://arxiv.org/pdf/2306.01102</a:t>
+            </a:r>
+            <a:endParaRPr lang="pt-BR" dirty="0"/>
+          </a:p>
+          <a:p>
+            <a:pPr marL="457200" lvl="1" indent="0">
+              <a:buNone/>
+            </a:pPr>
+            <a:endParaRPr lang="pt-BR" dirty="0"/>
+          </a:p>
+          <a:p>
+            <a:r>
+              <a:rPr lang="pt-BR" dirty="0"/>
+              <a:t>Neural </a:t>
+            </a:r>
+            <a:r>
+              <a:rPr lang="pt-BR" dirty="0" err="1"/>
+              <a:t>Architecture</a:t>
+            </a:r>
+            <a:r>
+              <a:rPr lang="pt-BR" dirty="0"/>
+              <a:t> Search </a:t>
+            </a:r>
+            <a:r>
+              <a:rPr lang="pt-BR" dirty="0" err="1"/>
+              <a:t>with</a:t>
+            </a:r>
+            <a:r>
+              <a:rPr lang="pt-BR" dirty="0"/>
+              <a:t> </a:t>
+            </a:r>
+            <a:r>
+              <a:rPr lang="pt-BR" dirty="0" err="1"/>
+              <a:t>Reinforcement</a:t>
+            </a:r>
+            <a:r>
+              <a:rPr lang="pt-BR" dirty="0"/>
+              <a:t> Learning</a:t>
+            </a:r>
+          </a:p>
+          <a:p>
+            <a:pPr marL="457200" lvl="1" indent="0">
+              <a:buNone/>
+            </a:pPr>
+            <a:r>
+              <a:rPr lang="pt-BR" dirty="0">
+                <a:hlinkClick r:id="rId3"/>
+              </a:rPr>
+              <a:t>https://arxiv.org/pdf/1611.01578</a:t>
+            </a:r>
+            <a:endParaRPr lang="pt-BR" dirty="0"/>
+          </a:p>
+          <a:p>
+            <a:pPr marL="457200" lvl="1" indent="0">
+              <a:buNone/>
+            </a:pPr>
+            <a:endParaRPr lang="pt-BR" dirty="0"/>
+          </a:p>
+          <a:p>
+            <a:r>
+              <a:rPr lang="en-US" dirty="0"/>
+              <a:t>Evolution through Large Models</a:t>
+            </a:r>
+          </a:p>
+          <a:p>
+            <a:pPr marL="457200" lvl="1" indent="0">
+              <a:buNone/>
+            </a:pPr>
+            <a:r>
+              <a:rPr lang="pt-BR" dirty="0">
+                <a:hlinkClick r:id="rId4"/>
+              </a:rPr>
+              <a:t>https://arxiv.org/pdf/2206.08896</a:t>
+            </a:r>
+            <a:endParaRPr lang="pt-BR" dirty="0"/>
+          </a:p>
+          <a:p>
+            <a:pPr marL="457200" lvl="1" indent="0">
+              <a:buNone/>
+            </a:pPr>
+            <a:endParaRPr lang="pt-BR" dirty="0"/>
           </a:p>
         </p:txBody>
       </p:sp>
@@ -7858,7 +11129,7 @@
 </p:sld>
 </file>
 
-<file path=ppt/slides/slide23.xml><?xml version="1.0" encoding="utf-8"?>
+<file path=ppt/slides/slide26.xml><?xml version="1.0" encoding="utf-8"?>
 <p:sld xmlns:a="http://schemas.openxmlformats.org/drawingml/2006/main" xmlns:r="http://schemas.openxmlformats.org/officeDocument/2006/relationships" xmlns:p="http://schemas.openxmlformats.org/presentationml/2006/main">
   <p:cSld>
     <p:spTree>

</xml_diff>

<commit_message>
Add pdf and quiz
</commit_message>
<xml_diff>
--- a/seminarios/TP558_LLM_QD.pptx
+++ b/seminarios/TP558_LLM_QD.pptx
@@ -5,10 +5,10 @@
     <p:sldMasterId id="2147483648" r:id="rId1"/>
   </p:sldMasterIdLst>
   <p:notesMasterIdLst>
-    <p:notesMasterId r:id="rId28"/>
+    <p:notesMasterId r:id="rId29"/>
   </p:notesMasterIdLst>
   <p:handoutMasterIdLst>
-    <p:handoutMasterId r:id="rId29"/>
+    <p:handoutMasterId r:id="rId30"/>
   </p:handoutMasterIdLst>
   <p:sldIdLst>
     <p:sldId id="256" r:id="rId2"/>
@@ -37,6 +37,7 @@
     <p:sldId id="293" r:id="rId25"/>
     <p:sldId id="314" r:id="rId26"/>
     <p:sldId id="306" r:id="rId27"/>
+    <p:sldId id="332" r:id="rId28"/>
   </p:sldIdLst>
   <p:sldSz cx="12192000" cy="6858000"/>
   <p:notesSz cx="7315200" cy="9601200"/>
@@ -300,7 +301,7 @@
           <a:p>
             <a:fld id="{144F1436-6906-4D93-B7A2-786C327BFA14}" type="datetimeFigureOut">
               <a:rPr lang="nl-BE" smtClean="0"/>
-              <a:t>28/08/2025</a:t>
+              <a:t>29/08/2025</a:t>
             </a:fld>
             <a:endParaRPr lang="nl-BE"/>
           </a:p>
@@ -465,7 +466,7 @@
           <a:p>
             <a:fld id="{AA8CD09E-2914-4F47-B6C1-51B2C31814C9}" type="datetimeFigureOut">
               <a:rPr lang="pt-BR" smtClean="0"/>
-              <a:t>28/08/2025</a:t>
+              <a:t>29/08/2025</a:t>
             </a:fld>
             <a:endParaRPr lang="pt-BR"/>
           </a:p>
@@ -4891,7 +4892,7 @@
           <a:p>
             <a:fld id="{63289F7E-B80B-496E-81B4-D396C37C9454}" type="datetimeFigureOut">
               <a:rPr lang="pt-BR" smtClean="0"/>
-              <a:t>28/08/2025</a:t>
+              <a:t>29/08/2025</a:t>
             </a:fld>
             <a:endParaRPr lang="pt-BR"/>
           </a:p>
@@ -5089,7 +5090,7 @@
           <a:p>
             <a:fld id="{63289F7E-B80B-496E-81B4-D396C37C9454}" type="datetimeFigureOut">
               <a:rPr lang="pt-BR" smtClean="0"/>
-              <a:t>28/08/2025</a:t>
+              <a:t>29/08/2025</a:t>
             </a:fld>
             <a:endParaRPr lang="pt-BR"/>
           </a:p>
@@ -5297,7 +5298,7 @@
           <a:p>
             <a:fld id="{63289F7E-B80B-496E-81B4-D396C37C9454}" type="datetimeFigureOut">
               <a:rPr lang="pt-BR" smtClean="0"/>
-              <a:t>28/08/2025</a:t>
+              <a:t>29/08/2025</a:t>
             </a:fld>
             <a:endParaRPr lang="pt-BR"/>
           </a:p>
@@ -5495,7 +5496,7 @@
           <a:p>
             <a:fld id="{63289F7E-B80B-496E-81B4-D396C37C9454}" type="datetimeFigureOut">
               <a:rPr lang="pt-BR" smtClean="0"/>
-              <a:t>28/08/2025</a:t>
+              <a:t>29/08/2025</a:t>
             </a:fld>
             <a:endParaRPr lang="pt-BR"/>
           </a:p>
@@ -5770,7 +5771,7 @@
           <a:p>
             <a:fld id="{63289F7E-B80B-496E-81B4-D396C37C9454}" type="datetimeFigureOut">
               <a:rPr lang="pt-BR" smtClean="0"/>
-              <a:t>28/08/2025</a:t>
+              <a:t>29/08/2025</a:t>
             </a:fld>
             <a:endParaRPr lang="pt-BR"/>
           </a:p>
@@ -6035,7 +6036,7 @@
           <a:p>
             <a:fld id="{63289F7E-B80B-496E-81B4-D396C37C9454}" type="datetimeFigureOut">
               <a:rPr lang="pt-BR" smtClean="0"/>
-              <a:t>28/08/2025</a:t>
+              <a:t>29/08/2025</a:t>
             </a:fld>
             <a:endParaRPr lang="pt-BR"/>
           </a:p>
@@ -6447,7 +6448,7 @@
           <a:p>
             <a:fld id="{63289F7E-B80B-496E-81B4-D396C37C9454}" type="datetimeFigureOut">
               <a:rPr lang="pt-BR" smtClean="0"/>
-              <a:t>28/08/2025</a:t>
+              <a:t>29/08/2025</a:t>
             </a:fld>
             <a:endParaRPr lang="pt-BR"/>
           </a:p>
@@ -6588,7 +6589,7 @@
           <a:p>
             <a:fld id="{63289F7E-B80B-496E-81B4-D396C37C9454}" type="datetimeFigureOut">
               <a:rPr lang="pt-BR" smtClean="0"/>
-              <a:t>28/08/2025</a:t>
+              <a:t>29/08/2025</a:t>
             </a:fld>
             <a:endParaRPr lang="pt-BR"/>
           </a:p>
@@ -6701,7 +6702,7 @@
           <a:p>
             <a:fld id="{63289F7E-B80B-496E-81B4-D396C37C9454}" type="datetimeFigureOut">
               <a:rPr lang="pt-BR" smtClean="0"/>
-              <a:t>28/08/2025</a:t>
+              <a:t>29/08/2025</a:t>
             </a:fld>
             <a:endParaRPr lang="pt-BR"/>
           </a:p>
@@ -7012,7 +7013,7 @@
           <a:p>
             <a:fld id="{63289F7E-B80B-496E-81B4-D396C37C9454}" type="datetimeFigureOut">
               <a:rPr lang="pt-BR" smtClean="0"/>
-              <a:t>28/08/2025</a:t>
+              <a:t>29/08/2025</a:t>
             </a:fld>
             <a:endParaRPr lang="pt-BR"/>
           </a:p>
@@ -7300,7 +7301,7 @@
           <a:p>
             <a:fld id="{63289F7E-B80B-496E-81B4-D396C37C9454}" type="datetimeFigureOut">
               <a:rPr lang="pt-BR" smtClean="0"/>
-              <a:t>28/08/2025</a:t>
+              <a:t>29/08/2025</a:t>
             </a:fld>
             <a:endParaRPr lang="pt-BR"/>
           </a:p>
@@ -7541,7 +7542,7 @@
           <a:p>
             <a:fld id="{63289F7E-B80B-496E-81B4-D396C37C9454}" type="datetimeFigureOut">
               <a:rPr lang="pt-BR" smtClean="0"/>
-              <a:t>28/08/2025</a:t>
+              <a:t>29/08/2025</a:t>
             </a:fld>
             <a:endParaRPr lang="pt-BR"/>
           </a:p>
@@ -11206,6 +11207,111 @@
     <p:extLst>
       <p:ext uri="{BB962C8B-B14F-4D97-AF65-F5344CB8AC3E}">
         <p14:creationId xmlns:p14="http://schemas.microsoft.com/office/powerpoint/2010/main" val="2655704619"/>
+      </p:ext>
+    </p:extLst>
+  </p:cSld>
+  <p:clrMapOvr>
+    <a:masterClrMapping/>
+  </p:clrMapOvr>
+</p:sld>
+</file>
+
+<file path=ppt/slides/slide27.xml><?xml version="1.0" encoding="utf-8"?>
+<p:sld xmlns:a="http://schemas.openxmlformats.org/drawingml/2006/main" xmlns:r="http://schemas.openxmlformats.org/officeDocument/2006/relationships" xmlns:p="http://schemas.openxmlformats.org/presentationml/2006/main">
+  <p:cSld>
+    <p:spTree>
+      <p:nvGrpSpPr>
+        <p:cNvPr id="1" name="">
+          <a:extLst>
+            <a:ext uri="{FF2B5EF4-FFF2-40B4-BE49-F238E27FC236}">
+              <a16:creationId xmlns:a16="http://schemas.microsoft.com/office/drawing/2014/main" id="{AABD693B-42A6-E373-6060-8E734194A049}"/>
+            </a:ext>
+          </a:extLst>
+        </p:cNvPr>
+        <p:cNvGrpSpPr/>
+        <p:nvPr/>
+      </p:nvGrpSpPr>
+      <p:grpSpPr>
+        <a:xfrm>
+          <a:off x="0" y="0"/>
+          <a:ext cx="0" cy="0"/>
+          <a:chOff x="0" y="0"/>
+          <a:chExt cx="0" cy="0"/>
+        </a:xfrm>
+      </p:grpSpPr>
+      <p:sp>
+        <p:nvSpPr>
+          <p:cNvPr id="4" name="Título 1">
+            <a:extLst>
+              <a:ext uri="{FF2B5EF4-FFF2-40B4-BE49-F238E27FC236}">
+                <a16:creationId xmlns:a16="http://schemas.microsoft.com/office/drawing/2014/main" id="{3E569908-35D5-867D-3DFF-7A26983CFDE7}"/>
+              </a:ext>
+            </a:extLst>
+          </p:cNvPr>
+          <p:cNvSpPr txBox="1">
+            <a:spLocks/>
+          </p:cNvSpPr>
+          <p:nvPr/>
+        </p:nvSpPr>
+        <p:spPr>
+          <a:xfrm>
+            <a:off x="508000" y="2211163"/>
+            <a:ext cx="11175999" cy="2435674"/>
+          </a:xfrm>
+          <a:prstGeom prst="rect">
+            <a:avLst/>
+          </a:prstGeom>
+        </p:spPr>
+        <p:txBody>
+          <a:bodyPr vert="horz" lIns="91440" tIns="45720" rIns="91440" bIns="45720" rtlCol="0" anchor="ctr">
+            <a:normAutofit fontScale="77500" lnSpcReduction="20000"/>
+          </a:bodyPr>
+          <a:lstStyle>
+            <a:lvl1pPr algn="l" defTabSz="914400" rtl="0" eaLnBrk="1" latinLnBrk="0" hangingPunct="1">
+              <a:lnSpc>
+                <a:spcPct val="90000"/>
+              </a:lnSpc>
+              <a:spcBef>
+                <a:spcPct val="0"/>
+              </a:spcBef>
+              <a:buNone/>
+              <a:defRPr sz="4400" kern="1200">
+                <a:solidFill>
+                  <a:schemeClr val="tx1"/>
+                </a:solidFill>
+                <a:latin typeface="+mj-lt"/>
+                <a:ea typeface="+mj-ea"/>
+                <a:cs typeface="+mj-cs"/>
+              </a:defRPr>
+            </a:lvl1pPr>
+          </a:lstStyle>
+          <a:p>
+            <a:pPr algn="ctr"/>
+            <a:r>
+              <a:rPr lang="pt-BR" sz="6600" noProof="0" dirty="0"/>
+              <a:t>Quiz!</a:t>
+            </a:r>
+          </a:p>
+          <a:p>
+            <a:pPr algn="ctr"/>
+            <a:endParaRPr lang="pt-BR" sz="6600" noProof="0" dirty="0"/>
+          </a:p>
+          <a:p>
+            <a:pPr algn="ctr"/>
+            <a:r>
+              <a:rPr lang="pt-BR" sz="6600" b="1" i="1" dirty="0">
+                <a:hlinkClick r:id="rId2"/>
+              </a:rPr>
+              <a:t>https://forms.gle/FRc6wmk1q6ioX7F48</a:t>
+            </a:r>
+            <a:endParaRPr lang="pt-BR" sz="6600" b="1" i="1" dirty="0"/>
+          </a:p>
+        </p:txBody>
+      </p:sp>
+    </p:spTree>
+    <p:extLst>
+      <p:ext uri="{BB962C8B-B14F-4D97-AF65-F5344CB8AC3E}">
+        <p14:creationId xmlns:p14="http://schemas.microsoft.com/office/powerpoint/2010/main" val="1736787883"/>
       </p:ext>
     </p:extLst>
   </p:cSld>

</xml_diff>